<commit_message>
Aggiornata la presentazione, vedere descrizione per altro
Manca l'introduzione (da fare dopo aver fatto sia il programma UDP che TCP, in modo da raccogliere gli eventuali problemi in un'unica slide).
Mancano i test di performance del programma UDP.
Manca (ovviamente) il codice di tutto il programma TCP.
Mancano i test di performance del programma TCP.
Mancano le conclusioni (da fare sempre dopo aver fatto sia il programma UDP che TCP).
</commit_message>
<xml_diff>
--- a/Presentazione.pptx
+++ b/Presentazione.pptx
@@ -5,14 +5,17 @@
     <p:sldMasterId id="2147483714" r:id="rId1"/>
   </p:sldMasterIdLst>
   <p:notesMasterIdLst>
-    <p:notesMasterId r:id="rId7"/>
+    <p:notesMasterId r:id="rId10"/>
   </p:notesMasterIdLst>
   <p:sldIdLst>
     <p:sldId id="256" r:id="rId2"/>
     <p:sldId id="264" r:id="rId3"/>
     <p:sldId id="265" r:id="rId4"/>
-    <p:sldId id="266" r:id="rId5"/>
-    <p:sldId id="267" r:id="rId6"/>
+    <p:sldId id="268" r:id="rId5"/>
+    <p:sldId id="269" r:id="rId6"/>
+    <p:sldId id="270" r:id="rId7"/>
+    <p:sldId id="266" r:id="rId8"/>
+    <p:sldId id="267" r:id="rId9"/>
   </p:sldIdLst>
   <p:sldSz cx="12192000" cy="6858000"/>
   <p:notesSz cx="6858000" cy="9144000"/>
@@ -141,7 +144,7 @@
 <file path=ppt/revisionInfo.xml><?xml version="1.0" encoding="utf-8"?>
 <p1510:revInfo xmlns:a="http://schemas.openxmlformats.org/drawingml/2006/main" xmlns:r="http://schemas.openxmlformats.org/officeDocument/2006/relationships" xmlns:p1510="http://schemas.microsoft.com/office/powerpoint/2015/10/main">
   <p1510:revLst>
-    <p1510:client id="{255E8966-DA7A-4F42-BBC2-EB4277AFD265}" v="45" dt="2019-10-26T02:11:16.048"/>
+    <p1510:client id="{43CC9881-2FEC-47B1-AC96-5220636F8AE5}" v="17" dt="2019-10-28T15:41:27.137"/>
   </p1510:revLst>
 </p1510:revInfo>
 </file>
@@ -457,7 +460,7 @@
   <pc:docChgLst>
     <pc:chgData name="Andrei Daniel Ivan" userId="d3c4cde5a19fb9a3" providerId="LiveId" clId="{255E8966-DA7A-4F42-BBC2-EB4277AFD265}"/>
     <pc:docChg chg="undo custSel addSld delSld modSld">
-      <pc:chgData name="Andrei Daniel Ivan" userId="d3c4cde5a19fb9a3" providerId="LiveId" clId="{255E8966-DA7A-4F42-BBC2-EB4277AFD265}" dt="2019-10-26T13:33:15.785" v="634" actId="20577"/>
+      <pc:chgData name="Andrei Daniel Ivan" userId="d3c4cde5a19fb9a3" providerId="LiveId" clId="{255E8966-DA7A-4F42-BBC2-EB4277AFD265}" dt="2019-10-26T23:21:44.601" v="644" actId="1076"/>
       <pc:docMkLst>
         <pc:docMk/>
       </pc:docMkLst>
@@ -574,7 +577,7 @@
         </pc:spChg>
       </pc:sldChg>
       <pc:sldChg chg="addSp delSp modSp add">
-        <pc:chgData name="Andrei Daniel Ivan" userId="d3c4cde5a19fb9a3" providerId="LiveId" clId="{255E8966-DA7A-4F42-BBC2-EB4277AFD265}" dt="2019-10-25T18:54:39.645" v="433" actId="20577"/>
+        <pc:chgData name="Andrei Daniel Ivan" userId="d3c4cde5a19fb9a3" providerId="LiveId" clId="{255E8966-DA7A-4F42-BBC2-EB4277AFD265}" dt="2019-10-26T23:21:44.601" v="644" actId="1076"/>
         <pc:sldMkLst>
           <pc:docMk/>
           <pc:sldMk cId="1263132891" sldId="265"/>
@@ -660,7 +663,7 @@
           </ac:spMkLst>
         </pc:spChg>
         <pc:spChg chg="add mod">
-          <ac:chgData name="Andrei Daniel Ivan" userId="d3c4cde5a19fb9a3" providerId="LiveId" clId="{255E8966-DA7A-4F42-BBC2-EB4277AFD265}" dt="2019-10-25T18:54:39.645" v="433" actId="20577"/>
+          <ac:chgData name="Andrei Daniel Ivan" userId="d3c4cde5a19fb9a3" providerId="LiveId" clId="{255E8966-DA7A-4F42-BBC2-EB4277AFD265}" dt="2019-10-26T23:21:44.601" v="644" actId="1076"/>
           <ac:spMkLst>
             <pc:docMk/>
             <pc:sldMk cId="1263132891" sldId="265"/>
@@ -692,13 +695,13 @@
         </pc:spChg>
       </pc:sldChg>
       <pc:sldChg chg="addSp delSp modSp add">
-        <pc:chgData name="Andrei Daniel Ivan" userId="d3c4cde5a19fb9a3" providerId="LiveId" clId="{255E8966-DA7A-4F42-BBC2-EB4277AFD265}" dt="2019-10-26T02:14:01.294" v="632" actId="1076"/>
+        <pc:chgData name="Andrei Daniel Ivan" userId="d3c4cde5a19fb9a3" providerId="LiveId" clId="{255E8966-DA7A-4F42-BBC2-EB4277AFD265}" dt="2019-10-26T20:32:42.597" v="643" actId="20577"/>
         <pc:sldMkLst>
           <pc:docMk/>
           <pc:sldMk cId="3577249319" sldId="266"/>
         </pc:sldMkLst>
         <pc:spChg chg="mod">
-          <ac:chgData name="Andrei Daniel Ivan" userId="d3c4cde5a19fb9a3" providerId="LiveId" clId="{255E8966-DA7A-4F42-BBC2-EB4277AFD265}" dt="2019-10-25T18:37:57.686" v="181" actId="20577"/>
+          <ac:chgData name="Andrei Daniel Ivan" userId="d3c4cde5a19fb9a3" providerId="LiveId" clId="{255E8966-DA7A-4F42-BBC2-EB4277AFD265}" dt="2019-10-26T20:32:42.597" v="643" actId="20577"/>
           <ac:spMkLst>
             <pc:docMk/>
             <pc:sldMk cId="3577249319" sldId="266"/>
@@ -833,8 +836,8 @@
             <ac:spMk id="20" creationId="{4589F7B9-92BE-4E30-9687-5A24749B8F60}"/>
           </ac:spMkLst>
         </pc:spChg>
-        <pc:picChg chg="add del mod">
-          <ac:chgData name="Andrei Daniel Ivan" userId="d3c4cde5a19fb9a3" providerId="LiveId" clId="{255E8966-DA7A-4F42-BBC2-EB4277AFD265}" dt="2019-10-26T02:13:45.086" v="621" actId="1076"/>
+        <pc:picChg chg="add del mod ord">
+          <ac:chgData name="Andrei Daniel Ivan" userId="d3c4cde5a19fb9a3" providerId="LiveId" clId="{255E8966-DA7A-4F42-BBC2-EB4277AFD265}" dt="2019-10-26T20:32:33.967" v="641" actId="167"/>
           <ac:picMkLst>
             <pc:docMk/>
             <pc:sldMk cId="3577249319" sldId="266"/>
@@ -860,55 +863,24 @@
     </pc:docChg>
   </pc:docChgLst>
   <pc:docChgLst>
-    <pc:chgData name="Andrei Daniel Ivan" userId="d3c4cde5a19fb9a3" providerId="LiveId" clId="{5F41118D-A46A-4BCB-B31B-F83832F54457}"/>
-    <pc:docChg chg="custSel modSld">
-      <pc:chgData name="Andrei Daniel Ivan" userId="d3c4cde5a19fb9a3" providerId="LiveId" clId="{5F41118D-A46A-4BCB-B31B-F83832F54457}" dt="2019-10-17T13:27:09.784" v="283" actId="1076"/>
+    <pc:chgData name="Andrei Daniel Ivan" userId="d3c4cde5a19fb9a3" providerId="LiveId" clId="{A6A77833-C58B-4237-AD71-6D723E100C6B}"/>
+    <pc:docChg chg="modSld">
+      <pc:chgData name="Andrei Daniel Ivan" userId="d3c4cde5a19fb9a3" providerId="LiveId" clId="{A6A77833-C58B-4237-AD71-6D723E100C6B}" dt="2019-10-10T12:09:21.282" v="20" actId="20577"/>
       <pc:docMkLst>
         <pc:docMk/>
       </pc:docMkLst>
       <pc:sldChg chg="modSp">
-        <pc:chgData name="Andrei Daniel Ivan" userId="d3c4cde5a19fb9a3" providerId="LiveId" clId="{5F41118D-A46A-4BCB-B31B-F83832F54457}" dt="2019-10-17T12:25:06.306" v="143" actId="1076"/>
+        <pc:chgData name="Andrei Daniel Ivan" userId="d3c4cde5a19fb9a3" providerId="LiveId" clId="{A6A77833-C58B-4237-AD71-6D723E100C6B}" dt="2019-10-10T12:09:21.282" v="20" actId="20577"/>
         <pc:sldMkLst>
           <pc:docMk/>
-          <pc:sldMk cId="2617522827" sldId="259"/>
+          <pc:sldMk cId="2242395889" sldId="257"/>
         </pc:sldMkLst>
         <pc:spChg chg="mod">
-          <ac:chgData name="Andrei Daniel Ivan" userId="d3c4cde5a19fb9a3" providerId="LiveId" clId="{5F41118D-A46A-4BCB-B31B-F83832F54457}" dt="2019-10-17T12:24:56.663" v="141" actId="20577"/>
+          <ac:chgData name="Andrei Daniel Ivan" userId="d3c4cde5a19fb9a3" providerId="LiveId" clId="{A6A77833-C58B-4237-AD71-6D723E100C6B}" dt="2019-10-10T12:09:21.282" v="20" actId="20577"/>
           <ac:spMkLst>
             <pc:docMk/>
-            <pc:sldMk cId="2617522827" sldId="259"/>
-            <ac:spMk id="7" creationId="{EE01FA61-8462-4AFC-BE72-063FF8D343E8}"/>
-          </ac:spMkLst>
-        </pc:spChg>
-        <pc:spChg chg="mod">
-          <ac:chgData name="Andrei Daniel Ivan" userId="d3c4cde5a19fb9a3" providerId="LiveId" clId="{5F41118D-A46A-4BCB-B31B-F83832F54457}" dt="2019-10-17T12:25:06.306" v="143" actId="1076"/>
-          <ac:spMkLst>
-            <pc:docMk/>
-            <pc:sldMk cId="2617522827" sldId="259"/>
-            <ac:spMk id="8" creationId="{F49C932E-42CB-401A-B8E1-89A251888411}"/>
-          </ac:spMkLst>
-        </pc:spChg>
-      </pc:sldChg>
-      <pc:sldChg chg="modSp">
-        <pc:chgData name="Andrei Daniel Ivan" userId="d3c4cde5a19fb9a3" providerId="LiveId" clId="{5F41118D-A46A-4BCB-B31B-F83832F54457}" dt="2019-10-17T13:27:09.784" v="283" actId="1076"/>
-        <pc:sldMkLst>
-          <pc:docMk/>
-          <pc:sldMk cId="1889561379" sldId="260"/>
-        </pc:sldMkLst>
-        <pc:spChg chg="mod">
-          <ac:chgData name="Andrei Daniel Ivan" userId="d3c4cde5a19fb9a3" providerId="LiveId" clId="{5F41118D-A46A-4BCB-B31B-F83832F54457}" dt="2019-10-17T13:27:01.020" v="282" actId="255"/>
-          <ac:spMkLst>
-            <pc:docMk/>
-            <pc:sldMk cId="1889561379" sldId="260"/>
-            <ac:spMk id="4" creationId="{86399399-6393-4A4B-8522-F717A489643B}"/>
-          </ac:spMkLst>
-        </pc:spChg>
-        <pc:spChg chg="mod">
-          <ac:chgData name="Andrei Daniel Ivan" userId="d3c4cde5a19fb9a3" providerId="LiveId" clId="{5F41118D-A46A-4BCB-B31B-F83832F54457}" dt="2019-10-17T13:27:09.784" v="283" actId="1076"/>
-          <ac:spMkLst>
-            <pc:docMk/>
-            <pc:sldMk cId="1889561379" sldId="260"/>
-            <ac:spMk id="34" creationId="{4D9E606D-73EC-4A54-9FCE-4DEBEE992671}"/>
+            <pc:sldMk cId="2242395889" sldId="257"/>
+            <ac:spMk id="4" creationId="{A372732A-5502-4218-941E-F135920541BB}"/>
           </ac:spMkLst>
         </pc:spChg>
       </pc:sldChg>
@@ -1094,24 +1066,179 @@
     </pc:docChg>
   </pc:docChgLst>
   <pc:docChgLst>
-    <pc:chgData name="Andrei Daniel Ivan" userId="d3c4cde5a19fb9a3" providerId="LiveId" clId="{A6A77833-C58B-4237-AD71-6D723E100C6B}"/>
-    <pc:docChg chg="modSld">
-      <pc:chgData name="Andrei Daniel Ivan" userId="d3c4cde5a19fb9a3" providerId="LiveId" clId="{A6A77833-C58B-4237-AD71-6D723E100C6B}" dt="2019-10-10T12:09:21.282" v="20" actId="20577"/>
+    <pc:chgData name="Andrei Daniel Ivan" userId="d3c4cde5a19fb9a3" providerId="LiveId" clId="{5F41118D-A46A-4BCB-B31B-F83832F54457}"/>
+    <pc:docChg chg="custSel modSld">
+      <pc:chgData name="Andrei Daniel Ivan" userId="d3c4cde5a19fb9a3" providerId="LiveId" clId="{5F41118D-A46A-4BCB-B31B-F83832F54457}" dt="2019-10-17T13:27:09.784" v="283" actId="1076"/>
       <pc:docMkLst>
         <pc:docMk/>
       </pc:docMkLst>
       <pc:sldChg chg="modSp">
-        <pc:chgData name="Andrei Daniel Ivan" userId="d3c4cde5a19fb9a3" providerId="LiveId" clId="{A6A77833-C58B-4237-AD71-6D723E100C6B}" dt="2019-10-10T12:09:21.282" v="20" actId="20577"/>
+        <pc:chgData name="Andrei Daniel Ivan" userId="d3c4cde5a19fb9a3" providerId="LiveId" clId="{5F41118D-A46A-4BCB-B31B-F83832F54457}" dt="2019-10-17T12:25:06.306" v="143" actId="1076"/>
         <pc:sldMkLst>
           <pc:docMk/>
-          <pc:sldMk cId="2242395889" sldId="257"/>
+          <pc:sldMk cId="2617522827" sldId="259"/>
         </pc:sldMkLst>
         <pc:spChg chg="mod">
-          <ac:chgData name="Andrei Daniel Ivan" userId="d3c4cde5a19fb9a3" providerId="LiveId" clId="{A6A77833-C58B-4237-AD71-6D723E100C6B}" dt="2019-10-10T12:09:21.282" v="20" actId="20577"/>
+          <ac:chgData name="Andrei Daniel Ivan" userId="d3c4cde5a19fb9a3" providerId="LiveId" clId="{5F41118D-A46A-4BCB-B31B-F83832F54457}" dt="2019-10-17T12:24:56.663" v="141" actId="20577"/>
           <ac:spMkLst>
             <pc:docMk/>
-            <pc:sldMk cId="2242395889" sldId="257"/>
-            <ac:spMk id="4" creationId="{A372732A-5502-4218-941E-F135920541BB}"/>
+            <pc:sldMk cId="2617522827" sldId="259"/>
+            <ac:spMk id="7" creationId="{EE01FA61-8462-4AFC-BE72-063FF8D343E8}"/>
+          </ac:spMkLst>
+        </pc:spChg>
+        <pc:spChg chg="mod">
+          <ac:chgData name="Andrei Daniel Ivan" userId="d3c4cde5a19fb9a3" providerId="LiveId" clId="{5F41118D-A46A-4BCB-B31B-F83832F54457}" dt="2019-10-17T12:25:06.306" v="143" actId="1076"/>
+          <ac:spMkLst>
+            <pc:docMk/>
+            <pc:sldMk cId="2617522827" sldId="259"/>
+            <ac:spMk id="8" creationId="{F49C932E-42CB-401A-B8E1-89A251888411}"/>
+          </ac:spMkLst>
+        </pc:spChg>
+      </pc:sldChg>
+      <pc:sldChg chg="modSp">
+        <pc:chgData name="Andrei Daniel Ivan" userId="d3c4cde5a19fb9a3" providerId="LiveId" clId="{5F41118D-A46A-4BCB-B31B-F83832F54457}" dt="2019-10-17T13:27:09.784" v="283" actId="1076"/>
+        <pc:sldMkLst>
+          <pc:docMk/>
+          <pc:sldMk cId="1889561379" sldId="260"/>
+        </pc:sldMkLst>
+        <pc:spChg chg="mod">
+          <ac:chgData name="Andrei Daniel Ivan" userId="d3c4cde5a19fb9a3" providerId="LiveId" clId="{5F41118D-A46A-4BCB-B31B-F83832F54457}" dt="2019-10-17T13:27:01.020" v="282" actId="255"/>
+          <ac:spMkLst>
+            <pc:docMk/>
+            <pc:sldMk cId="1889561379" sldId="260"/>
+            <ac:spMk id="4" creationId="{86399399-6393-4A4B-8522-F717A489643B}"/>
+          </ac:spMkLst>
+        </pc:spChg>
+        <pc:spChg chg="mod">
+          <ac:chgData name="Andrei Daniel Ivan" userId="d3c4cde5a19fb9a3" providerId="LiveId" clId="{5F41118D-A46A-4BCB-B31B-F83832F54457}" dt="2019-10-17T13:27:09.784" v="283" actId="1076"/>
+          <ac:spMkLst>
+            <pc:docMk/>
+            <pc:sldMk cId="1889561379" sldId="260"/>
+            <ac:spMk id="34" creationId="{4D9E606D-73EC-4A54-9FCE-4DEBEE992671}"/>
+          </ac:spMkLst>
+        </pc:spChg>
+      </pc:sldChg>
+    </pc:docChg>
+  </pc:docChgLst>
+  <pc:docChgLst>
+    <pc:chgData name="Andrei Daniel Ivan" userId="d3c4cde5a19fb9a3" providerId="LiveId" clId="{43CC9881-2FEC-47B1-AC96-5220636F8AE5}"/>
+    <pc:docChg chg="undo custSel addSld delSld modSld sldOrd">
+      <pc:chgData name="Andrei Daniel Ivan" userId="d3c4cde5a19fb9a3" providerId="LiveId" clId="{43CC9881-2FEC-47B1-AC96-5220636F8AE5}" dt="2019-10-28T15:41:48.884" v="885" actId="20577"/>
+      <pc:docMkLst>
+        <pc:docMk/>
+      </pc:docMkLst>
+      <pc:sldChg chg="ord">
+        <pc:chgData name="Andrei Daniel Ivan" userId="d3c4cde5a19fb9a3" providerId="LiveId" clId="{43CC9881-2FEC-47B1-AC96-5220636F8AE5}" dt="2019-10-28T15:28:17.940" v="203"/>
+        <pc:sldMkLst>
+          <pc:docMk/>
+          <pc:sldMk cId="1263132891" sldId="265"/>
+        </pc:sldMkLst>
+      </pc:sldChg>
+      <pc:sldChg chg="addSp delSp modSp add del">
+        <pc:chgData name="Andrei Daniel Ivan" userId="d3c4cde5a19fb9a3" providerId="LiveId" clId="{43CC9881-2FEC-47B1-AC96-5220636F8AE5}" dt="2019-10-28T15:20:18.303" v="4" actId="2696"/>
+        <pc:sldMkLst>
+          <pc:docMk/>
+          <pc:sldMk cId="247021631" sldId="268"/>
+        </pc:sldMkLst>
+        <pc:spChg chg="del">
+          <ac:chgData name="Andrei Daniel Ivan" userId="d3c4cde5a19fb9a3" providerId="LiveId" clId="{43CC9881-2FEC-47B1-AC96-5220636F8AE5}" dt="2019-10-28T15:19:46.562" v="1" actId="478"/>
+          <ac:spMkLst>
+            <pc:docMk/>
+            <pc:sldMk cId="247021631" sldId="268"/>
+            <ac:spMk id="4" creationId="{53201F81-8510-4C74-BAB4-1DBFEB2D3B79}"/>
+          </ac:spMkLst>
+        </pc:spChg>
+        <pc:spChg chg="add mod">
+          <ac:chgData name="Andrei Daniel Ivan" userId="d3c4cde5a19fb9a3" providerId="LiveId" clId="{43CC9881-2FEC-47B1-AC96-5220636F8AE5}" dt="2019-10-28T15:20:05.887" v="3"/>
+          <ac:spMkLst>
+            <pc:docMk/>
+            <pc:sldMk cId="247021631" sldId="268"/>
+            <ac:spMk id="5" creationId="{C2DEA1E2-8272-4188-9D3B-D540F5E3A6EB}"/>
+          </ac:spMkLst>
+        </pc:spChg>
+      </pc:sldChg>
+      <pc:sldChg chg="addSp delSp modSp add">
+        <pc:chgData name="Andrei Daniel Ivan" userId="d3c4cde5a19fb9a3" providerId="LiveId" clId="{43CC9881-2FEC-47B1-AC96-5220636F8AE5}" dt="2019-10-28T15:35:31.051" v="450" actId="14100"/>
+        <pc:sldMkLst>
+          <pc:docMk/>
+          <pc:sldMk cId="3834406972" sldId="268"/>
+        </pc:sldMkLst>
+        <pc:spChg chg="mod">
+          <ac:chgData name="Andrei Daniel Ivan" userId="d3c4cde5a19fb9a3" providerId="LiveId" clId="{43CC9881-2FEC-47B1-AC96-5220636F8AE5}" dt="2019-10-28T15:25:43.552" v="192" actId="20577"/>
+          <ac:spMkLst>
+            <pc:docMk/>
+            <pc:sldMk cId="3834406972" sldId="268"/>
+            <ac:spMk id="2" creationId="{F1DDE7A4-1A5F-4F0D-B842-7798EDC6EDA8}"/>
+          </ac:spMkLst>
+        </pc:spChg>
+        <pc:spChg chg="del">
+          <ac:chgData name="Andrei Daniel Ivan" userId="d3c4cde5a19fb9a3" providerId="LiveId" clId="{43CC9881-2FEC-47B1-AC96-5220636F8AE5}" dt="2019-10-28T15:21:39.397" v="10" actId="478"/>
+          <ac:spMkLst>
+            <pc:docMk/>
+            <pc:sldMk cId="3834406972" sldId="268"/>
+            <ac:spMk id="4" creationId="{53201F81-8510-4C74-BAB4-1DBFEB2D3B79}"/>
+          </ac:spMkLst>
+        </pc:spChg>
+        <pc:spChg chg="add mod">
+          <ac:chgData name="Andrei Daniel Ivan" userId="d3c4cde5a19fb9a3" providerId="LiveId" clId="{43CC9881-2FEC-47B1-AC96-5220636F8AE5}" dt="2019-10-28T15:32:30.092" v="204" actId="20577"/>
+          <ac:spMkLst>
+            <pc:docMk/>
+            <pc:sldMk cId="3834406972" sldId="268"/>
+            <ac:spMk id="5" creationId="{16613504-0E07-4823-8604-71855244FD7C}"/>
+          </ac:spMkLst>
+        </pc:spChg>
+        <pc:spChg chg="add mod">
+          <ac:chgData name="Andrei Daniel Ivan" userId="d3c4cde5a19fb9a3" providerId="LiveId" clId="{43CC9881-2FEC-47B1-AC96-5220636F8AE5}" dt="2019-10-28T15:35:31.051" v="450" actId="14100"/>
+          <ac:spMkLst>
+            <pc:docMk/>
+            <pc:sldMk cId="3834406972" sldId="268"/>
+            <ac:spMk id="6" creationId="{D05C6D4C-6676-4E9C-880E-E4180C031C74}"/>
+          </ac:spMkLst>
+        </pc:spChg>
+      </pc:sldChg>
+      <pc:sldChg chg="addSp modSp add">
+        <pc:chgData name="Andrei Daniel Ivan" userId="d3c4cde5a19fb9a3" providerId="LiveId" clId="{43CC9881-2FEC-47B1-AC96-5220636F8AE5}" dt="2019-10-28T15:40:14.507" v="841" actId="14100"/>
+        <pc:sldMkLst>
+          <pc:docMk/>
+          <pc:sldMk cId="1629653739" sldId="269"/>
+        </pc:sldMkLst>
+        <pc:spChg chg="mod">
+          <ac:chgData name="Andrei Daniel Ivan" userId="d3c4cde5a19fb9a3" providerId="LiveId" clId="{43CC9881-2FEC-47B1-AC96-5220636F8AE5}" dt="2019-10-28T15:26:34.411" v="195" actId="20577"/>
+          <ac:spMkLst>
+            <pc:docMk/>
+            <pc:sldMk cId="1629653739" sldId="269"/>
+            <ac:spMk id="2" creationId="{F1DDE7A4-1A5F-4F0D-B842-7798EDC6EDA8}"/>
+          </ac:spMkLst>
+        </pc:spChg>
+        <pc:spChg chg="add mod">
+          <ac:chgData name="Andrei Daniel Ivan" userId="d3c4cde5a19fb9a3" providerId="LiveId" clId="{43CC9881-2FEC-47B1-AC96-5220636F8AE5}" dt="2019-10-28T15:40:14.507" v="841" actId="14100"/>
+          <ac:spMkLst>
+            <pc:docMk/>
+            <pc:sldMk cId="1629653739" sldId="269"/>
+            <ac:spMk id="4" creationId="{3142C27D-66B6-4EC5-B175-799DACA0D343}"/>
+          </ac:spMkLst>
+        </pc:spChg>
+        <pc:spChg chg="mod">
+          <ac:chgData name="Andrei Daniel Ivan" userId="d3c4cde5a19fb9a3" providerId="LiveId" clId="{43CC9881-2FEC-47B1-AC96-5220636F8AE5}" dt="2019-10-28T15:28:02.796" v="202" actId="2710"/>
+          <ac:spMkLst>
+            <pc:docMk/>
+            <pc:sldMk cId="1629653739" sldId="269"/>
+            <ac:spMk id="5" creationId="{16613504-0E07-4823-8604-71855244FD7C}"/>
+          </ac:spMkLst>
+        </pc:spChg>
+      </pc:sldChg>
+      <pc:sldChg chg="modSp add ord">
+        <pc:chgData name="Andrei Daniel Ivan" userId="d3c4cde5a19fb9a3" providerId="LiveId" clId="{43CC9881-2FEC-47B1-AC96-5220636F8AE5}" dt="2019-10-28T15:41:48.884" v="885" actId="20577"/>
+        <pc:sldMkLst>
+          <pc:docMk/>
+          <pc:sldMk cId="234433866" sldId="270"/>
+        </pc:sldMkLst>
+        <pc:spChg chg="mod">
+          <ac:chgData name="Andrei Daniel Ivan" userId="d3c4cde5a19fb9a3" providerId="LiveId" clId="{43CC9881-2FEC-47B1-AC96-5220636F8AE5}" dt="2019-10-28T15:41:48.884" v="885" actId="20577"/>
+          <ac:spMkLst>
+            <pc:docMk/>
+            <pc:sldMk cId="234433866" sldId="270"/>
+            <ac:spMk id="2" creationId="{F1DDE7A4-1A5F-4F0D-B842-7798EDC6EDA8}"/>
           </ac:spMkLst>
         </pc:spChg>
       </pc:sldChg>
@@ -1202,7 +1329,7 @@
           <a:p>
             <a:fld id="{227EB8F9-9849-4F1B-8247-B2B87148EF6E}" type="datetimeFigureOut">
               <a:rPr lang="it-IT" smtClean="0"/>
-              <a:t>26/10/2019</a:t>
+              <a:t>28/10/2019</a:t>
             </a:fld>
             <a:endParaRPr lang="it-IT"/>
           </a:p>
@@ -1600,7 +1727,7 @@
           <a:p>
             <a:fld id="{519C5307-3A56-4F91-8FB2-60E4C7C3FF23}" type="datetime1">
               <a:rPr lang="it-IT" smtClean="0"/>
-              <a:t>26/10/2019</a:t>
+              <a:t>28/10/2019</a:t>
             </a:fld>
             <a:endParaRPr lang="it-IT"/>
           </a:p>
@@ -1771,7 +1898,7 @@
           <a:p>
             <a:fld id="{519C5307-3A56-4F91-8FB2-60E4C7C3FF23}" type="datetime1">
               <a:rPr lang="it-IT" smtClean="0"/>
-              <a:t>26/10/2019</a:t>
+              <a:t>28/10/2019</a:t>
             </a:fld>
             <a:endParaRPr lang="it-IT"/>
           </a:p>
@@ -1952,7 +2079,7 @@
           <a:p>
             <a:fld id="{519C5307-3A56-4F91-8FB2-60E4C7C3FF23}" type="datetime1">
               <a:rPr lang="it-IT" smtClean="0"/>
-              <a:t>26/10/2019</a:t>
+              <a:t>28/10/2019</a:t>
             </a:fld>
             <a:endParaRPr lang="it-IT"/>
           </a:p>
@@ -2123,7 +2250,7 @@
           <a:p>
             <a:fld id="{519C5307-3A56-4F91-8FB2-60E4C7C3FF23}" type="datetime1">
               <a:rPr lang="it-IT" smtClean="0"/>
-              <a:t>26/10/2019</a:t>
+              <a:t>28/10/2019</a:t>
             </a:fld>
             <a:endParaRPr lang="it-IT"/>
           </a:p>
@@ -2370,7 +2497,7 @@
           <a:p>
             <a:fld id="{519C5307-3A56-4F91-8FB2-60E4C7C3FF23}" type="datetime1">
               <a:rPr lang="it-IT" smtClean="0"/>
-              <a:t>26/10/2019</a:t>
+              <a:t>28/10/2019</a:t>
             </a:fld>
             <a:endParaRPr lang="it-IT"/>
           </a:p>
@@ -2603,7 +2730,7 @@
           <a:p>
             <a:fld id="{519C5307-3A56-4F91-8FB2-60E4C7C3FF23}" type="datetime1">
               <a:rPr lang="it-IT" smtClean="0"/>
-              <a:t>26/10/2019</a:t>
+              <a:t>28/10/2019</a:t>
             </a:fld>
             <a:endParaRPr lang="it-IT"/>
           </a:p>
@@ -2971,7 +3098,7 @@
           <a:p>
             <a:fld id="{519C5307-3A56-4F91-8FB2-60E4C7C3FF23}" type="datetime1">
               <a:rPr lang="it-IT" smtClean="0"/>
-              <a:t>26/10/2019</a:t>
+              <a:t>28/10/2019</a:t>
             </a:fld>
             <a:endParaRPr lang="it-IT"/>
           </a:p>
@@ -3090,7 +3217,7 @@
           <a:p>
             <a:fld id="{519C5307-3A56-4F91-8FB2-60E4C7C3FF23}" type="datetime1">
               <a:rPr lang="it-IT" smtClean="0"/>
-              <a:t>26/10/2019</a:t>
+              <a:t>28/10/2019</a:t>
             </a:fld>
             <a:endParaRPr lang="it-IT"/>
           </a:p>
@@ -3186,7 +3313,7 @@
           <a:p>
             <a:fld id="{519C5307-3A56-4F91-8FB2-60E4C7C3FF23}" type="datetime1">
               <a:rPr lang="it-IT" smtClean="0"/>
-              <a:t>26/10/2019</a:t>
+              <a:t>28/10/2019</a:t>
             </a:fld>
             <a:endParaRPr lang="it-IT"/>
           </a:p>
@@ -3464,7 +3591,7 @@
           <a:p>
             <a:fld id="{519C5307-3A56-4F91-8FB2-60E4C7C3FF23}" type="datetime1">
               <a:rPr lang="it-IT" smtClean="0"/>
-              <a:t>26/10/2019</a:t>
+              <a:t>28/10/2019</a:t>
             </a:fld>
             <a:endParaRPr lang="it-IT"/>
           </a:p>
@@ -3722,7 +3849,7 @@
           <a:p>
             <a:fld id="{519C5307-3A56-4F91-8FB2-60E4C7C3FF23}" type="datetime1">
               <a:rPr lang="it-IT" smtClean="0"/>
-              <a:t>26/10/2019</a:t>
+              <a:t>28/10/2019</a:t>
             </a:fld>
             <a:endParaRPr lang="it-IT"/>
           </a:p>
@@ -3936,7 +4063,7 @@
           <a:p>
             <a:fld id="{519C5307-3A56-4F91-8FB2-60E4C7C3FF23}" type="datetime1">
               <a:rPr lang="it-IT" smtClean="0"/>
-              <a:t>26/10/2019</a:t>
+              <a:t>28/10/2019</a:t>
             </a:fld>
             <a:endParaRPr lang="it-IT"/>
           </a:p>
@@ -5344,7 +5471,7 @@
         </p:nvSpPr>
         <p:spPr>
           <a:xfrm>
-            <a:off x="4814277" y="5631184"/>
+            <a:off x="4819974" y="5631184"/>
             <a:ext cx="4306628" cy="307777"/>
           </a:xfrm>
           <a:prstGeom prst="rect">
@@ -5441,7 +5568,7 @@
                 </a:solidFill>
                 <a:latin typeface="Avenir Next LT Pro Light" panose="020B0304020202020204" pitchFamily="34" charset="0"/>
               </a:rPr>
-              <a:t>Schema C/S con connessione (UDP)</a:t>
+              <a:t>Codice Client UDP (1)</a:t>
             </a:r>
           </a:p>
         </p:txBody>
@@ -5475,6 +5602,3616 @@
           </a:p>
         </p:txBody>
       </p:sp>
+      <p:sp>
+        <p:nvSpPr>
+          <p:cNvPr id="5" name="CasellaDiTesto 4">
+            <a:extLst>
+              <a:ext uri="{FF2B5EF4-FFF2-40B4-BE49-F238E27FC236}">
+                <a16:creationId xmlns:a16="http://schemas.microsoft.com/office/drawing/2014/main" id="{16613504-0E07-4823-8604-71855244FD7C}"/>
+              </a:ext>
+            </a:extLst>
+          </p:cNvPr>
+          <p:cNvSpPr txBox="1"/>
+          <p:nvPr/>
+        </p:nvSpPr>
+        <p:spPr>
+          <a:xfrm>
+            <a:off x="503280" y="1171324"/>
+            <a:ext cx="11155320" cy="5048626"/>
+          </a:xfrm>
+          <a:prstGeom prst="rect">
+            <a:avLst/>
+          </a:prstGeom>
+          <a:noFill/>
+        </p:spPr>
+        <p:txBody>
+          <a:bodyPr wrap="square" rtlCol="0">
+            <a:spAutoFit/>
+          </a:bodyPr>
+          <a:lstStyle/>
+          <a:p>
+            <a:pPr>
+              <a:lnSpc>
+                <a:spcPct val="150000"/>
+              </a:lnSpc>
+              <a:spcAft>
+                <a:spcPts val="0"/>
+              </a:spcAft>
+            </a:pPr>
+            <a:r>
+              <a:rPr lang="it-IT" sz="1200" dirty="0" err="1">
+                <a:solidFill>
+                  <a:srgbClr val="DCDCAA"/>
+                </a:solidFill>
+                <a:latin typeface="Consolas" panose="020B0609020204030204" pitchFamily="49" charset="0"/>
+                <a:ea typeface="Times New Roman" panose="02020603050405020304" pitchFamily="18" charset="0"/>
+                <a:cs typeface="Times New Roman" panose="02020603050405020304" pitchFamily="18" charset="0"/>
+              </a:rPr>
+              <a:t>printf</a:t>
+            </a:r>
+            <a:r>
+              <a:rPr lang="it-IT" sz="1200" dirty="0">
+                <a:solidFill>
+                  <a:srgbClr val="D4D4D4"/>
+                </a:solidFill>
+                <a:latin typeface="Consolas" panose="020B0609020204030204" pitchFamily="49" charset="0"/>
+                <a:ea typeface="Times New Roman" panose="02020603050405020304" pitchFamily="18" charset="0"/>
+                <a:cs typeface="Times New Roman" panose="02020603050405020304" pitchFamily="18" charset="0"/>
+              </a:rPr>
+              <a:t>(</a:t>
+            </a:r>
+            <a:r>
+              <a:rPr lang="it-IT" sz="1200" dirty="0">
+                <a:solidFill>
+                  <a:srgbClr val="CE9178"/>
+                </a:solidFill>
+                <a:latin typeface="Consolas" panose="020B0609020204030204" pitchFamily="49" charset="0"/>
+                <a:ea typeface="Times New Roman" panose="02020603050405020304" pitchFamily="18" charset="0"/>
+                <a:cs typeface="Times New Roman" panose="02020603050405020304" pitchFamily="18" charset="0"/>
+              </a:rPr>
+              <a:t>"Inserire il nome di un file o EOF (CTRL + D) per terminare: "</a:t>
+            </a:r>
+            <a:r>
+              <a:rPr lang="it-IT" sz="1200" dirty="0">
+                <a:solidFill>
+                  <a:srgbClr val="D4D4D4"/>
+                </a:solidFill>
+                <a:latin typeface="Consolas" panose="020B0609020204030204" pitchFamily="49" charset="0"/>
+                <a:ea typeface="Times New Roman" panose="02020603050405020304" pitchFamily="18" charset="0"/>
+                <a:cs typeface="Times New Roman" panose="02020603050405020304" pitchFamily="18" charset="0"/>
+              </a:rPr>
+              <a:t>);</a:t>
+            </a:r>
+            <a:endParaRPr lang="it-IT" sz="1200" dirty="0">
+              <a:solidFill>
+                <a:srgbClr val="C586C0"/>
+              </a:solidFill>
+              <a:latin typeface="Consolas" panose="020B0609020204030204" pitchFamily="49" charset="0"/>
+              <a:ea typeface="Times New Roman" panose="02020603050405020304" pitchFamily="18" charset="0"/>
+              <a:cs typeface="Times New Roman" panose="02020603050405020304" pitchFamily="18" charset="0"/>
+            </a:endParaRPr>
+          </a:p>
+          <a:p>
+            <a:pPr>
+              <a:lnSpc>
+                <a:spcPct val="150000"/>
+              </a:lnSpc>
+              <a:spcAft>
+                <a:spcPts val="0"/>
+              </a:spcAft>
+            </a:pPr>
+            <a:endParaRPr lang="it-IT" sz="1200" dirty="0">
+              <a:solidFill>
+                <a:srgbClr val="C586C0"/>
+              </a:solidFill>
+              <a:latin typeface="Consolas" panose="020B0609020204030204" pitchFamily="49" charset="0"/>
+              <a:ea typeface="Times New Roman" panose="02020603050405020304" pitchFamily="18" charset="0"/>
+              <a:cs typeface="Times New Roman" panose="02020603050405020304" pitchFamily="18" charset="0"/>
+            </a:endParaRPr>
+          </a:p>
+          <a:p>
+            <a:pPr>
+              <a:lnSpc>
+                <a:spcPct val="150000"/>
+              </a:lnSpc>
+              <a:spcAft>
+                <a:spcPts val="0"/>
+              </a:spcAft>
+            </a:pPr>
+            <a:r>
+              <a:rPr lang="it-IT" sz="1200" dirty="0" err="1">
+                <a:solidFill>
+                  <a:srgbClr val="C586C0"/>
+                </a:solidFill>
+                <a:latin typeface="Consolas" panose="020B0609020204030204" pitchFamily="49" charset="0"/>
+                <a:ea typeface="Times New Roman" panose="02020603050405020304" pitchFamily="18" charset="0"/>
+                <a:cs typeface="Times New Roman" panose="02020603050405020304" pitchFamily="18" charset="0"/>
+              </a:rPr>
+              <a:t>while</a:t>
+            </a:r>
+            <a:r>
+              <a:rPr lang="it-IT" sz="1200" dirty="0">
+                <a:solidFill>
+                  <a:srgbClr val="D4D4D4"/>
+                </a:solidFill>
+                <a:latin typeface="Consolas" panose="020B0609020204030204" pitchFamily="49" charset="0"/>
+                <a:ea typeface="Times New Roman" panose="02020603050405020304" pitchFamily="18" charset="0"/>
+                <a:cs typeface="Times New Roman" panose="02020603050405020304" pitchFamily="18" charset="0"/>
+              </a:rPr>
+              <a:t> (</a:t>
+            </a:r>
+            <a:r>
+              <a:rPr lang="it-IT" sz="1200" dirty="0" err="1">
+                <a:solidFill>
+                  <a:srgbClr val="DCDCAA"/>
+                </a:solidFill>
+                <a:latin typeface="Consolas" panose="020B0609020204030204" pitchFamily="49" charset="0"/>
+                <a:ea typeface="Times New Roman" panose="02020603050405020304" pitchFamily="18" charset="0"/>
+                <a:cs typeface="Times New Roman" panose="02020603050405020304" pitchFamily="18" charset="0"/>
+              </a:rPr>
+              <a:t>gets</a:t>
+            </a:r>
+            <a:r>
+              <a:rPr lang="it-IT" sz="1200" dirty="0">
+                <a:solidFill>
+                  <a:srgbClr val="D4D4D4"/>
+                </a:solidFill>
+                <a:latin typeface="Consolas" panose="020B0609020204030204" pitchFamily="49" charset="0"/>
+                <a:ea typeface="Times New Roman" panose="02020603050405020304" pitchFamily="18" charset="0"/>
+                <a:cs typeface="Times New Roman" panose="02020603050405020304" pitchFamily="18" charset="0"/>
+              </a:rPr>
+              <a:t>(</a:t>
+            </a:r>
+            <a:r>
+              <a:rPr lang="it-IT" sz="1200" dirty="0" err="1">
+                <a:solidFill>
+                  <a:srgbClr val="D4D4D4"/>
+                </a:solidFill>
+                <a:latin typeface="Consolas" panose="020B0609020204030204" pitchFamily="49" charset="0"/>
+                <a:ea typeface="Times New Roman" panose="02020603050405020304" pitchFamily="18" charset="0"/>
+                <a:cs typeface="Times New Roman" panose="02020603050405020304" pitchFamily="18" charset="0"/>
+              </a:rPr>
+              <a:t>fileName</a:t>
+            </a:r>
+            <a:r>
+              <a:rPr lang="it-IT" sz="1200" dirty="0">
+                <a:solidFill>
+                  <a:srgbClr val="D4D4D4"/>
+                </a:solidFill>
+                <a:latin typeface="Consolas" panose="020B0609020204030204" pitchFamily="49" charset="0"/>
+                <a:ea typeface="Times New Roman" panose="02020603050405020304" pitchFamily="18" charset="0"/>
+                <a:cs typeface="Times New Roman" panose="02020603050405020304" pitchFamily="18" charset="0"/>
+              </a:rPr>
+              <a:t>)) {</a:t>
+            </a:r>
+            <a:endParaRPr lang="it-IT" sz="1200" dirty="0">
+              <a:latin typeface="Consolas" panose="020B0609020204030204" pitchFamily="49" charset="0"/>
+              <a:ea typeface="Calibri" panose="020F0502020204030204" pitchFamily="34" charset="0"/>
+              <a:cs typeface="Times New Roman" panose="02020603050405020304" pitchFamily="18" charset="0"/>
+            </a:endParaRPr>
+          </a:p>
+          <a:p>
+            <a:pPr>
+              <a:lnSpc>
+                <a:spcPct val="150000"/>
+              </a:lnSpc>
+              <a:spcAft>
+                <a:spcPts val="0"/>
+              </a:spcAft>
+            </a:pPr>
+            <a:r>
+              <a:rPr lang="it-IT" sz="1200" dirty="0">
+                <a:solidFill>
+                  <a:srgbClr val="D4D4D4"/>
+                </a:solidFill>
+                <a:latin typeface="Consolas" panose="020B0609020204030204" pitchFamily="49" charset="0"/>
+                <a:ea typeface="Times New Roman" panose="02020603050405020304" pitchFamily="18" charset="0"/>
+                <a:cs typeface="Times New Roman" panose="02020603050405020304" pitchFamily="18" charset="0"/>
+              </a:rPr>
+              <a:t>        </a:t>
+            </a:r>
+            <a:r>
+              <a:rPr lang="it-IT" sz="1200" dirty="0" err="1">
+                <a:solidFill>
+                  <a:srgbClr val="D4D4D4"/>
+                </a:solidFill>
+                <a:latin typeface="Consolas" panose="020B0609020204030204" pitchFamily="49" charset="0"/>
+                <a:ea typeface="Times New Roman" panose="02020603050405020304" pitchFamily="18" charset="0"/>
+                <a:cs typeface="Times New Roman" panose="02020603050405020304" pitchFamily="18" charset="0"/>
+              </a:rPr>
+              <a:t>nameLength</a:t>
+            </a:r>
+            <a:r>
+              <a:rPr lang="it-IT" sz="1200" dirty="0">
+                <a:solidFill>
+                  <a:srgbClr val="D4D4D4"/>
+                </a:solidFill>
+                <a:latin typeface="Consolas" panose="020B0609020204030204" pitchFamily="49" charset="0"/>
+                <a:ea typeface="Times New Roman" panose="02020603050405020304" pitchFamily="18" charset="0"/>
+                <a:cs typeface="Times New Roman" panose="02020603050405020304" pitchFamily="18" charset="0"/>
+              </a:rPr>
+              <a:t> = </a:t>
+            </a:r>
+            <a:r>
+              <a:rPr lang="it-IT" sz="1200" dirty="0" err="1">
+                <a:solidFill>
+                  <a:srgbClr val="DCDCAA"/>
+                </a:solidFill>
+                <a:latin typeface="Consolas" panose="020B0609020204030204" pitchFamily="49" charset="0"/>
+                <a:ea typeface="Times New Roman" panose="02020603050405020304" pitchFamily="18" charset="0"/>
+                <a:cs typeface="Times New Roman" panose="02020603050405020304" pitchFamily="18" charset="0"/>
+              </a:rPr>
+              <a:t>strlen</a:t>
+            </a:r>
+            <a:r>
+              <a:rPr lang="it-IT" sz="1200" dirty="0">
+                <a:solidFill>
+                  <a:srgbClr val="D4D4D4"/>
+                </a:solidFill>
+                <a:latin typeface="Consolas" panose="020B0609020204030204" pitchFamily="49" charset="0"/>
+                <a:ea typeface="Times New Roman" panose="02020603050405020304" pitchFamily="18" charset="0"/>
+                <a:cs typeface="Times New Roman" panose="02020603050405020304" pitchFamily="18" charset="0"/>
+              </a:rPr>
+              <a:t>(</a:t>
+            </a:r>
+            <a:r>
+              <a:rPr lang="it-IT" sz="1200" dirty="0" err="1">
+                <a:solidFill>
+                  <a:srgbClr val="D4D4D4"/>
+                </a:solidFill>
+                <a:latin typeface="Consolas" panose="020B0609020204030204" pitchFamily="49" charset="0"/>
+                <a:ea typeface="Times New Roman" panose="02020603050405020304" pitchFamily="18" charset="0"/>
+                <a:cs typeface="Times New Roman" panose="02020603050405020304" pitchFamily="18" charset="0"/>
+              </a:rPr>
+              <a:t>fileName</a:t>
+            </a:r>
+            <a:r>
+              <a:rPr lang="it-IT" sz="1200" dirty="0">
+                <a:solidFill>
+                  <a:srgbClr val="D4D4D4"/>
+                </a:solidFill>
+                <a:latin typeface="Consolas" panose="020B0609020204030204" pitchFamily="49" charset="0"/>
+                <a:ea typeface="Times New Roman" panose="02020603050405020304" pitchFamily="18" charset="0"/>
+                <a:cs typeface="Times New Roman" panose="02020603050405020304" pitchFamily="18" charset="0"/>
+              </a:rPr>
+              <a:t>);</a:t>
+            </a:r>
+            <a:endParaRPr lang="it-IT" sz="1200" dirty="0">
+              <a:latin typeface="Consolas" panose="020B0609020204030204" pitchFamily="49" charset="0"/>
+              <a:ea typeface="Calibri" panose="020F0502020204030204" pitchFamily="34" charset="0"/>
+              <a:cs typeface="Times New Roman" panose="02020603050405020304" pitchFamily="18" charset="0"/>
+            </a:endParaRPr>
+          </a:p>
+          <a:p>
+            <a:pPr>
+              <a:lnSpc>
+                <a:spcPct val="150000"/>
+              </a:lnSpc>
+              <a:spcAft>
+                <a:spcPts val="0"/>
+              </a:spcAft>
+            </a:pPr>
+            <a:r>
+              <a:rPr lang="it-IT" sz="1200" dirty="0">
+                <a:solidFill>
+                  <a:srgbClr val="D4D4D4"/>
+                </a:solidFill>
+                <a:latin typeface="Consolas" panose="020B0609020204030204" pitchFamily="49" charset="0"/>
+                <a:ea typeface="Times New Roman" panose="02020603050405020304" pitchFamily="18" charset="0"/>
+                <a:cs typeface="Times New Roman" panose="02020603050405020304" pitchFamily="18" charset="0"/>
+              </a:rPr>
+              <a:t>        </a:t>
+            </a:r>
+            <a:r>
+              <a:rPr lang="it-IT" sz="1200" dirty="0" err="1">
+                <a:solidFill>
+                  <a:srgbClr val="C586C0"/>
+                </a:solidFill>
+                <a:latin typeface="Consolas" panose="020B0609020204030204" pitchFamily="49" charset="0"/>
+                <a:ea typeface="Times New Roman" panose="02020603050405020304" pitchFamily="18" charset="0"/>
+                <a:cs typeface="Times New Roman" panose="02020603050405020304" pitchFamily="18" charset="0"/>
+              </a:rPr>
+              <a:t>if</a:t>
+            </a:r>
+            <a:r>
+              <a:rPr lang="it-IT" sz="1200" dirty="0">
+                <a:solidFill>
+                  <a:srgbClr val="C586C0"/>
+                </a:solidFill>
+                <a:latin typeface="Consolas" panose="020B0609020204030204" pitchFamily="49" charset="0"/>
+                <a:ea typeface="Times New Roman" panose="02020603050405020304" pitchFamily="18" charset="0"/>
+                <a:cs typeface="Times New Roman" panose="02020603050405020304" pitchFamily="18" charset="0"/>
+              </a:rPr>
+              <a:t> </a:t>
+            </a:r>
+            <a:r>
+              <a:rPr lang="it-IT" sz="1200" dirty="0">
+                <a:solidFill>
+                  <a:srgbClr val="D4D4D4"/>
+                </a:solidFill>
+                <a:latin typeface="Consolas" panose="020B0609020204030204" pitchFamily="49" charset="0"/>
+                <a:ea typeface="Times New Roman" panose="02020603050405020304" pitchFamily="18" charset="0"/>
+                <a:cs typeface="Times New Roman" panose="02020603050405020304" pitchFamily="18" charset="0"/>
+              </a:rPr>
+              <a:t>(</a:t>
+            </a:r>
+            <a:r>
+              <a:rPr lang="it-IT" sz="1200" dirty="0" err="1">
+                <a:solidFill>
+                  <a:srgbClr val="D4D4D4"/>
+                </a:solidFill>
+                <a:latin typeface="Consolas" panose="020B0609020204030204" pitchFamily="49" charset="0"/>
+                <a:ea typeface="Times New Roman" panose="02020603050405020304" pitchFamily="18" charset="0"/>
+                <a:cs typeface="Times New Roman" panose="02020603050405020304" pitchFamily="18" charset="0"/>
+              </a:rPr>
+              <a:t>nameLength</a:t>
+            </a:r>
+            <a:r>
+              <a:rPr lang="it-IT" sz="1200" dirty="0">
+                <a:solidFill>
+                  <a:srgbClr val="D4D4D4"/>
+                </a:solidFill>
+                <a:latin typeface="Consolas" panose="020B0609020204030204" pitchFamily="49" charset="0"/>
+                <a:ea typeface="Times New Roman" panose="02020603050405020304" pitchFamily="18" charset="0"/>
+                <a:cs typeface="Times New Roman" panose="02020603050405020304" pitchFamily="18" charset="0"/>
+              </a:rPr>
+              <a:t> &gt; </a:t>
+            </a:r>
+            <a:r>
+              <a:rPr lang="it-IT" sz="1200" dirty="0">
+                <a:solidFill>
+                  <a:srgbClr val="B5CEA8"/>
+                </a:solidFill>
+                <a:latin typeface="Consolas" panose="020B0609020204030204" pitchFamily="49" charset="0"/>
+                <a:ea typeface="Times New Roman" panose="02020603050405020304" pitchFamily="18" charset="0"/>
+                <a:cs typeface="Times New Roman" panose="02020603050405020304" pitchFamily="18" charset="0"/>
+              </a:rPr>
+              <a:t>4</a:t>
+            </a:r>
+            <a:endParaRPr lang="it-IT" sz="1200" dirty="0">
+              <a:latin typeface="Consolas" panose="020B0609020204030204" pitchFamily="49" charset="0"/>
+              <a:ea typeface="Calibri" panose="020F0502020204030204" pitchFamily="34" charset="0"/>
+              <a:cs typeface="Times New Roman" panose="02020603050405020304" pitchFamily="18" charset="0"/>
+            </a:endParaRPr>
+          </a:p>
+          <a:p>
+            <a:pPr>
+              <a:lnSpc>
+                <a:spcPct val="150000"/>
+              </a:lnSpc>
+              <a:spcAft>
+                <a:spcPts val="0"/>
+              </a:spcAft>
+            </a:pPr>
+            <a:r>
+              <a:rPr lang="it-IT" sz="1200" dirty="0">
+                <a:solidFill>
+                  <a:srgbClr val="D4D4D4"/>
+                </a:solidFill>
+                <a:latin typeface="Consolas" panose="020B0609020204030204" pitchFamily="49" charset="0"/>
+                <a:ea typeface="Times New Roman" panose="02020603050405020304" pitchFamily="18" charset="0"/>
+                <a:cs typeface="Times New Roman" panose="02020603050405020304" pitchFamily="18" charset="0"/>
+              </a:rPr>
+              <a:t>            &amp;&amp; </a:t>
+            </a:r>
+            <a:r>
+              <a:rPr lang="it-IT" sz="1200" dirty="0" err="1">
+                <a:solidFill>
+                  <a:srgbClr val="9CDCFE"/>
+                </a:solidFill>
+                <a:latin typeface="Consolas" panose="020B0609020204030204" pitchFamily="49" charset="0"/>
+                <a:ea typeface="Times New Roman" panose="02020603050405020304" pitchFamily="18" charset="0"/>
+                <a:cs typeface="Times New Roman" panose="02020603050405020304" pitchFamily="18" charset="0"/>
+              </a:rPr>
+              <a:t>fileName</a:t>
+            </a:r>
+            <a:r>
+              <a:rPr lang="it-IT" sz="1200" dirty="0">
+                <a:solidFill>
+                  <a:srgbClr val="D4D4D4"/>
+                </a:solidFill>
+                <a:latin typeface="Consolas" panose="020B0609020204030204" pitchFamily="49" charset="0"/>
+                <a:ea typeface="Times New Roman" panose="02020603050405020304" pitchFamily="18" charset="0"/>
+                <a:cs typeface="Times New Roman" panose="02020603050405020304" pitchFamily="18" charset="0"/>
+              </a:rPr>
+              <a:t>[nameLength-</a:t>
+            </a:r>
+            <a:r>
+              <a:rPr lang="it-IT" sz="1200" dirty="0">
+                <a:solidFill>
+                  <a:srgbClr val="B5CEA8"/>
+                </a:solidFill>
+                <a:latin typeface="Consolas" panose="020B0609020204030204" pitchFamily="49" charset="0"/>
+                <a:ea typeface="Times New Roman" panose="02020603050405020304" pitchFamily="18" charset="0"/>
+                <a:cs typeface="Times New Roman" panose="02020603050405020304" pitchFamily="18" charset="0"/>
+              </a:rPr>
+              <a:t>4</a:t>
+            </a:r>
+            <a:r>
+              <a:rPr lang="it-IT" sz="1200" dirty="0">
+                <a:solidFill>
+                  <a:srgbClr val="D4D4D4"/>
+                </a:solidFill>
+                <a:latin typeface="Consolas" panose="020B0609020204030204" pitchFamily="49" charset="0"/>
+                <a:ea typeface="Times New Roman" panose="02020603050405020304" pitchFamily="18" charset="0"/>
+                <a:cs typeface="Times New Roman" panose="02020603050405020304" pitchFamily="18" charset="0"/>
+              </a:rPr>
+              <a:t>] == </a:t>
+            </a:r>
+            <a:r>
+              <a:rPr lang="it-IT" sz="1200" dirty="0">
+                <a:solidFill>
+                  <a:srgbClr val="CE9178"/>
+                </a:solidFill>
+                <a:latin typeface="Consolas" panose="020B0609020204030204" pitchFamily="49" charset="0"/>
+                <a:ea typeface="Times New Roman" panose="02020603050405020304" pitchFamily="18" charset="0"/>
+                <a:cs typeface="Times New Roman" panose="02020603050405020304" pitchFamily="18" charset="0"/>
+              </a:rPr>
+              <a:t>'.'</a:t>
+            </a:r>
+            <a:endParaRPr lang="it-IT" sz="1200" dirty="0">
+              <a:latin typeface="Consolas" panose="020B0609020204030204" pitchFamily="49" charset="0"/>
+              <a:ea typeface="Calibri" panose="020F0502020204030204" pitchFamily="34" charset="0"/>
+              <a:cs typeface="Times New Roman" panose="02020603050405020304" pitchFamily="18" charset="0"/>
+            </a:endParaRPr>
+          </a:p>
+          <a:p>
+            <a:pPr>
+              <a:lnSpc>
+                <a:spcPct val="150000"/>
+              </a:lnSpc>
+              <a:spcAft>
+                <a:spcPts val="0"/>
+              </a:spcAft>
+            </a:pPr>
+            <a:r>
+              <a:rPr lang="it-IT" sz="1200" dirty="0">
+                <a:solidFill>
+                  <a:srgbClr val="D4D4D4"/>
+                </a:solidFill>
+                <a:latin typeface="Consolas" panose="020B0609020204030204" pitchFamily="49" charset="0"/>
+                <a:ea typeface="Times New Roman" panose="02020603050405020304" pitchFamily="18" charset="0"/>
+                <a:cs typeface="Times New Roman" panose="02020603050405020304" pitchFamily="18" charset="0"/>
+              </a:rPr>
+              <a:t>            &amp;&amp; </a:t>
+            </a:r>
+            <a:r>
+              <a:rPr lang="it-IT" sz="1200" dirty="0" err="1">
+                <a:solidFill>
+                  <a:srgbClr val="9CDCFE"/>
+                </a:solidFill>
+                <a:latin typeface="Consolas" panose="020B0609020204030204" pitchFamily="49" charset="0"/>
+                <a:ea typeface="Times New Roman" panose="02020603050405020304" pitchFamily="18" charset="0"/>
+                <a:cs typeface="Times New Roman" panose="02020603050405020304" pitchFamily="18" charset="0"/>
+              </a:rPr>
+              <a:t>fileName</a:t>
+            </a:r>
+            <a:r>
+              <a:rPr lang="it-IT" sz="1200" dirty="0">
+                <a:solidFill>
+                  <a:srgbClr val="D4D4D4"/>
+                </a:solidFill>
+                <a:latin typeface="Consolas" panose="020B0609020204030204" pitchFamily="49" charset="0"/>
+                <a:ea typeface="Times New Roman" panose="02020603050405020304" pitchFamily="18" charset="0"/>
+                <a:cs typeface="Times New Roman" panose="02020603050405020304" pitchFamily="18" charset="0"/>
+              </a:rPr>
+              <a:t>[nameLength-</a:t>
+            </a:r>
+            <a:r>
+              <a:rPr lang="it-IT" sz="1200" dirty="0">
+                <a:solidFill>
+                  <a:srgbClr val="B5CEA8"/>
+                </a:solidFill>
+                <a:latin typeface="Consolas" panose="020B0609020204030204" pitchFamily="49" charset="0"/>
+                <a:ea typeface="Times New Roman" panose="02020603050405020304" pitchFamily="18" charset="0"/>
+                <a:cs typeface="Times New Roman" panose="02020603050405020304" pitchFamily="18" charset="0"/>
+              </a:rPr>
+              <a:t>3</a:t>
+            </a:r>
+            <a:r>
+              <a:rPr lang="it-IT" sz="1200" dirty="0">
+                <a:solidFill>
+                  <a:srgbClr val="D4D4D4"/>
+                </a:solidFill>
+                <a:latin typeface="Consolas" panose="020B0609020204030204" pitchFamily="49" charset="0"/>
+                <a:ea typeface="Times New Roman" panose="02020603050405020304" pitchFamily="18" charset="0"/>
+                <a:cs typeface="Times New Roman" panose="02020603050405020304" pitchFamily="18" charset="0"/>
+              </a:rPr>
+              <a:t>] == </a:t>
+            </a:r>
+            <a:r>
+              <a:rPr lang="it-IT" sz="1200" dirty="0">
+                <a:solidFill>
+                  <a:srgbClr val="CE9178"/>
+                </a:solidFill>
+                <a:latin typeface="Consolas" panose="020B0609020204030204" pitchFamily="49" charset="0"/>
+                <a:ea typeface="Times New Roman" panose="02020603050405020304" pitchFamily="18" charset="0"/>
+                <a:cs typeface="Times New Roman" panose="02020603050405020304" pitchFamily="18" charset="0"/>
+              </a:rPr>
+              <a:t>'t'</a:t>
+            </a:r>
+            <a:endParaRPr lang="it-IT" sz="1200" dirty="0">
+              <a:latin typeface="Consolas" panose="020B0609020204030204" pitchFamily="49" charset="0"/>
+              <a:ea typeface="Calibri" panose="020F0502020204030204" pitchFamily="34" charset="0"/>
+              <a:cs typeface="Times New Roman" panose="02020603050405020304" pitchFamily="18" charset="0"/>
+            </a:endParaRPr>
+          </a:p>
+          <a:p>
+            <a:pPr>
+              <a:lnSpc>
+                <a:spcPct val="150000"/>
+              </a:lnSpc>
+              <a:spcAft>
+                <a:spcPts val="0"/>
+              </a:spcAft>
+            </a:pPr>
+            <a:r>
+              <a:rPr lang="it-IT" sz="1200" dirty="0">
+                <a:solidFill>
+                  <a:srgbClr val="D4D4D4"/>
+                </a:solidFill>
+                <a:latin typeface="Consolas" panose="020B0609020204030204" pitchFamily="49" charset="0"/>
+                <a:ea typeface="Times New Roman" panose="02020603050405020304" pitchFamily="18" charset="0"/>
+                <a:cs typeface="Times New Roman" panose="02020603050405020304" pitchFamily="18" charset="0"/>
+              </a:rPr>
+              <a:t>            &amp;&amp; </a:t>
+            </a:r>
+            <a:r>
+              <a:rPr lang="it-IT" sz="1200" dirty="0" err="1">
+                <a:solidFill>
+                  <a:srgbClr val="9CDCFE"/>
+                </a:solidFill>
+                <a:latin typeface="Consolas" panose="020B0609020204030204" pitchFamily="49" charset="0"/>
+                <a:ea typeface="Times New Roman" panose="02020603050405020304" pitchFamily="18" charset="0"/>
+                <a:cs typeface="Times New Roman" panose="02020603050405020304" pitchFamily="18" charset="0"/>
+              </a:rPr>
+              <a:t>fileName</a:t>
+            </a:r>
+            <a:r>
+              <a:rPr lang="it-IT" sz="1200" dirty="0">
+                <a:solidFill>
+                  <a:srgbClr val="D4D4D4"/>
+                </a:solidFill>
+                <a:latin typeface="Consolas" panose="020B0609020204030204" pitchFamily="49" charset="0"/>
+                <a:ea typeface="Times New Roman" panose="02020603050405020304" pitchFamily="18" charset="0"/>
+                <a:cs typeface="Times New Roman" panose="02020603050405020304" pitchFamily="18" charset="0"/>
+              </a:rPr>
+              <a:t>[nameLength-</a:t>
+            </a:r>
+            <a:r>
+              <a:rPr lang="it-IT" sz="1200" dirty="0">
+                <a:solidFill>
+                  <a:srgbClr val="B5CEA8"/>
+                </a:solidFill>
+                <a:latin typeface="Consolas" panose="020B0609020204030204" pitchFamily="49" charset="0"/>
+                <a:ea typeface="Times New Roman" panose="02020603050405020304" pitchFamily="18" charset="0"/>
+                <a:cs typeface="Times New Roman" panose="02020603050405020304" pitchFamily="18" charset="0"/>
+              </a:rPr>
+              <a:t>2</a:t>
+            </a:r>
+            <a:r>
+              <a:rPr lang="it-IT" sz="1200" dirty="0">
+                <a:solidFill>
+                  <a:srgbClr val="D4D4D4"/>
+                </a:solidFill>
+                <a:latin typeface="Consolas" panose="020B0609020204030204" pitchFamily="49" charset="0"/>
+                <a:ea typeface="Times New Roman" panose="02020603050405020304" pitchFamily="18" charset="0"/>
+                <a:cs typeface="Times New Roman" panose="02020603050405020304" pitchFamily="18" charset="0"/>
+              </a:rPr>
+              <a:t>] == </a:t>
+            </a:r>
+            <a:r>
+              <a:rPr lang="it-IT" sz="1200" dirty="0">
+                <a:solidFill>
+                  <a:srgbClr val="CE9178"/>
+                </a:solidFill>
+                <a:latin typeface="Consolas" panose="020B0609020204030204" pitchFamily="49" charset="0"/>
+                <a:ea typeface="Times New Roman" panose="02020603050405020304" pitchFamily="18" charset="0"/>
+                <a:cs typeface="Times New Roman" panose="02020603050405020304" pitchFamily="18" charset="0"/>
+              </a:rPr>
+              <a:t>'x'</a:t>
+            </a:r>
+            <a:endParaRPr lang="it-IT" sz="1200" dirty="0">
+              <a:latin typeface="Consolas" panose="020B0609020204030204" pitchFamily="49" charset="0"/>
+              <a:ea typeface="Calibri" panose="020F0502020204030204" pitchFamily="34" charset="0"/>
+              <a:cs typeface="Times New Roman" panose="02020603050405020304" pitchFamily="18" charset="0"/>
+            </a:endParaRPr>
+          </a:p>
+          <a:p>
+            <a:pPr>
+              <a:lnSpc>
+                <a:spcPct val="150000"/>
+              </a:lnSpc>
+              <a:spcAft>
+                <a:spcPts val="0"/>
+              </a:spcAft>
+            </a:pPr>
+            <a:r>
+              <a:rPr lang="it-IT" sz="1200" dirty="0">
+                <a:solidFill>
+                  <a:srgbClr val="D4D4D4"/>
+                </a:solidFill>
+                <a:latin typeface="Consolas" panose="020B0609020204030204" pitchFamily="49" charset="0"/>
+                <a:ea typeface="Times New Roman" panose="02020603050405020304" pitchFamily="18" charset="0"/>
+                <a:cs typeface="Times New Roman" panose="02020603050405020304" pitchFamily="18" charset="0"/>
+              </a:rPr>
+              <a:t>            &amp;&amp; </a:t>
+            </a:r>
+            <a:r>
+              <a:rPr lang="it-IT" sz="1200" dirty="0" err="1">
+                <a:solidFill>
+                  <a:srgbClr val="9CDCFE"/>
+                </a:solidFill>
+                <a:latin typeface="Consolas" panose="020B0609020204030204" pitchFamily="49" charset="0"/>
+                <a:ea typeface="Times New Roman" panose="02020603050405020304" pitchFamily="18" charset="0"/>
+                <a:cs typeface="Times New Roman" panose="02020603050405020304" pitchFamily="18" charset="0"/>
+              </a:rPr>
+              <a:t>fileName</a:t>
+            </a:r>
+            <a:r>
+              <a:rPr lang="it-IT" sz="1200" dirty="0">
+                <a:solidFill>
+                  <a:srgbClr val="D4D4D4"/>
+                </a:solidFill>
+                <a:latin typeface="Consolas" panose="020B0609020204030204" pitchFamily="49" charset="0"/>
+                <a:ea typeface="Times New Roman" panose="02020603050405020304" pitchFamily="18" charset="0"/>
+                <a:cs typeface="Times New Roman" panose="02020603050405020304" pitchFamily="18" charset="0"/>
+              </a:rPr>
+              <a:t>[nameLength-</a:t>
+            </a:r>
+            <a:r>
+              <a:rPr lang="it-IT" sz="1200" dirty="0">
+                <a:solidFill>
+                  <a:srgbClr val="B5CEA8"/>
+                </a:solidFill>
+                <a:latin typeface="Consolas" panose="020B0609020204030204" pitchFamily="49" charset="0"/>
+                <a:ea typeface="Times New Roman" panose="02020603050405020304" pitchFamily="18" charset="0"/>
+                <a:cs typeface="Times New Roman" panose="02020603050405020304" pitchFamily="18" charset="0"/>
+              </a:rPr>
+              <a:t>1</a:t>
+            </a:r>
+            <a:r>
+              <a:rPr lang="it-IT" sz="1200" dirty="0">
+                <a:solidFill>
+                  <a:srgbClr val="D4D4D4"/>
+                </a:solidFill>
+                <a:latin typeface="Consolas" panose="020B0609020204030204" pitchFamily="49" charset="0"/>
+                <a:ea typeface="Times New Roman" panose="02020603050405020304" pitchFamily="18" charset="0"/>
+                <a:cs typeface="Times New Roman" panose="02020603050405020304" pitchFamily="18" charset="0"/>
+              </a:rPr>
+              <a:t>] == </a:t>
+            </a:r>
+            <a:r>
+              <a:rPr lang="it-IT" sz="1200" dirty="0">
+                <a:solidFill>
+                  <a:srgbClr val="CE9178"/>
+                </a:solidFill>
+                <a:latin typeface="Consolas" panose="020B0609020204030204" pitchFamily="49" charset="0"/>
+                <a:ea typeface="Times New Roman" panose="02020603050405020304" pitchFamily="18" charset="0"/>
+                <a:cs typeface="Times New Roman" panose="02020603050405020304" pitchFamily="18" charset="0"/>
+              </a:rPr>
+              <a:t>'t'</a:t>
+            </a:r>
+            <a:r>
+              <a:rPr lang="it-IT" sz="1200" dirty="0">
+                <a:solidFill>
+                  <a:srgbClr val="D4D4D4"/>
+                </a:solidFill>
+                <a:latin typeface="Consolas" panose="020B0609020204030204" pitchFamily="49" charset="0"/>
+                <a:ea typeface="Times New Roman" panose="02020603050405020304" pitchFamily="18" charset="0"/>
+                <a:cs typeface="Times New Roman" panose="02020603050405020304" pitchFamily="18" charset="0"/>
+              </a:rPr>
+              <a:t>) {</a:t>
+            </a:r>
+            <a:endParaRPr lang="it-IT" sz="1200" dirty="0">
+              <a:latin typeface="Consolas" panose="020B0609020204030204" pitchFamily="49" charset="0"/>
+              <a:ea typeface="Calibri" panose="020F0502020204030204" pitchFamily="34" charset="0"/>
+              <a:cs typeface="Times New Roman" panose="02020603050405020304" pitchFamily="18" charset="0"/>
+            </a:endParaRPr>
+          </a:p>
+          <a:p>
+            <a:pPr>
+              <a:lnSpc>
+                <a:spcPct val="150000"/>
+              </a:lnSpc>
+              <a:spcAft>
+                <a:spcPts val="0"/>
+              </a:spcAft>
+            </a:pPr>
+            <a:r>
+              <a:rPr lang="it-IT" sz="1200" dirty="0">
+                <a:solidFill>
+                  <a:srgbClr val="D4D4D4"/>
+                </a:solidFill>
+                <a:latin typeface="Consolas" panose="020B0609020204030204" pitchFamily="49" charset="0"/>
+                <a:ea typeface="Times New Roman" panose="02020603050405020304" pitchFamily="18" charset="0"/>
+                <a:cs typeface="Times New Roman" panose="02020603050405020304" pitchFamily="18" charset="0"/>
+              </a:rPr>
+              <a:t> </a:t>
+            </a:r>
+            <a:endParaRPr lang="it-IT" sz="1200" dirty="0">
+              <a:latin typeface="Consolas" panose="020B0609020204030204" pitchFamily="49" charset="0"/>
+              <a:ea typeface="Calibri" panose="020F0502020204030204" pitchFamily="34" charset="0"/>
+              <a:cs typeface="Times New Roman" panose="02020603050405020304" pitchFamily="18" charset="0"/>
+            </a:endParaRPr>
+          </a:p>
+          <a:p>
+            <a:pPr>
+              <a:lnSpc>
+                <a:spcPct val="150000"/>
+              </a:lnSpc>
+              <a:spcAft>
+                <a:spcPts val="0"/>
+              </a:spcAft>
+            </a:pPr>
+            <a:r>
+              <a:rPr lang="it-IT" sz="1200" dirty="0">
+                <a:solidFill>
+                  <a:srgbClr val="D4D4D4"/>
+                </a:solidFill>
+                <a:latin typeface="Consolas" panose="020B0609020204030204" pitchFamily="49" charset="0"/>
+                <a:ea typeface="Times New Roman" panose="02020603050405020304" pitchFamily="18" charset="0"/>
+                <a:cs typeface="Times New Roman" panose="02020603050405020304" pitchFamily="18" charset="0"/>
+              </a:rPr>
+              <a:t>            </a:t>
+            </a:r>
+            <a:r>
+              <a:rPr lang="it-IT" sz="1200" dirty="0">
+                <a:solidFill>
+                  <a:srgbClr val="6A9955"/>
+                </a:solidFill>
+                <a:latin typeface="Consolas" panose="020B0609020204030204" pitchFamily="49" charset="0"/>
+                <a:ea typeface="Times New Roman" panose="02020603050405020304" pitchFamily="18" charset="0"/>
+                <a:cs typeface="Times New Roman" panose="02020603050405020304" pitchFamily="18" charset="0"/>
+              </a:rPr>
+              <a:t>// Copio l'array</a:t>
+            </a:r>
+            <a:endParaRPr lang="it-IT" sz="1200" dirty="0">
+              <a:latin typeface="Consolas" panose="020B0609020204030204" pitchFamily="49" charset="0"/>
+              <a:ea typeface="Calibri" panose="020F0502020204030204" pitchFamily="34" charset="0"/>
+              <a:cs typeface="Times New Roman" panose="02020603050405020304" pitchFamily="18" charset="0"/>
+            </a:endParaRPr>
+          </a:p>
+          <a:p>
+            <a:pPr>
+              <a:lnSpc>
+                <a:spcPct val="150000"/>
+              </a:lnSpc>
+              <a:spcAft>
+                <a:spcPts val="0"/>
+              </a:spcAft>
+            </a:pPr>
+            <a:r>
+              <a:rPr lang="it-IT" sz="1200" dirty="0">
+                <a:solidFill>
+                  <a:srgbClr val="D4D4D4"/>
+                </a:solidFill>
+                <a:latin typeface="Consolas" panose="020B0609020204030204" pitchFamily="49" charset="0"/>
+                <a:ea typeface="Times New Roman" panose="02020603050405020304" pitchFamily="18" charset="0"/>
+                <a:cs typeface="Times New Roman" panose="02020603050405020304" pitchFamily="18" charset="0"/>
+              </a:rPr>
+              <a:t>            </a:t>
+            </a:r>
+            <a:r>
+              <a:rPr lang="it-IT" sz="1200" dirty="0" err="1">
+                <a:solidFill>
+                  <a:srgbClr val="DCDCAA"/>
+                </a:solidFill>
+                <a:latin typeface="Consolas" panose="020B0609020204030204" pitchFamily="49" charset="0"/>
+                <a:ea typeface="Times New Roman" panose="02020603050405020304" pitchFamily="18" charset="0"/>
+                <a:cs typeface="Times New Roman" panose="02020603050405020304" pitchFamily="18" charset="0"/>
+              </a:rPr>
+              <a:t>memcpy</a:t>
+            </a:r>
+            <a:r>
+              <a:rPr lang="it-IT" sz="1200" dirty="0">
+                <a:solidFill>
+                  <a:srgbClr val="D4D4D4"/>
+                </a:solidFill>
+                <a:latin typeface="Consolas" panose="020B0609020204030204" pitchFamily="49" charset="0"/>
+                <a:ea typeface="Times New Roman" panose="02020603050405020304" pitchFamily="18" charset="0"/>
+                <a:cs typeface="Times New Roman" panose="02020603050405020304" pitchFamily="18" charset="0"/>
+              </a:rPr>
+              <a:t>(&amp;(</a:t>
+            </a:r>
+            <a:r>
+              <a:rPr lang="it-IT" sz="1200" dirty="0" err="1">
+                <a:solidFill>
+                  <a:srgbClr val="9CDCFE"/>
+                </a:solidFill>
+                <a:latin typeface="Consolas" panose="020B0609020204030204" pitchFamily="49" charset="0"/>
+                <a:ea typeface="Times New Roman" panose="02020603050405020304" pitchFamily="18" charset="0"/>
+                <a:cs typeface="Times New Roman" panose="02020603050405020304" pitchFamily="18" charset="0"/>
+              </a:rPr>
+              <a:t>request</a:t>
+            </a:r>
+            <a:r>
+              <a:rPr lang="it-IT" sz="1200" dirty="0" err="1">
+                <a:solidFill>
+                  <a:srgbClr val="D4D4D4"/>
+                </a:solidFill>
+                <a:latin typeface="Consolas" panose="020B0609020204030204" pitchFamily="49" charset="0"/>
+                <a:ea typeface="Times New Roman" panose="02020603050405020304" pitchFamily="18" charset="0"/>
+                <a:cs typeface="Times New Roman" panose="02020603050405020304" pitchFamily="18" charset="0"/>
+              </a:rPr>
+              <a:t>.</a:t>
+            </a:r>
+            <a:r>
+              <a:rPr lang="it-IT" sz="1200" dirty="0" err="1">
+                <a:solidFill>
+                  <a:srgbClr val="9CDCFE"/>
+                </a:solidFill>
+                <a:latin typeface="Consolas" panose="020B0609020204030204" pitchFamily="49" charset="0"/>
+                <a:ea typeface="Times New Roman" panose="02020603050405020304" pitchFamily="18" charset="0"/>
+                <a:cs typeface="Times New Roman" panose="02020603050405020304" pitchFamily="18" charset="0"/>
+              </a:rPr>
+              <a:t>file</a:t>
+            </a:r>
+            <a:r>
+              <a:rPr lang="it-IT" sz="1200" dirty="0">
+                <a:solidFill>
+                  <a:srgbClr val="D4D4D4"/>
+                </a:solidFill>
+                <a:latin typeface="Consolas" panose="020B0609020204030204" pitchFamily="49" charset="0"/>
+                <a:ea typeface="Times New Roman" panose="02020603050405020304" pitchFamily="18" charset="0"/>
+                <a:cs typeface="Times New Roman" panose="02020603050405020304" pitchFamily="18" charset="0"/>
+              </a:rPr>
+              <a:t>), &amp;</a:t>
+            </a:r>
+            <a:r>
+              <a:rPr lang="it-IT" sz="1200" dirty="0" err="1">
+                <a:solidFill>
+                  <a:srgbClr val="D4D4D4"/>
+                </a:solidFill>
+                <a:latin typeface="Consolas" panose="020B0609020204030204" pitchFamily="49" charset="0"/>
+                <a:ea typeface="Times New Roman" panose="02020603050405020304" pitchFamily="18" charset="0"/>
+                <a:cs typeface="Times New Roman" panose="02020603050405020304" pitchFamily="18" charset="0"/>
+              </a:rPr>
+              <a:t>fileName</a:t>
+            </a:r>
+            <a:r>
+              <a:rPr lang="it-IT" sz="1200" dirty="0">
+                <a:solidFill>
+                  <a:srgbClr val="D4D4D4"/>
+                </a:solidFill>
+                <a:latin typeface="Consolas" panose="020B0609020204030204" pitchFamily="49" charset="0"/>
+                <a:ea typeface="Times New Roman" panose="02020603050405020304" pitchFamily="18" charset="0"/>
+                <a:cs typeface="Times New Roman" panose="02020603050405020304" pitchFamily="18" charset="0"/>
+              </a:rPr>
+              <a:t>, </a:t>
+            </a:r>
+            <a:r>
+              <a:rPr lang="it-IT" sz="1200" dirty="0" err="1">
+                <a:solidFill>
+                  <a:srgbClr val="569CD6"/>
+                </a:solidFill>
+                <a:latin typeface="Consolas" panose="020B0609020204030204" pitchFamily="49" charset="0"/>
+                <a:ea typeface="Times New Roman" panose="02020603050405020304" pitchFamily="18" charset="0"/>
+                <a:cs typeface="Times New Roman" panose="02020603050405020304" pitchFamily="18" charset="0"/>
+              </a:rPr>
+              <a:t>sizeof</a:t>
+            </a:r>
+            <a:r>
+              <a:rPr lang="it-IT" sz="1200" dirty="0">
+                <a:solidFill>
+                  <a:srgbClr val="D4D4D4"/>
+                </a:solidFill>
+                <a:latin typeface="Consolas" panose="020B0609020204030204" pitchFamily="49" charset="0"/>
+                <a:ea typeface="Times New Roman" panose="02020603050405020304" pitchFamily="18" charset="0"/>
+                <a:cs typeface="Times New Roman" panose="02020603050405020304" pitchFamily="18" charset="0"/>
+              </a:rPr>
+              <a:t>(</a:t>
+            </a:r>
+            <a:r>
+              <a:rPr lang="it-IT" sz="1200" dirty="0" err="1">
+                <a:solidFill>
+                  <a:srgbClr val="9CDCFE"/>
+                </a:solidFill>
+                <a:latin typeface="Consolas" panose="020B0609020204030204" pitchFamily="49" charset="0"/>
+                <a:ea typeface="Times New Roman" panose="02020603050405020304" pitchFamily="18" charset="0"/>
+                <a:cs typeface="Times New Roman" panose="02020603050405020304" pitchFamily="18" charset="0"/>
+              </a:rPr>
+              <a:t>request</a:t>
+            </a:r>
+            <a:r>
+              <a:rPr lang="it-IT" sz="1200" dirty="0" err="1">
+                <a:solidFill>
+                  <a:srgbClr val="D4D4D4"/>
+                </a:solidFill>
+                <a:latin typeface="Consolas" panose="020B0609020204030204" pitchFamily="49" charset="0"/>
+                <a:ea typeface="Times New Roman" panose="02020603050405020304" pitchFamily="18" charset="0"/>
+                <a:cs typeface="Times New Roman" panose="02020603050405020304" pitchFamily="18" charset="0"/>
+              </a:rPr>
+              <a:t>.</a:t>
+            </a:r>
+            <a:r>
+              <a:rPr lang="it-IT" sz="1200" dirty="0" err="1">
+                <a:solidFill>
+                  <a:srgbClr val="9CDCFE"/>
+                </a:solidFill>
+                <a:latin typeface="Consolas" panose="020B0609020204030204" pitchFamily="49" charset="0"/>
+                <a:ea typeface="Times New Roman" panose="02020603050405020304" pitchFamily="18" charset="0"/>
+                <a:cs typeface="Times New Roman" panose="02020603050405020304" pitchFamily="18" charset="0"/>
+              </a:rPr>
+              <a:t>file</a:t>
+            </a:r>
+            <a:r>
+              <a:rPr lang="it-IT" sz="1200" dirty="0">
+                <a:solidFill>
+                  <a:srgbClr val="D4D4D4"/>
+                </a:solidFill>
+                <a:latin typeface="Consolas" panose="020B0609020204030204" pitchFamily="49" charset="0"/>
+                <a:ea typeface="Times New Roman" panose="02020603050405020304" pitchFamily="18" charset="0"/>
+                <a:cs typeface="Times New Roman" panose="02020603050405020304" pitchFamily="18" charset="0"/>
+              </a:rPr>
+              <a:t>));       </a:t>
+            </a:r>
+            <a:endParaRPr lang="it-IT" sz="1200" dirty="0">
+              <a:latin typeface="Consolas" panose="020B0609020204030204" pitchFamily="49" charset="0"/>
+              <a:ea typeface="Calibri" panose="020F0502020204030204" pitchFamily="34" charset="0"/>
+              <a:cs typeface="Times New Roman" panose="02020603050405020304" pitchFamily="18" charset="0"/>
+            </a:endParaRPr>
+          </a:p>
+          <a:p>
+            <a:pPr>
+              <a:lnSpc>
+                <a:spcPct val="150000"/>
+              </a:lnSpc>
+              <a:spcAft>
+                <a:spcPts val="0"/>
+              </a:spcAft>
+            </a:pPr>
+            <a:r>
+              <a:rPr lang="it-IT" sz="1200" dirty="0">
+                <a:solidFill>
+                  <a:srgbClr val="D4D4D4"/>
+                </a:solidFill>
+                <a:latin typeface="Consolas" panose="020B0609020204030204" pitchFamily="49" charset="0"/>
+                <a:ea typeface="Times New Roman" panose="02020603050405020304" pitchFamily="18" charset="0"/>
+                <a:cs typeface="Times New Roman" panose="02020603050405020304" pitchFamily="18" charset="0"/>
+              </a:rPr>
+              <a:t> </a:t>
+            </a:r>
+            <a:endParaRPr lang="it-IT" sz="1200" dirty="0">
+              <a:latin typeface="Consolas" panose="020B0609020204030204" pitchFamily="49" charset="0"/>
+              <a:ea typeface="Calibri" panose="020F0502020204030204" pitchFamily="34" charset="0"/>
+              <a:cs typeface="Times New Roman" panose="02020603050405020304" pitchFamily="18" charset="0"/>
+            </a:endParaRPr>
+          </a:p>
+          <a:p>
+            <a:pPr>
+              <a:lnSpc>
+                <a:spcPct val="150000"/>
+              </a:lnSpc>
+              <a:spcAft>
+                <a:spcPts val="0"/>
+              </a:spcAft>
+            </a:pPr>
+            <a:r>
+              <a:rPr lang="it-IT" sz="1200" dirty="0">
+                <a:solidFill>
+                  <a:srgbClr val="D4D4D4"/>
+                </a:solidFill>
+                <a:latin typeface="Consolas" panose="020B0609020204030204" pitchFamily="49" charset="0"/>
+                <a:ea typeface="Times New Roman" panose="02020603050405020304" pitchFamily="18" charset="0"/>
+                <a:cs typeface="Times New Roman" panose="02020603050405020304" pitchFamily="18" charset="0"/>
+              </a:rPr>
+              <a:t>            </a:t>
+            </a:r>
+            <a:r>
+              <a:rPr lang="it-IT" sz="1200" dirty="0" err="1">
+                <a:solidFill>
+                  <a:srgbClr val="D4D4D4"/>
+                </a:solidFill>
+                <a:latin typeface="Consolas" panose="020B0609020204030204" pitchFamily="49" charset="0"/>
+                <a:ea typeface="Times New Roman" panose="02020603050405020304" pitchFamily="18" charset="0"/>
+                <a:cs typeface="Times New Roman" panose="02020603050405020304" pitchFamily="18" charset="0"/>
+              </a:rPr>
+              <a:t>length</a:t>
+            </a:r>
+            <a:r>
+              <a:rPr lang="it-IT" sz="1200" dirty="0">
+                <a:solidFill>
+                  <a:srgbClr val="D4D4D4"/>
+                </a:solidFill>
+                <a:latin typeface="Consolas" panose="020B0609020204030204" pitchFamily="49" charset="0"/>
+                <a:ea typeface="Times New Roman" panose="02020603050405020304" pitchFamily="18" charset="0"/>
+                <a:cs typeface="Times New Roman" panose="02020603050405020304" pitchFamily="18" charset="0"/>
+              </a:rPr>
+              <a:t> = </a:t>
+            </a:r>
+            <a:r>
+              <a:rPr lang="it-IT" sz="1200" dirty="0" err="1">
+                <a:solidFill>
+                  <a:srgbClr val="569CD6"/>
+                </a:solidFill>
+                <a:latin typeface="Consolas" panose="020B0609020204030204" pitchFamily="49" charset="0"/>
+                <a:ea typeface="Times New Roman" panose="02020603050405020304" pitchFamily="18" charset="0"/>
+                <a:cs typeface="Times New Roman" panose="02020603050405020304" pitchFamily="18" charset="0"/>
+              </a:rPr>
+              <a:t>sizeof</a:t>
+            </a:r>
+            <a:r>
+              <a:rPr lang="it-IT" sz="1200" dirty="0">
+                <a:solidFill>
+                  <a:srgbClr val="D4D4D4"/>
+                </a:solidFill>
+                <a:latin typeface="Consolas" panose="020B0609020204030204" pitchFamily="49" charset="0"/>
+                <a:ea typeface="Times New Roman" panose="02020603050405020304" pitchFamily="18" charset="0"/>
+                <a:cs typeface="Times New Roman" panose="02020603050405020304" pitchFamily="18" charset="0"/>
+              </a:rPr>
+              <a:t>(</a:t>
+            </a:r>
+            <a:r>
+              <a:rPr lang="it-IT" sz="1200" dirty="0" err="1">
+                <a:solidFill>
+                  <a:srgbClr val="D4D4D4"/>
+                </a:solidFill>
+                <a:latin typeface="Consolas" panose="020B0609020204030204" pitchFamily="49" charset="0"/>
+                <a:ea typeface="Times New Roman" panose="02020603050405020304" pitchFamily="18" charset="0"/>
+                <a:cs typeface="Times New Roman" panose="02020603050405020304" pitchFamily="18" charset="0"/>
+              </a:rPr>
+              <a:t>servaddr</a:t>
+            </a:r>
+            <a:r>
+              <a:rPr lang="it-IT" sz="1200" dirty="0">
+                <a:solidFill>
+                  <a:srgbClr val="D4D4D4"/>
+                </a:solidFill>
+                <a:latin typeface="Consolas" panose="020B0609020204030204" pitchFamily="49" charset="0"/>
+                <a:ea typeface="Times New Roman" panose="02020603050405020304" pitchFamily="18" charset="0"/>
+                <a:cs typeface="Times New Roman" panose="02020603050405020304" pitchFamily="18" charset="0"/>
+              </a:rPr>
+              <a:t>);</a:t>
+            </a:r>
+            <a:endParaRPr lang="it-IT" sz="1200" dirty="0">
+              <a:latin typeface="Consolas" panose="020B0609020204030204" pitchFamily="49" charset="0"/>
+              <a:ea typeface="Calibri" panose="020F0502020204030204" pitchFamily="34" charset="0"/>
+              <a:cs typeface="Times New Roman" panose="02020603050405020304" pitchFamily="18" charset="0"/>
+            </a:endParaRPr>
+          </a:p>
+          <a:p>
+            <a:pPr>
+              <a:lnSpc>
+                <a:spcPct val="150000"/>
+              </a:lnSpc>
+              <a:spcAft>
+                <a:spcPts val="0"/>
+              </a:spcAft>
+            </a:pPr>
+            <a:r>
+              <a:rPr lang="it-IT" sz="1200" dirty="0">
+                <a:solidFill>
+                  <a:srgbClr val="D4D4D4"/>
+                </a:solidFill>
+                <a:latin typeface="Consolas" panose="020B0609020204030204" pitchFamily="49" charset="0"/>
+                <a:ea typeface="Times New Roman" panose="02020603050405020304" pitchFamily="18" charset="0"/>
+                <a:cs typeface="Times New Roman" panose="02020603050405020304" pitchFamily="18" charset="0"/>
+              </a:rPr>
+              <a:t>            </a:t>
+            </a:r>
+            <a:r>
+              <a:rPr lang="it-IT" sz="1200" dirty="0" err="1">
+                <a:solidFill>
+                  <a:srgbClr val="C586C0"/>
+                </a:solidFill>
+                <a:latin typeface="Consolas" panose="020B0609020204030204" pitchFamily="49" charset="0"/>
+                <a:ea typeface="Times New Roman" panose="02020603050405020304" pitchFamily="18" charset="0"/>
+                <a:cs typeface="Times New Roman" panose="02020603050405020304" pitchFamily="18" charset="0"/>
+              </a:rPr>
+              <a:t>if</a:t>
+            </a:r>
+            <a:r>
+              <a:rPr lang="it-IT" sz="1200" dirty="0">
+                <a:solidFill>
+                  <a:srgbClr val="D4D4D4"/>
+                </a:solidFill>
+                <a:latin typeface="Consolas" panose="020B0609020204030204" pitchFamily="49" charset="0"/>
+                <a:ea typeface="Times New Roman" panose="02020603050405020304" pitchFamily="18" charset="0"/>
+                <a:cs typeface="Times New Roman" panose="02020603050405020304" pitchFamily="18" charset="0"/>
+              </a:rPr>
+              <a:t> (</a:t>
+            </a:r>
+            <a:r>
+              <a:rPr lang="it-IT" sz="1200" dirty="0" err="1">
+                <a:solidFill>
+                  <a:srgbClr val="DCDCAA"/>
+                </a:solidFill>
+                <a:latin typeface="Consolas" panose="020B0609020204030204" pitchFamily="49" charset="0"/>
+                <a:ea typeface="Times New Roman" panose="02020603050405020304" pitchFamily="18" charset="0"/>
+                <a:cs typeface="Times New Roman" panose="02020603050405020304" pitchFamily="18" charset="0"/>
+              </a:rPr>
+              <a:t>sendto</a:t>
+            </a:r>
+            <a:r>
+              <a:rPr lang="it-IT" sz="1200" dirty="0">
+                <a:solidFill>
+                  <a:srgbClr val="D4D4D4"/>
+                </a:solidFill>
+                <a:latin typeface="Consolas" panose="020B0609020204030204" pitchFamily="49" charset="0"/>
+                <a:ea typeface="Times New Roman" panose="02020603050405020304" pitchFamily="18" charset="0"/>
+                <a:cs typeface="Times New Roman" panose="02020603050405020304" pitchFamily="18" charset="0"/>
+              </a:rPr>
+              <a:t>(</a:t>
+            </a:r>
+            <a:r>
+              <a:rPr lang="it-IT" sz="1200" dirty="0" err="1">
+                <a:solidFill>
+                  <a:srgbClr val="D4D4D4"/>
+                </a:solidFill>
+                <a:latin typeface="Consolas" panose="020B0609020204030204" pitchFamily="49" charset="0"/>
+                <a:ea typeface="Times New Roman" panose="02020603050405020304" pitchFamily="18" charset="0"/>
+                <a:cs typeface="Times New Roman" panose="02020603050405020304" pitchFamily="18" charset="0"/>
+              </a:rPr>
+              <a:t>socketDescriptor</a:t>
+            </a:r>
+            <a:r>
+              <a:rPr lang="it-IT" sz="1200" dirty="0">
+                <a:solidFill>
+                  <a:srgbClr val="D4D4D4"/>
+                </a:solidFill>
+                <a:latin typeface="Consolas" panose="020B0609020204030204" pitchFamily="49" charset="0"/>
+                <a:ea typeface="Times New Roman" panose="02020603050405020304" pitchFamily="18" charset="0"/>
+                <a:cs typeface="Times New Roman" panose="02020603050405020304" pitchFamily="18" charset="0"/>
+              </a:rPr>
+              <a:t>, &amp;</a:t>
+            </a:r>
+            <a:r>
+              <a:rPr lang="it-IT" sz="1200" dirty="0" err="1">
+                <a:solidFill>
+                  <a:srgbClr val="D4D4D4"/>
+                </a:solidFill>
+                <a:latin typeface="Consolas" panose="020B0609020204030204" pitchFamily="49" charset="0"/>
+                <a:ea typeface="Times New Roman" panose="02020603050405020304" pitchFamily="18" charset="0"/>
+                <a:cs typeface="Times New Roman" panose="02020603050405020304" pitchFamily="18" charset="0"/>
+              </a:rPr>
+              <a:t>request</a:t>
+            </a:r>
+            <a:r>
+              <a:rPr lang="it-IT" sz="1200" dirty="0">
+                <a:solidFill>
+                  <a:srgbClr val="D4D4D4"/>
+                </a:solidFill>
+                <a:latin typeface="Consolas" panose="020B0609020204030204" pitchFamily="49" charset="0"/>
+                <a:ea typeface="Times New Roman" panose="02020603050405020304" pitchFamily="18" charset="0"/>
+                <a:cs typeface="Times New Roman" panose="02020603050405020304" pitchFamily="18" charset="0"/>
+              </a:rPr>
+              <a:t>, </a:t>
+            </a:r>
+            <a:r>
+              <a:rPr lang="it-IT" sz="1200" dirty="0" err="1">
+                <a:solidFill>
+                  <a:srgbClr val="569CD6"/>
+                </a:solidFill>
+                <a:latin typeface="Consolas" panose="020B0609020204030204" pitchFamily="49" charset="0"/>
+                <a:ea typeface="Times New Roman" panose="02020603050405020304" pitchFamily="18" charset="0"/>
+                <a:cs typeface="Times New Roman" panose="02020603050405020304" pitchFamily="18" charset="0"/>
+              </a:rPr>
+              <a:t>sizeof</a:t>
+            </a:r>
+            <a:r>
+              <a:rPr lang="it-IT" sz="1200" dirty="0">
+                <a:solidFill>
+                  <a:srgbClr val="D4D4D4"/>
+                </a:solidFill>
+                <a:latin typeface="Consolas" panose="020B0609020204030204" pitchFamily="49" charset="0"/>
+                <a:ea typeface="Times New Roman" panose="02020603050405020304" pitchFamily="18" charset="0"/>
+                <a:cs typeface="Times New Roman" panose="02020603050405020304" pitchFamily="18" charset="0"/>
+              </a:rPr>
+              <a:t>(</a:t>
+            </a:r>
+            <a:r>
+              <a:rPr lang="it-IT" sz="1200" dirty="0" err="1">
+                <a:solidFill>
+                  <a:srgbClr val="D4D4D4"/>
+                </a:solidFill>
+                <a:latin typeface="Consolas" panose="020B0609020204030204" pitchFamily="49" charset="0"/>
+                <a:ea typeface="Times New Roman" panose="02020603050405020304" pitchFamily="18" charset="0"/>
+                <a:cs typeface="Times New Roman" panose="02020603050405020304" pitchFamily="18" charset="0"/>
+              </a:rPr>
+              <a:t>Request</a:t>
+            </a:r>
+            <a:r>
+              <a:rPr lang="it-IT" sz="1200" dirty="0">
+                <a:solidFill>
+                  <a:srgbClr val="D4D4D4"/>
+                </a:solidFill>
+                <a:latin typeface="Consolas" panose="020B0609020204030204" pitchFamily="49" charset="0"/>
+                <a:ea typeface="Times New Roman" panose="02020603050405020304" pitchFamily="18" charset="0"/>
+                <a:cs typeface="Times New Roman" panose="02020603050405020304" pitchFamily="18" charset="0"/>
+              </a:rPr>
+              <a:t>), </a:t>
+            </a:r>
+            <a:r>
+              <a:rPr lang="it-IT" sz="1200" dirty="0">
+                <a:solidFill>
+                  <a:srgbClr val="B5CEA8"/>
+                </a:solidFill>
+                <a:latin typeface="Consolas" panose="020B0609020204030204" pitchFamily="49" charset="0"/>
+                <a:ea typeface="Times New Roman" panose="02020603050405020304" pitchFamily="18" charset="0"/>
+                <a:cs typeface="Times New Roman" panose="02020603050405020304" pitchFamily="18" charset="0"/>
+              </a:rPr>
+              <a:t>0</a:t>
+            </a:r>
+            <a:r>
+              <a:rPr lang="it-IT" sz="1200" dirty="0">
+                <a:solidFill>
+                  <a:srgbClr val="D4D4D4"/>
+                </a:solidFill>
+                <a:latin typeface="Consolas" panose="020B0609020204030204" pitchFamily="49" charset="0"/>
+                <a:ea typeface="Times New Roman" panose="02020603050405020304" pitchFamily="18" charset="0"/>
+                <a:cs typeface="Times New Roman" panose="02020603050405020304" pitchFamily="18" charset="0"/>
+              </a:rPr>
+              <a:t>, (</a:t>
+            </a:r>
+            <a:r>
+              <a:rPr lang="it-IT" sz="1200" dirty="0" err="1">
+                <a:solidFill>
+                  <a:srgbClr val="569CD6"/>
+                </a:solidFill>
+                <a:latin typeface="Consolas" panose="020B0609020204030204" pitchFamily="49" charset="0"/>
+                <a:ea typeface="Times New Roman" panose="02020603050405020304" pitchFamily="18" charset="0"/>
+                <a:cs typeface="Times New Roman" panose="02020603050405020304" pitchFamily="18" charset="0"/>
+              </a:rPr>
+              <a:t>struct</a:t>
+            </a:r>
+            <a:r>
+              <a:rPr lang="it-IT" sz="1200" dirty="0">
+                <a:solidFill>
+                  <a:srgbClr val="D4D4D4"/>
+                </a:solidFill>
+                <a:latin typeface="Consolas" panose="020B0609020204030204" pitchFamily="49" charset="0"/>
+                <a:ea typeface="Times New Roman" panose="02020603050405020304" pitchFamily="18" charset="0"/>
+                <a:cs typeface="Times New Roman" panose="02020603050405020304" pitchFamily="18" charset="0"/>
+              </a:rPr>
+              <a:t> </a:t>
+            </a:r>
+            <a:r>
+              <a:rPr lang="it-IT" sz="1200" dirty="0" err="1">
+                <a:solidFill>
+                  <a:srgbClr val="D4D4D4"/>
+                </a:solidFill>
+                <a:latin typeface="Consolas" panose="020B0609020204030204" pitchFamily="49" charset="0"/>
+                <a:ea typeface="Times New Roman" panose="02020603050405020304" pitchFamily="18" charset="0"/>
+                <a:cs typeface="Times New Roman" panose="02020603050405020304" pitchFamily="18" charset="0"/>
+              </a:rPr>
+              <a:t>sockaddr</a:t>
+            </a:r>
+            <a:r>
+              <a:rPr lang="it-IT" sz="1200" dirty="0">
+                <a:solidFill>
+                  <a:srgbClr val="D4D4D4"/>
+                </a:solidFill>
+                <a:latin typeface="Consolas" panose="020B0609020204030204" pitchFamily="49" charset="0"/>
+                <a:ea typeface="Times New Roman" panose="02020603050405020304" pitchFamily="18" charset="0"/>
+                <a:cs typeface="Times New Roman" panose="02020603050405020304" pitchFamily="18" charset="0"/>
+              </a:rPr>
+              <a:t>*)&amp;</a:t>
+            </a:r>
+            <a:r>
+              <a:rPr lang="it-IT" sz="1200" dirty="0" err="1">
+                <a:solidFill>
+                  <a:srgbClr val="D4D4D4"/>
+                </a:solidFill>
+                <a:latin typeface="Consolas" panose="020B0609020204030204" pitchFamily="49" charset="0"/>
+                <a:ea typeface="Times New Roman" panose="02020603050405020304" pitchFamily="18" charset="0"/>
+                <a:cs typeface="Times New Roman" panose="02020603050405020304" pitchFamily="18" charset="0"/>
+              </a:rPr>
+              <a:t>servaddr</a:t>
+            </a:r>
+            <a:r>
+              <a:rPr lang="it-IT" sz="1200" dirty="0">
+                <a:solidFill>
+                  <a:srgbClr val="D4D4D4"/>
+                </a:solidFill>
+                <a:latin typeface="Consolas" panose="020B0609020204030204" pitchFamily="49" charset="0"/>
+                <a:ea typeface="Times New Roman" panose="02020603050405020304" pitchFamily="18" charset="0"/>
+                <a:cs typeface="Times New Roman" panose="02020603050405020304" pitchFamily="18" charset="0"/>
+              </a:rPr>
+              <a:t>, </a:t>
+            </a:r>
+            <a:r>
+              <a:rPr lang="it-IT" sz="1200" dirty="0" err="1">
+                <a:solidFill>
+                  <a:srgbClr val="D4D4D4"/>
+                </a:solidFill>
+                <a:latin typeface="Consolas" panose="020B0609020204030204" pitchFamily="49" charset="0"/>
+                <a:ea typeface="Times New Roman" panose="02020603050405020304" pitchFamily="18" charset="0"/>
+                <a:cs typeface="Times New Roman" panose="02020603050405020304" pitchFamily="18" charset="0"/>
+              </a:rPr>
+              <a:t>length</a:t>
+            </a:r>
+            <a:r>
+              <a:rPr lang="it-IT" sz="1200" dirty="0">
+                <a:solidFill>
+                  <a:srgbClr val="D4D4D4"/>
+                </a:solidFill>
+                <a:latin typeface="Consolas" panose="020B0609020204030204" pitchFamily="49" charset="0"/>
+                <a:ea typeface="Times New Roman" panose="02020603050405020304" pitchFamily="18" charset="0"/>
+                <a:cs typeface="Times New Roman" panose="02020603050405020304" pitchFamily="18" charset="0"/>
+              </a:rPr>
+              <a:t>) &lt; </a:t>
+            </a:r>
+            <a:r>
+              <a:rPr lang="it-IT" sz="1200" dirty="0">
+                <a:solidFill>
+                  <a:srgbClr val="B5CEA8"/>
+                </a:solidFill>
+                <a:latin typeface="Consolas" panose="020B0609020204030204" pitchFamily="49" charset="0"/>
+                <a:ea typeface="Times New Roman" panose="02020603050405020304" pitchFamily="18" charset="0"/>
+                <a:cs typeface="Times New Roman" panose="02020603050405020304" pitchFamily="18" charset="0"/>
+              </a:rPr>
+              <a:t>0</a:t>
+            </a:r>
+            <a:r>
+              <a:rPr lang="it-IT" sz="1200" dirty="0">
+                <a:solidFill>
+                  <a:srgbClr val="D4D4D4"/>
+                </a:solidFill>
+                <a:latin typeface="Consolas" panose="020B0609020204030204" pitchFamily="49" charset="0"/>
+                <a:ea typeface="Times New Roman" panose="02020603050405020304" pitchFamily="18" charset="0"/>
+                <a:cs typeface="Times New Roman" panose="02020603050405020304" pitchFamily="18" charset="0"/>
+              </a:rPr>
+              <a:t>) {</a:t>
+            </a:r>
+            <a:endParaRPr lang="it-IT" sz="1200" dirty="0">
+              <a:latin typeface="Consolas" panose="020B0609020204030204" pitchFamily="49" charset="0"/>
+              <a:ea typeface="Calibri" panose="020F0502020204030204" pitchFamily="34" charset="0"/>
+              <a:cs typeface="Times New Roman" panose="02020603050405020304" pitchFamily="18" charset="0"/>
+            </a:endParaRPr>
+          </a:p>
+          <a:p>
+            <a:pPr>
+              <a:lnSpc>
+                <a:spcPct val="150000"/>
+              </a:lnSpc>
+              <a:spcAft>
+                <a:spcPts val="0"/>
+              </a:spcAft>
+            </a:pPr>
+            <a:r>
+              <a:rPr lang="it-IT" sz="1200" dirty="0">
+                <a:solidFill>
+                  <a:srgbClr val="D4D4D4"/>
+                </a:solidFill>
+                <a:latin typeface="Consolas" panose="020B0609020204030204" pitchFamily="49" charset="0"/>
+                <a:ea typeface="Times New Roman" panose="02020603050405020304" pitchFamily="18" charset="0"/>
+                <a:cs typeface="Times New Roman" panose="02020603050405020304" pitchFamily="18" charset="0"/>
+              </a:rPr>
+              <a:t>                </a:t>
+            </a:r>
+            <a:r>
+              <a:rPr lang="it-IT" sz="1200" dirty="0" err="1">
+                <a:solidFill>
+                  <a:srgbClr val="DCDCAA"/>
+                </a:solidFill>
+                <a:latin typeface="Consolas" panose="020B0609020204030204" pitchFamily="49" charset="0"/>
+                <a:ea typeface="Times New Roman" panose="02020603050405020304" pitchFamily="18" charset="0"/>
+                <a:cs typeface="Times New Roman" panose="02020603050405020304" pitchFamily="18" charset="0"/>
+              </a:rPr>
+              <a:t>perror</a:t>
+            </a:r>
+            <a:r>
+              <a:rPr lang="it-IT" sz="1200" dirty="0">
+                <a:solidFill>
+                  <a:srgbClr val="D4D4D4"/>
+                </a:solidFill>
+                <a:latin typeface="Consolas" panose="020B0609020204030204" pitchFamily="49" charset="0"/>
+                <a:ea typeface="Times New Roman" panose="02020603050405020304" pitchFamily="18" charset="0"/>
+                <a:cs typeface="Times New Roman" panose="02020603050405020304" pitchFamily="18" charset="0"/>
+              </a:rPr>
+              <a:t>(</a:t>
+            </a:r>
+            <a:r>
+              <a:rPr lang="it-IT" sz="1200" dirty="0">
+                <a:solidFill>
+                  <a:srgbClr val="CE9178"/>
+                </a:solidFill>
+                <a:latin typeface="Consolas" panose="020B0609020204030204" pitchFamily="49" charset="0"/>
+                <a:ea typeface="Times New Roman" panose="02020603050405020304" pitchFamily="18" charset="0"/>
+                <a:cs typeface="Times New Roman" panose="02020603050405020304" pitchFamily="18" charset="0"/>
+              </a:rPr>
+              <a:t>"Errore nella </a:t>
+            </a:r>
+            <a:r>
+              <a:rPr lang="it-IT" sz="1200" dirty="0" err="1">
+                <a:solidFill>
+                  <a:srgbClr val="CE9178"/>
+                </a:solidFill>
+                <a:latin typeface="Consolas" panose="020B0609020204030204" pitchFamily="49" charset="0"/>
+                <a:ea typeface="Times New Roman" panose="02020603050405020304" pitchFamily="18" charset="0"/>
+                <a:cs typeface="Times New Roman" panose="02020603050405020304" pitchFamily="18" charset="0"/>
+              </a:rPr>
+              <a:t>sendto</a:t>
+            </a:r>
+            <a:r>
+              <a:rPr lang="it-IT" sz="1200" dirty="0">
+                <a:solidFill>
+                  <a:srgbClr val="CE9178"/>
+                </a:solidFill>
+                <a:latin typeface="Consolas" panose="020B0609020204030204" pitchFamily="49" charset="0"/>
+                <a:ea typeface="Times New Roman" panose="02020603050405020304" pitchFamily="18" charset="0"/>
+                <a:cs typeface="Times New Roman" panose="02020603050405020304" pitchFamily="18" charset="0"/>
+              </a:rPr>
+              <a:t>."</a:t>
+            </a:r>
+            <a:r>
+              <a:rPr lang="it-IT" sz="1200" dirty="0">
+                <a:solidFill>
+                  <a:srgbClr val="D4D4D4"/>
+                </a:solidFill>
+                <a:latin typeface="Consolas" panose="020B0609020204030204" pitchFamily="49" charset="0"/>
+                <a:ea typeface="Times New Roman" panose="02020603050405020304" pitchFamily="18" charset="0"/>
+                <a:cs typeface="Times New Roman" panose="02020603050405020304" pitchFamily="18" charset="0"/>
+              </a:rPr>
+              <a:t>);</a:t>
+            </a:r>
+            <a:endParaRPr lang="it-IT" sz="1200" dirty="0">
+              <a:latin typeface="Consolas" panose="020B0609020204030204" pitchFamily="49" charset="0"/>
+              <a:ea typeface="Calibri" panose="020F0502020204030204" pitchFamily="34" charset="0"/>
+              <a:cs typeface="Times New Roman" panose="02020603050405020304" pitchFamily="18" charset="0"/>
+            </a:endParaRPr>
+          </a:p>
+          <a:p>
+            <a:pPr>
+              <a:lnSpc>
+                <a:spcPct val="150000"/>
+              </a:lnSpc>
+              <a:spcAft>
+                <a:spcPts val="0"/>
+              </a:spcAft>
+            </a:pPr>
+            <a:r>
+              <a:rPr lang="it-IT" sz="1200" dirty="0">
+                <a:solidFill>
+                  <a:srgbClr val="D4D4D4"/>
+                </a:solidFill>
+                <a:latin typeface="Consolas" panose="020B0609020204030204" pitchFamily="49" charset="0"/>
+                <a:ea typeface="Times New Roman" panose="02020603050405020304" pitchFamily="18" charset="0"/>
+                <a:cs typeface="Times New Roman" panose="02020603050405020304" pitchFamily="18" charset="0"/>
+              </a:rPr>
+              <a:t>                </a:t>
+            </a:r>
+            <a:r>
+              <a:rPr lang="it-IT" sz="1200" dirty="0">
+                <a:solidFill>
+                  <a:srgbClr val="C586C0"/>
+                </a:solidFill>
+                <a:latin typeface="Consolas" panose="020B0609020204030204" pitchFamily="49" charset="0"/>
+                <a:ea typeface="Times New Roman" panose="02020603050405020304" pitchFamily="18" charset="0"/>
+                <a:cs typeface="Times New Roman" panose="02020603050405020304" pitchFamily="18" charset="0"/>
+              </a:rPr>
+              <a:t>continue</a:t>
+            </a:r>
+            <a:r>
+              <a:rPr lang="it-IT" sz="1200" dirty="0">
+                <a:solidFill>
+                  <a:srgbClr val="D4D4D4"/>
+                </a:solidFill>
+                <a:latin typeface="Consolas" panose="020B0609020204030204" pitchFamily="49" charset="0"/>
+                <a:ea typeface="Times New Roman" panose="02020603050405020304" pitchFamily="18" charset="0"/>
+                <a:cs typeface="Times New Roman" panose="02020603050405020304" pitchFamily="18" charset="0"/>
+              </a:rPr>
+              <a:t>;</a:t>
+            </a:r>
+            <a:endParaRPr lang="it-IT" sz="1200" dirty="0">
+              <a:latin typeface="Consolas" panose="020B0609020204030204" pitchFamily="49" charset="0"/>
+              <a:ea typeface="Calibri" panose="020F0502020204030204" pitchFamily="34" charset="0"/>
+              <a:cs typeface="Times New Roman" panose="02020603050405020304" pitchFamily="18" charset="0"/>
+            </a:endParaRPr>
+          </a:p>
+          <a:p>
+            <a:pPr>
+              <a:lnSpc>
+                <a:spcPct val="150000"/>
+              </a:lnSpc>
+              <a:spcAft>
+                <a:spcPts val="0"/>
+              </a:spcAft>
+            </a:pPr>
+            <a:r>
+              <a:rPr lang="it-IT" sz="1200" dirty="0">
+                <a:solidFill>
+                  <a:srgbClr val="D4D4D4"/>
+                </a:solidFill>
+                <a:latin typeface="Consolas" panose="020B0609020204030204" pitchFamily="49" charset="0"/>
+                <a:ea typeface="Times New Roman" panose="02020603050405020304" pitchFamily="18" charset="0"/>
+                <a:cs typeface="Times New Roman" panose="02020603050405020304" pitchFamily="18" charset="0"/>
+              </a:rPr>
+              <a:t>            }</a:t>
+            </a:r>
+            <a:endParaRPr lang="it-IT" sz="1200" dirty="0">
+              <a:latin typeface="Consolas" panose="020B0609020204030204" pitchFamily="49" charset="0"/>
+              <a:ea typeface="Calibri" panose="020F0502020204030204" pitchFamily="34" charset="0"/>
+              <a:cs typeface="Times New Roman" panose="02020603050405020304" pitchFamily="18" charset="0"/>
+            </a:endParaRPr>
+          </a:p>
+        </p:txBody>
+      </p:sp>
+      <p:sp>
+        <p:nvSpPr>
+          <p:cNvPr id="6" name="Callout: linea 5">
+            <a:extLst>
+              <a:ext uri="{FF2B5EF4-FFF2-40B4-BE49-F238E27FC236}">
+                <a16:creationId xmlns:a16="http://schemas.microsoft.com/office/drawing/2014/main" id="{D05C6D4C-6676-4E9C-880E-E4180C031C74}"/>
+              </a:ext>
+            </a:extLst>
+          </p:cNvPr>
+          <p:cNvSpPr/>
+          <p:nvPr/>
+        </p:nvSpPr>
+        <p:spPr>
+          <a:xfrm>
+            <a:off x="6943725" y="2066925"/>
+            <a:ext cx="3333750" cy="1181100"/>
+          </a:xfrm>
+          <a:prstGeom prst="borderCallout1">
+            <a:avLst>
+              <a:gd name="adj1" fmla="val 58266"/>
+              <a:gd name="adj2" fmla="val -5190"/>
+              <a:gd name="adj3" fmla="val 84274"/>
+              <a:gd name="adj4" fmla="val -68904"/>
+            </a:avLst>
+          </a:prstGeom>
+          <a:solidFill>
+            <a:schemeClr val="accent4"/>
+          </a:solidFill>
+          <a:ln>
+            <a:solidFill>
+              <a:schemeClr val="accent4"/>
+            </a:solidFill>
+          </a:ln>
+        </p:spPr>
+        <p:style>
+          <a:lnRef idx="2">
+            <a:schemeClr val="accent1">
+              <a:shade val="50000"/>
+            </a:schemeClr>
+          </a:lnRef>
+          <a:fillRef idx="1">
+            <a:schemeClr val="accent1"/>
+          </a:fillRef>
+          <a:effectRef idx="0">
+            <a:schemeClr val="accent1"/>
+          </a:effectRef>
+          <a:fontRef idx="minor">
+            <a:schemeClr val="lt1"/>
+          </a:fontRef>
+        </p:style>
+        <p:txBody>
+          <a:bodyPr rtlCol="0" anchor="ctr"/>
+          <a:lstStyle/>
+          <a:p>
+            <a:pPr algn="just"/>
+            <a:r>
+              <a:rPr lang="it-IT" sz="1400" dirty="0">
+                <a:solidFill>
+                  <a:schemeClr val="tx1"/>
+                </a:solidFill>
+                <a:latin typeface="Avenir Next LT Pro Light" panose="020B0304020202020204" pitchFamily="34" charset="0"/>
+              </a:rPr>
+              <a:t>Si prende dall’input il nome del file che l’utente passa e si controlla che sia un file di testo (formato .</a:t>
+            </a:r>
+            <a:r>
+              <a:rPr lang="it-IT" sz="1400" dirty="0" err="1">
+                <a:solidFill>
+                  <a:schemeClr val="tx1"/>
+                </a:solidFill>
+                <a:latin typeface="Avenir Next LT Pro Light" panose="020B0304020202020204" pitchFamily="34" charset="0"/>
+              </a:rPr>
+              <a:t>txt</a:t>
+            </a:r>
+            <a:r>
+              <a:rPr lang="it-IT" sz="1400" dirty="0">
+                <a:solidFill>
+                  <a:schemeClr val="tx1"/>
+                </a:solidFill>
+                <a:latin typeface="Avenir Next LT Pro Light" panose="020B0304020202020204" pitchFamily="34" charset="0"/>
+              </a:rPr>
+              <a:t>); se non lo è, non si fa nulla e si stampa una riga apposita (si veda slide successiva)</a:t>
+            </a:r>
+          </a:p>
+        </p:txBody>
+      </p:sp>
+    </p:spTree>
+    <p:extLst>
+      <p:ext uri="{BB962C8B-B14F-4D97-AF65-F5344CB8AC3E}">
+        <p14:creationId xmlns:p14="http://schemas.microsoft.com/office/powerpoint/2010/main" val="3834406972"/>
+      </p:ext>
+    </p:extLst>
+  </p:cSld>
+  <p:clrMapOvr>
+    <a:masterClrMapping/>
+  </p:clrMapOvr>
+</p:sld>
+</file>
+
+<file path=ppt/slides/slide5.xml><?xml version="1.0" encoding="utf-8"?>
+<p:sld xmlns:a="http://schemas.openxmlformats.org/drawingml/2006/main" xmlns:r="http://schemas.openxmlformats.org/officeDocument/2006/relationships" xmlns:p="http://schemas.openxmlformats.org/presentationml/2006/main">
+  <p:cSld>
+    <p:bg>
+      <p:bgPr>
+        <a:solidFill>
+          <a:srgbClr val="2A2A2A"/>
+        </a:solidFill>
+        <a:effectLst/>
+      </p:bgPr>
+    </p:bg>
+    <p:spTree>
+      <p:nvGrpSpPr>
+        <p:cNvPr id="1" name=""/>
+        <p:cNvGrpSpPr/>
+        <p:nvPr/>
+      </p:nvGrpSpPr>
+      <p:grpSpPr>
+        <a:xfrm>
+          <a:off x="0" y="0"/>
+          <a:ext cx="0" cy="0"/>
+          <a:chOff x="0" y="0"/>
+          <a:chExt cx="0" cy="0"/>
+        </a:xfrm>
+      </p:grpSpPr>
+      <p:sp>
+        <p:nvSpPr>
+          <p:cNvPr id="2" name="Titolo 1">
+            <a:extLst>
+              <a:ext uri="{FF2B5EF4-FFF2-40B4-BE49-F238E27FC236}">
+                <a16:creationId xmlns:a16="http://schemas.microsoft.com/office/drawing/2014/main" id="{F1DDE7A4-1A5F-4F0D-B842-7798EDC6EDA8}"/>
+              </a:ext>
+            </a:extLst>
+          </p:cNvPr>
+          <p:cNvSpPr>
+            <a:spLocks noGrp="1"/>
+          </p:cNvSpPr>
+          <p:nvPr>
+            <p:ph type="title"/>
+          </p:nvPr>
+        </p:nvSpPr>
+        <p:spPr>
+          <a:xfrm>
+            <a:off x="166048" y="92077"/>
+            <a:ext cx="11859904" cy="911224"/>
+          </a:xfrm>
+        </p:spPr>
+        <p:txBody>
+          <a:bodyPr>
+            <a:normAutofit/>
+          </a:bodyPr>
+          <a:lstStyle/>
+          <a:p>
+            <a:pPr algn="ctr"/>
+            <a:r>
+              <a:rPr lang="it-IT" dirty="0">
+                <a:solidFill>
+                  <a:schemeClr val="bg1"/>
+                </a:solidFill>
+                <a:latin typeface="Avenir Next LT Pro Light" panose="020B0304020202020204" pitchFamily="34" charset="0"/>
+              </a:rPr>
+              <a:t>Codice Client UDP (2)</a:t>
+            </a:r>
+          </a:p>
+        </p:txBody>
+      </p:sp>
+      <p:sp>
+        <p:nvSpPr>
+          <p:cNvPr id="3" name="Segnaposto numero diapositiva 2">
+            <a:extLst>
+              <a:ext uri="{FF2B5EF4-FFF2-40B4-BE49-F238E27FC236}">
+                <a16:creationId xmlns:a16="http://schemas.microsoft.com/office/drawing/2014/main" id="{A47D4834-59E8-435C-A95B-F4D997DED51E}"/>
+              </a:ext>
+            </a:extLst>
+          </p:cNvPr>
+          <p:cNvSpPr>
+            <a:spLocks noGrp="1"/>
+          </p:cNvSpPr>
+          <p:nvPr>
+            <p:ph type="sldNum" sz="quarter" idx="12"/>
+          </p:nvPr>
+        </p:nvSpPr>
+        <p:spPr/>
+        <p:txBody>
+          <a:bodyPr/>
+          <a:lstStyle/>
+          <a:p>
+            <a:fld id="{4A6DC286-705F-4A37-A21F-B485E3A29C72}" type="slidenum">
+              <a:rPr lang="it-IT" smtClean="0"/>
+              <a:t>5</a:t>
+            </a:fld>
+            <a:endParaRPr lang="it-IT"/>
+          </a:p>
+        </p:txBody>
+      </p:sp>
+      <p:sp>
+        <p:nvSpPr>
+          <p:cNvPr id="5" name="CasellaDiTesto 4">
+            <a:extLst>
+              <a:ext uri="{FF2B5EF4-FFF2-40B4-BE49-F238E27FC236}">
+                <a16:creationId xmlns:a16="http://schemas.microsoft.com/office/drawing/2014/main" id="{16613504-0E07-4823-8604-71855244FD7C}"/>
+              </a:ext>
+            </a:extLst>
+          </p:cNvPr>
+          <p:cNvSpPr txBox="1"/>
+          <p:nvPr/>
+        </p:nvSpPr>
+        <p:spPr>
+          <a:xfrm>
+            <a:off x="503280" y="1171324"/>
+            <a:ext cx="11155320" cy="5048626"/>
+          </a:xfrm>
+          <a:prstGeom prst="rect">
+            <a:avLst/>
+          </a:prstGeom>
+          <a:noFill/>
+        </p:spPr>
+        <p:txBody>
+          <a:bodyPr wrap="square" rtlCol="0">
+            <a:spAutoFit/>
+          </a:bodyPr>
+          <a:lstStyle/>
+          <a:p>
+            <a:pPr>
+              <a:lnSpc>
+                <a:spcPct val="150000"/>
+              </a:lnSpc>
+              <a:spcAft>
+                <a:spcPts val="0"/>
+              </a:spcAft>
+            </a:pPr>
+            <a:r>
+              <a:rPr lang="it-IT" sz="1200" dirty="0">
+                <a:solidFill>
+                  <a:srgbClr val="D4D4D4"/>
+                </a:solidFill>
+                <a:latin typeface="Consolas" panose="020B0609020204030204" pitchFamily="49" charset="0"/>
+                <a:ea typeface="Times New Roman" panose="02020603050405020304" pitchFamily="18" charset="0"/>
+                <a:cs typeface="Times New Roman" panose="02020603050405020304" pitchFamily="18" charset="0"/>
+              </a:rPr>
+              <a:t>            </a:t>
+            </a:r>
+            <a:r>
+              <a:rPr lang="it-IT" sz="1200" dirty="0" err="1">
+                <a:solidFill>
+                  <a:srgbClr val="C586C0"/>
+                </a:solidFill>
+                <a:latin typeface="Consolas" panose="020B0609020204030204" pitchFamily="49" charset="0"/>
+                <a:ea typeface="Times New Roman" panose="02020603050405020304" pitchFamily="18" charset="0"/>
+                <a:cs typeface="Times New Roman" panose="02020603050405020304" pitchFamily="18" charset="0"/>
+              </a:rPr>
+              <a:t>if</a:t>
+            </a:r>
+            <a:r>
+              <a:rPr lang="it-IT" sz="1200" dirty="0">
+                <a:solidFill>
+                  <a:srgbClr val="D4D4D4"/>
+                </a:solidFill>
+                <a:latin typeface="Consolas" panose="020B0609020204030204" pitchFamily="49" charset="0"/>
+                <a:ea typeface="Times New Roman" panose="02020603050405020304" pitchFamily="18" charset="0"/>
+                <a:cs typeface="Times New Roman" panose="02020603050405020304" pitchFamily="18" charset="0"/>
+              </a:rPr>
+              <a:t> (</a:t>
+            </a:r>
+            <a:r>
+              <a:rPr lang="it-IT" sz="1200" dirty="0" err="1">
+                <a:solidFill>
+                  <a:srgbClr val="DCDCAA"/>
+                </a:solidFill>
+                <a:latin typeface="Consolas" panose="020B0609020204030204" pitchFamily="49" charset="0"/>
+                <a:ea typeface="Times New Roman" panose="02020603050405020304" pitchFamily="18" charset="0"/>
+                <a:cs typeface="Times New Roman" panose="02020603050405020304" pitchFamily="18" charset="0"/>
+              </a:rPr>
+              <a:t>recvfrom</a:t>
+            </a:r>
+            <a:r>
+              <a:rPr lang="it-IT" sz="1200" dirty="0">
+                <a:solidFill>
+                  <a:srgbClr val="D4D4D4"/>
+                </a:solidFill>
+                <a:latin typeface="Consolas" panose="020B0609020204030204" pitchFamily="49" charset="0"/>
+                <a:ea typeface="Times New Roman" panose="02020603050405020304" pitchFamily="18" charset="0"/>
+                <a:cs typeface="Times New Roman" panose="02020603050405020304" pitchFamily="18" charset="0"/>
+              </a:rPr>
+              <a:t>(</a:t>
+            </a:r>
+            <a:r>
+              <a:rPr lang="it-IT" sz="1200" dirty="0" err="1">
+                <a:solidFill>
+                  <a:srgbClr val="D4D4D4"/>
+                </a:solidFill>
+                <a:latin typeface="Consolas" panose="020B0609020204030204" pitchFamily="49" charset="0"/>
+                <a:ea typeface="Times New Roman" panose="02020603050405020304" pitchFamily="18" charset="0"/>
+                <a:cs typeface="Times New Roman" panose="02020603050405020304" pitchFamily="18" charset="0"/>
+              </a:rPr>
+              <a:t>socketDescriptor</a:t>
+            </a:r>
+            <a:r>
+              <a:rPr lang="it-IT" sz="1200" dirty="0">
+                <a:solidFill>
+                  <a:srgbClr val="D4D4D4"/>
+                </a:solidFill>
+                <a:latin typeface="Consolas" panose="020B0609020204030204" pitchFamily="49" charset="0"/>
+                <a:ea typeface="Times New Roman" panose="02020603050405020304" pitchFamily="18" charset="0"/>
+                <a:cs typeface="Times New Roman" panose="02020603050405020304" pitchFamily="18" charset="0"/>
+              </a:rPr>
+              <a:t>, &amp;</a:t>
+            </a:r>
+            <a:r>
+              <a:rPr lang="it-IT" sz="1200" dirty="0" err="1">
+                <a:solidFill>
+                  <a:srgbClr val="D4D4D4"/>
+                </a:solidFill>
+                <a:latin typeface="Consolas" panose="020B0609020204030204" pitchFamily="49" charset="0"/>
+                <a:ea typeface="Times New Roman" panose="02020603050405020304" pitchFamily="18" charset="0"/>
+                <a:cs typeface="Times New Roman" panose="02020603050405020304" pitchFamily="18" charset="0"/>
+              </a:rPr>
+              <a:t>result</a:t>
+            </a:r>
+            <a:r>
+              <a:rPr lang="it-IT" sz="1200" dirty="0">
+                <a:solidFill>
+                  <a:srgbClr val="D4D4D4"/>
+                </a:solidFill>
+                <a:latin typeface="Consolas" panose="020B0609020204030204" pitchFamily="49" charset="0"/>
+                <a:ea typeface="Times New Roman" panose="02020603050405020304" pitchFamily="18" charset="0"/>
+                <a:cs typeface="Times New Roman" panose="02020603050405020304" pitchFamily="18" charset="0"/>
+              </a:rPr>
+              <a:t>, </a:t>
+            </a:r>
+            <a:r>
+              <a:rPr lang="it-IT" sz="1200" dirty="0" err="1">
+                <a:solidFill>
+                  <a:srgbClr val="569CD6"/>
+                </a:solidFill>
+                <a:latin typeface="Consolas" panose="020B0609020204030204" pitchFamily="49" charset="0"/>
+                <a:ea typeface="Times New Roman" panose="02020603050405020304" pitchFamily="18" charset="0"/>
+                <a:cs typeface="Times New Roman" panose="02020603050405020304" pitchFamily="18" charset="0"/>
+              </a:rPr>
+              <a:t>sizeof</a:t>
+            </a:r>
+            <a:r>
+              <a:rPr lang="it-IT" sz="1200" dirty="0">
+                <a:solidFill>
+                  <a:srgbClr val="D4D4D4"/>
+                </a:solidFill>
+                <a:latin typeface="Consolas" panose="020B0609020204030204" pitchFamily="49" charset="0"/>
+                <a:ea typeface="Times New Roman" panose="02020603050405020304" pitchFamily="18" charset="0"/>
+                <a:cs typeface="Times New Roman" panose="02020603050405020304" pitchFamily="18" charset="0"/>
+              </a:rPr>
+              <a:t>(</a:t>
+            </a:r>
+            <a:r>
+              <a:rPr lang="it-IT" sz="1200" dirty="0" err="1">
+                <a:solidFill>
+                  <a:srgbClr val="D4D4D4"/>
+                </a:solidFill>
+                <a:latin typeface="Consolas" panose="020B0609020204030204" pitchFamily="49" charset="0"/>
+                <a:ea typeface="Times New Roman" panose="02020603050405020304" pitchFamily="18" charset="0"/>
+                <a:cs typeface="Times New Roman" panose="02020603050405020304" pitchFamily="18" charset="0"/>
+              </a:rPr>
+              <a:t>result</a:t>
+            </a:r>
+            <a:r>
+              <a:rPr lang="it-IT" sz="1200" dirty="0">
+                <a:solidFill>
+                  <a:srgbClr val="D4D4D4"/>
+                </a:solidFill>
+                <a:latin typeface="Consolas" panose="020B0609020204030204" pitchFamily="49" charset="0"/>
+                <a:ea typeface="Times New Roman" panose="02020603050405020304" pitchFamily="18" charset="0"/>
+                <a:cs typeface="Times New Roman" panose="02020603050405020304" pitchFamily="18" charset="0"/>
+              </a:rPr>
+              <a:t>), </a:t>
+            </a:r>
+            <a:r>
+              <a:rPr lang="it-IT" sz="1200" dirty="0">
+                <a:solidFill>
+                  <a:srgbClr val="B5CEA8"/>
+                </a:solidFill>
+                <a:latin typeface="Consolas" panose="020B0609020204030204" pitchFamily="49" charset="0"/>
+                <a:ea typeface="Times New Roman" panose="02020603050405020304" pitchFamily="18" charset="0"/>
+                <a:cs typeface="Times New Roman" panose="02020603050405020304" pitchFamily="18" charset="0"/>
+              </a:rPr>
+              <a:t>0</a:t>
+            </a:r>
+            <a:r>
+              <a:rPr lang="it-IT" sz="1200" dirty="0">
+                <a:solidFill>
+                  <a:srgbClr val="D4D4D4"/>
+                </a:solidFill>
+                <a:latin typeface="Consolas" panose="020B0609020204030204" pitchFamily="49" charset="0"/>
+                <a:ea typeface="Times New Roman" panose="02020603050405020304" pitchFamily="18" charset="0"/>
+                <a:cs typeface="Times New Roman" panose="02020603050405020304" pitchFamily="18" charset="0"/>
+              </a:rPr>
+              <a:t>, (</a:t>
+            </a:r>
+            <a:r>
+              <a:rPr lang="it-IT" sz="1200" dirty="0" err="1">
+                <a:solidFill>
+                  <a:srgbClr val="569CD6"/>
+                </a:solidFill>
+                <a:latin typeface="Consolas" panose="020B0609020204030204" pitchFamily="49" charset="0"/>
+                <a:ea typeface="Times New Roman" panose="02020603050405020304" pitchFamily="18" charset="0"/>
+                <a:cs typeface="Times New Roman" panose="02020603050405020304" pitchFamily="18" charset="0"/>
+              </a:rPr>
+              <a:t>struct</a:t>
+            </a:r>
+            <a:r>
+              <a:rPr lang="it-IT" sz="1200" dirty="0">
+                <a:solidFill>
+                  <a:srgbClr val="D4D4D4"/>
+                </a:solidFill>
+                <a:latin typeface="Consolas" panose="020B0609020204030204" pitchFamily="49" charset="0"/>
+                <a:ea typeface="Times New Roman" panose="02020603050405020304" pitchFamily="18" charset="0"/>
+                <a:cs typeface="Times New Roman" panose="02020603050405020304" pitchFamily="18" charset="0"/>
+              </a:rPr>
+              <a:t> </a:t>
+            </a:r>
+            <a:r>
+              <a:rPr lang="it-IT" sz="1200" dirty="0" err="1">
+                <a:solidFill>
+                  <a:srgbClr val="D4D4D4"/>
+                </a:solidFill>
+                <a:latin typeface="Consolas" panose="020B0609020204030204" pitchFamily="49" charset="0"/>
+                <a:ea typeface="Times New Roman" panose="02020603050405020304" pitchFamily="18" charset="0"/>
+                <a:cs typeface="Times New Roman" panose="02020603050405020304" pitchFamily="18" charset="0"/>
+              </a:rPr>
+              <a:t>sockaddr</a:t>
+            </a:r>
+            <a:r>
+              <a:rPr lang="it-IT" sz="1200" dirty="0">
+                <a:solidFill>
+                  <a:srgbClr val="D4D4D4"/>
+                </a:solidFill>
+                <a:latin typeface="Consolas" panose="020B0609020204030204" pitchFamily="49" charset="0"/>
+                <a:ea typeface="Times New Roman" panose="02020603050405020304" pitchFamily="18" charset="0"/>
+                <a:cs typeface="Times New Roman" panose="02020603050405020304" pitchFamily="18" charset="0"/>
+              </a:rPr>
+              <a:t>*)&amp;</a:t>
+            </a:r>
+            <a:r>
+              <a:rPr lang="it-IT" sz="1200" dirty="0" err="1">
+                <a:solidFill>
+                  <a:srgbClr val="D4D4D4"/>
+                </a:solidFill>
+                <a:latin typeface="Consolas" panose="020B0609020204030204" pitchFamily="49" charset="0"/>
+                <a:ea typeface="Times New Roman" panose="02020603050405020304" pitchFamily="18" charset="0"/>
+                <a:cs typeface="Times New Roman" panose="02020603050405020304" pitchFamily="18" charset="0"/>
+              </a:rPr>
+              <a:t>servaddr</a:t>
+            </a:r>
+            <a:r>
+              <a:rPr lang="it-IT" sz="1200" dirty="0">
+                <a:solidFill>
+                  <a:srgbClr val="D4D4D4"/>
+                </a:solidFill>
+                <a:latin typeface="Consolas" panose="020B0609020204030204" pitchFamily="49" charset="0"/>
+                <a:ea typeface="Times New Roman" panose="02020603050405020304" pitchFamily="18" charset="0"/>
+                <a:cs typeface="Times New Roman" panose="02020603050405020304" pitchFamily="18" charset="0"/>
+              </a:rPr>
+              <a:t>, &amp;</a:t>
+            </a:r>
+            <a:r>
+              <a:rPr lang="it-IT" sz="1200" dirty="0" err="1">
+                <a:solidFill>
+                  <a:srgbClr val="D4D4D4"/>
+                </a:solidFill>
+                <a:latin typeface="Consolas" panose="020B0609020204030204" pitchFamily="49" charset="0"/>
+                <a:ea typeface="Times New Roman" panose="02020603050405020304" pitchFamily="18" charset="0"/>
+                <a:cs typeface="Times New Roman" panose="02020603050405020304" pitchFamily="18" charset="0"/>
+              </a:rPr>
+              <a:t>length</a:t>
+            </a:r>
+            <a:r>
+              <a:rPr lang="it-IT" sz="1200" dirty="0">
+                <a:solidFill>
+                  <a:srgbClr val="D4D4D4"/>
+                </a:solidFill>
+                <a:latin typeface="Consolas" panose="020B0609020204030204" pitchFamily="49" charset="0"/>
+                <a:ea typeface="Times New Roman" panose="02020603050405020304" pitchFamily="18" charset="0"/>
+                <a:cs typeface="Times New Roman" panose="02020603050405020304" pitchFamily="18" charset="0"/>
+              </a:rPr>
+              <a:t>) &lt; </a:t>
+            </a:r>
+            <a:r>
+              <a:rPr lang="it-IT" sz="1200" dirty="0">
+                <a:solidFill>
+                  <a:srgbClr val="B5CEA8"/>
+                </a:solidFill>
+                <a:latin typeface="Consolas" panose="020B0609020204030204" pitchFamily="49" charset="0"/>
+                <a:ea typeface="Times New Roman" panose="02020603050405020304" pitchFamily="18" charset="0"/>
+                <a:cs typeface="Times New Roman" panose="02020603050405020304" pitchFamily="18" charset="0"/>
+              </a:rPr>
+              <a:t>0</a:t>
+            </a:r>
+            <a:r>
+              <a:rPr lang="it-IT" sz="1200" dirty="0">
+                <a:solidFill>
+                  <a:srgbClr val="D4D4D4"/>
+                </a:solidFill>
+                <a:latin typeface="Consolas" panose="020B0609020204030204" pitchFamily="49" charset="0"/>
+                <a:ea typeface="Times New Roman" panose="02020603050405020304" pitchFamily="18" charset="0"/>
+                <a:cs typeface="Times New Roman" panose="02020603050405020304" pitchFamily="18" charset="0"/>
+              </a:rPr>
+              <a:t>) {</a:t>
+            </a:r>
+            <a:endParaRPr lang="it-IT" sz="1200" dirty="0">
+              <a:latin typeface="Consolas" panose="020B0609020204030204" pitchFamily="49" charset="0"/>
+              <a:ea typeface="Calibri" panose="020F0502020204030204" pitchFamily="34" charset="0"/>
+              <a:cs typeface="Times New Roman" panose="02020603050405020304" pitchFamily="18" charset="0"/>
+            </a:endParaRPr>
+          </a:p>
+          <a:p>
+            <a:pPr>
+              <a:lnSpc>
+                <a:spcPct val="150000"/>
+              </a:lnSpc>
+              <a:spcAft>
+                <a:spcPts val="0"/>
+              </a:spcAft>
+            </a:pPr>
+            <a:r>
+              <a:rPr lang="it-IT" sz="1200" dirty="0">
+                <a:solidFill>
+                  <a:srgbClr val="D4D4D4"/>
+                </a:solidFill>
+                <a:latin typeface="Consolas" panose="020B0609020204030204" pitchFamily="49" charset="0"/>
+                <a:ea typeface="Times New Roman" panose="02020603050405020304" pitchFamily="18" charset="0"/>
+                <a:cs typeface="Times New Roman" panose="02020603050405020304" pitchFamily="18" charset="0"/>
+              </a:rPr>
+              <a:t>                </a:t>
+            </a:r>
+            <a:r>
+              <a:rPr lang="it-IT" sz="1200" dirty="0" err="1">
+                <a:solidFill>
+                  <a:srgbClr val="DCDCAA"/>
+                </a:solidFill>
+                <a:latin typeface="Consolas" panose="020B0609020204030204" pitchFamily="49" charset="0"/>
+                <a:ea typeface="Times New Roman" panose="02020603050405020304" pitchFamily="18" charset="0"/>
+                <a:cs typeface="Times New Roman" panose="02020603050405020304" pitchFamily="18" charset="0"/>
+              </a:rPr>
+              <a:t>perror</a:t>
+            </a:r>
+            <a:r>
+              <a:rPr lang="it-IT" sz="1200" dirty="0">
+                <a:solidFill>
+                  <a:srgbClr val="D4D4D4"/>
+                </a:solidFill>
+                <a:latin typeface="Consolas" panose="020B0609020204030204" pitchFamily="49" charset="0"/>
+                <a:ea typeface="Times New Roman" panose="02020603050405020304" pitchFamily="18" charset="0"/>
+                <a:cs typeface="Times New Roman" panose="02020603050405020304" pitchFamily="18" charset="0"/>
+              </a:rPr>
+              <a:t>(</a:t>
+            </a:r>
+            <a:r>
+              <a:rPr lang="it-IT" sz="1200" dirty="0">
+                <a:solidFill>
+                  <a:srgbClr val="CE9178"/>
+                </a:solidFill>
+                <a:latin typeface="Consolas" panose="020B0609020204030204" pitchFamily="49" charset="0"/>
+                <a:ea typeface="Times New Roman" panose="02020603050405020304" pitchFamily="18" charset="0"/>
+                <a:cs typeface="Times New Roman" panose="02020603050405020304" pitchFamily="18" charset="0"/>
+              </a:rPr>
+              <a:t>"Errore nella </a:t>
+            </a:r>
+            <a:r>
+              <a:rPr lang="it-IT" sz="1200" dirty="0" err="1">
+                <a:solidFill>
+                  <a:srgbClr val="CE9178"/>
+                </a:solidFill>
+                <a:latin typeface="Consolas" panose="020B0609020204030204" pitchFamily="49" charset="0"/>
+                <a:ea typeface="Times New Roman" panose="02020603050405020304" pitchFamily="18" charset="0"/>
+                <a:cs typeface="Times New Roman" panose="02020603050405020304" pitchFamily="18" charset="0"/>
+              </a:rPr>
+              <a:t>recvfrom</a:t>
+            </a:r>
+            <a:r>
+              <a:rPr lang="it-IT" sz="1200" dirty="0">
+                <a:solidFill>
+                  <a:srgbClr val="CE9178"/>
+                </a:solidFill>
+                <a:latin typeface="Consolas" panose="020B0609020204030204" pitchFamily="49" charset="0"/>
+                <a:ea typeface="Times New Roman" panose="02020603050405020304" pitchFamily="18" charset="0"/>
+                <a:cs typeface="Times New Roman" panose="02020603050405020304" pitchFamily="18" charset="0"/>
+              </a:rPr>
+              <a:t>."</a:t>
+            </a:r>
+            <a:r>
+              <a:rPr lang="it-IT" sz="1200" dirty="0">
+                <a:solidFill>
+                  <a:srgbClr val="D4D4D4"/>
+                </a:solidFill>
+                <a:latin typeface="Consolas" panose="020B0609020204030204" pitchFamily="49" charset="0"/>
+                <a:ea typeface="Times New Roman" panose="02020603050405020304" pitchFamily="18" charset="0"/>
+                <a:cs typeface="Times New Roman" panose="02020603050405020304" pitchFamily="18" charset="0"/>
+              </a:rPr>
+              <a:t>);</a:t>
+            </a:r>
+            <a:endParaRPr lang="it-IT" sz="1200" dirty="0">
+              <a:latin typeface="Consolas" panose="020B0609020204030204" pitchFamily="49" charset="0"/>
+              <a:ea typeface="Calibri" panose="020F0502020204030204" pitchFamily="34" charset="0"/>
+              <a:cs typeface="Times New Roman" panose="02020603050405020304" pitchFamily="18" charset="0"/>
+            </a:endParaRPr>
+          </a:p>
+          <a:p>
+            <a:pPr>
+              <a:lnSpc>
+                <a:spcPct val="150000"/>
+              </a:lnSpc>
+              <a:spcAft>
+                <a:spcPts val="0"/>
+              </a:spcAft>
+            </a:pPr>
+            <a:r>
+              <a:rPr lang="it-IT" sz="1200" dirty="0">
+                <a:solidFill>
+                  <a:srgbClr val="D4D4D4"/>
+                </a:solidFill>
+                <a:latin typeface="Consolas" panose="020B0609020204030204" pitchFamily="49" charset="0"/>
+                <a:ea typeface="Times New Roman" panose="02020603050405020304" pitchFamily="18" charset="0"/>
+                <a:cs typeface="Times New Roman" panose="02020603050405020304" pitchFamily="18" charset="0"/>
+              </a:rPr>
+              <a:t>                </a:t>
+            </a:r>
+            <a:r>
+              <a:rPr lang="it-IT" sz="1200" dirty="0">
+                <a:solidFill>
+                  <a:srgbClr val="C586C0"/>
+                </a:solidFill>
+                <a:latin typeface="Consolas" panose="020B0609020204030204" pitchFamily="49" charset="0"/>
+                <a:ea typeface="Times New Roman" panose="02020603050405020304" pitchFamily="18" charset="0"/>
+                <a:cs typeface="Times New Roman" panose="02020603050405020304" pitchFamily="18" charset="0"/>
+              </a:rPr>
+              <a:t>continue</a:t>
+            </a:r>
+            <a:r>
+              <a:rPr lang="it-IT" sz="1200" dirty="0">
+                <a:solidFill>
+                  <a:srgbClr val="D4D4D4"/>
+                </a:solidFill>
+                <a:latin typeface="Consolas" panose="020B0609020204030204" pitchFamily="49" charset="0"/>
+                <a:ea typeface="Times New Roman" panose="02020603050405020304" pitchFamily="18" charset="0"/>
+                <a:cs typeface="Times New Roman" panose="02020603050405020304" pitchFamily="18" charset="0"/>
+              </a:rPr>
+              <a:t>;</a:t>
+            </a:r>
+            <a:endParaRPr lang="it-IT" sz="1200" dirty="0">
+              <a:latin typeface="Consolas" panose="020B0609020204030204" pitchFamily="49" charset="0"/>
+              <a:ea typeface="Calibri" panose="020F0502020204030204" pitchFamily="34" charset="0"/>
+              <a:cs typeface="Times New Roman" panose="02020603050405020304" pitchFamily="18" charset="0"/>
+            </a:endParaRPr>
+          </a:p>
+          <a:p>
+            <a:pPr>
+              <a:lnSpc>
+                <a:spcPct val="150000"/>
+              </a:lnSpc>
+              <a:spcAft>
+                <a:spcPts val="0"/>
+              </a:spcAft>
+            </a:pPr>
+            <a:r>
+              <a:rPr lang="it-IT" sz="1200" dirty="0">
+                <a:solidFill>
+                  <a:srgbClr val="D4D4D4"/>
+                </a:solidFill>
+                <a:latin typeface="Consolas" panose="020B0609020204030204" pitchFamily="49" charset="0"/>
+                <a:ea typeface="Times New Roman" panose="02020603050405020304" pitchFamily="18" charset="0"/>
+                <a:cs typeface="Times New Roman" panose="02020603050405020304" pitchFamily="18" charset="0"/>
+              </a:rPr>
+              <a:t>            }</a:t>
+            </a:r>
+            <a:endParaRPr lang="it-IT" sz="1200" dirty="0">
+              <a:latin typeface="Consolas" panose="020B0609020204030204" pitchFamily="49" charset="0"/>
+              <a:ea typeface="Calibri" panose="020F0502020204030204" pitchFamily="34" charset="0"/>
+              <a:cs typeface="Times New Roman" panose="02020603050405020304" pitchFamily="18" charset="0"/>
+            </a:endParaRPr>
+          </a:p>
+          <a:p>
+            <a:pPr>
+              <a:lnSpc>
+                <a:spcPct val="150000"/>
+              </a:lnSpc>
+              <a:spcAft>
+                <a:spcPts val="0"/>
+              </a:spcAft>
+            </a:pPr>
+            <a:r>
+              <a:rPr lang="it-IT" sz="1200" dirty="0">
+                <a:solidFill>
+                  <a:srgbClr val="D4D4D4"/>
+                </a:solidFill>
+                <a:latin typeface="Consolas" panose="020B0609020204030204" pitchFamily="49" charset="0"/>
+                <a:ea typeface="Times New Roman" panose="02020603050405020304" pitchFamily="18" charset="0"/>
+                <a:cs typeface="Times New Roman" panose="02020603050405020304" pitchFamily="18" charset="0"/>
+              </a:rPr>
+              <a:t>        </a:t>
+            </a:r>
+            <a:endParaRPr lang="it-IT" sz="1200" dirty="0">
+              <a:latin typeface="Consolas" panose="020B0609020204030204" pitchFamily="49" charset="0"/>
+              <a:ea typeface="Calibri" panose="020F0502020204030204" pitchFamily="34" charset="0"/>
+              <a:cs typeface="Times New Roman" panose="02020603050405020304" pitchFamily="18" charset="0"/>
+            </a:endParaRPr>
+          </a:p>
+          <a:p>
+            <a:pPr>
+              <a:lnSpc>
+                <a:spcPct val="150000"/>
+              </a:lnSpc>
+              <a:spcAft>
+                <a:spcPts val="0"/>
+              </a:spcAft>
+            </a:pPr>
+            <a:r>
+              <a:rPr lang="it-IT" sz="1200" dirty="0">
+                <a:solidFill>
+                  <a:srgbClr val="D4D4D4"/>
+                </a:solidFill>
+                <a:latin typeface="Consolas" panose="020B0609020204030204" pitchFamily="49" charset="0"/>
+                <a:ea typeface="Times New Roman" panose="02020603050405020304" pitchFamily="18" charset="0"/>
+                <a:cs typeface="Times New Roman" panose="02020603050405020304" pitchFamily="18" charset="0"/>
+              </a:rPr>
+              <a:t>            </a:t>
+            </a:r>
+            <a:r>
+              <a:rPr lang="it-IT" sz="1200" dirty="0" err="1">
+                <a:solidFill>
+                  <a:srgbClr val="C586C0"/>
+                </a:solidFill>
+                <a:latin typeface="Consolas" panose="020B0609020204030204" pitchFamily="49" charset="0"/>
+                <a:ea typeface="Times New Roman" panose="02020603050405020304" pitchFamily="18" charset="0"/>
+                <a:cs typeface="Times New Roman" panose="02020603050405020304" pitchFamily="18" charset="0"/>
+              </a:rPr>
+              <a:t>if</a:t>
+            </a:r>
+            <a:r>
+              <a:rPr lang="it-IT" sz="1200" dirty="0">
+                <a:solidFill>
+                  <a:srgbClr val="D4D4D4"/>
+                </a:solidFill>
+                <a:latin typeface="Consolas" panose="020B0609020204030204" pitchFamily="49" charset="0"/>
+                <a:ea typeface="Times New Roman" panose="02020603050405020304" pitchFamily="18" charset="0"/>
+                <a:cs typeface="Times New Roman" panose="02020603050405020304" pitchFamily="18" charset="0"/>
+              </a:rPr>
+              <a:t> ((</a:t>
+            </a:r>
+            <a:r>
+              <a:rPr lang="it-IT" sz="1200" dirty="0" err="1">
+                <a:solidFill>
+                  <a:srgbClr val="569CD6"/>
+                </a:solidFill>
+                <a:latin typeface="Consolas" panose="020B0609020204030204" pitchFamily="49" charset="0"/>
+                <a:ea typeface="Times New Roman" panose="02020603050405020304" pitchFamily="18" charset="0"/>
+                <a:cs typeface="Times New Roman" panose="02020603050405020304" pitchFamily="18" charset="0"/>
+              </a:rPr>
+              <a:t>int</a:t>
+            </a:r>
+            <a:r>
+              <a:rPr lang="it-IT" sz="1200" dirty="0">
+                <a:solidFill>
+                  <a:srgbClr val="D4D4D4"/>
+                </a:solidFill>
+                <a:latin typeface="Consolas" panose="020B0609020204030204" pitchFamily="49" charset="0"/>
+                <a:ea typeface="Times New Roman" panose="02020603050405020304" pitchFamily="18" charset="0"/>
+                <a:cs typeface="Times New Roman" panose="02020603050405020304" pitchFamily="18" charset="0"/>
+              </a:rPr>
+              <a:t>)</a:t>
+            </a:r>
+            <a:r>
+              <a:rPr lang="it-IT" sz="1200" dirty="0" err="1">
+                <a:solidFill>
+                  <a:srgbClr val="DCDCAA"/>
+                </a:solidFill>
+                <a:latin typeface="Consolas" panose="020B0609020204030204" pitchFamily="49" charset="0"/>
+                <a:ea typeface="Times New Roman" panose="02020603050405020304" pitchFamily="18" charset="0"/>
+                <a:cs typeface="Times New Roman" panose="02020603050405020304" pitchFamily="18" charset="0"/>
+              </a:rPr>
+              <a:t>ntohl</a:t>
+            </a:r>
+            <a:r>
+              <a:rPr lang="it-IT" sz="1200" dirty="0">
+                <a:solidFill>
+                  <a:srgbClr val="D4D4D4"/>
+                </a:solidFill>
+                <a:latin typeface="Consolas" panose="020B0609020204030204" pitchFamily="49" charset="0"/>
+                <a:ea typeface="Times New Roman" panose="02020603050405020304" pitchFamily="18" charset="0"/>
+                <a:cs typeface="Times New Roman" panose="02020603050405020304" pitchFamily="18" charset="0"/>
+              </a:rPr>
+              <a:t>(</a:t>
+            </a:r>
+            <a:r>
+              <a:rPr lang="it-IT" sz="1200" dirty="0" err="1">
+                <a:solidFill>
+                  <a:srgbClr val="D4D4D4"/>
+                </a:solidFill>
+                <a:latin typeface="Consolas" panose="020B0609020204030204" pitchFamily="49" charset="0"/>
+                <a:ea typeface="Times New Roman" panose="02020603050405020304" pitchFamily="18" charset="0"/>
+                <a:cs typeface="Times New Roman" panose="02020603050405020304" pitchFamily="18" charset="0"/>
+              </a:rPr>
+              <a:t>result</a:t>
+            </a:r>
+            <a:r>
+              <a:rPr lang="it-IT" sz="1200" dirty="0">
+                <a:solidFill>
+                  <a:srgbClr val="D4D4D4"/>
+                </a:solidFill>
+                <a:latin typeface="Consolas" panose="020B0609020204030204" pitchFamily="49" charset="0"/>
+                <a:ea typeface="Times New Roman" panose="02020603050405020304" pitchFamily="18" charset="0"/>
+                <a:cs typeface="Times New Roman" panose="02020603050405020304" pitchFamily="18" charset="0"/>
+              </a:rPr>
+              <a:t>) &gt; </a:t>
+            </a:r>
+            <a:r>
+              <a:rPr lang="it-IT" sz="1200" dirty="0">
+                <a:solidFill>
+                  <a:srgbClr val="B5CEA8"/>
+                </a:solidFill>
+                <a:latin typeface="Consolas" panose="020B0609020204030204" pitchFamily="49" charset="0"/>
+                <a:ea typeface="Times New Roman" panose="02020603050405020304" pitchFamily="18" charset="0"/>
+                <a:cs typeface="Times New Roman" panose="02020603050405020304" pitchFamily="18" charset="0"/>
+              </a:rPr>
+              <a:t>0</a:t>
+            </a:r>
+            <a:r>
+              <a:rPr lang="it-IT" sz="1200" dirty="0">
+                <a:solidFill>
+                  <a:srgbClr val="D4D4D4"/>
+                </a:solidFill>
+                <a:latin typeface="Consolas" panose="020B0609020204030204" pitchFamily="49" charset="0"/>
+                <a:ea typeface="Times New Roman" panose="02020603050405020304" pitchFamily="18" charset="0"/>
+                <a:cs typeface="Times New Roman" panose="02020603050405020304" pitchFamily="18" charset="0"/>
+              </a:rPr>
+              <a:t>) {</a:t>
+            </a:r>
+            <a:endParaRPr lang="it-IT" sz="1200" dirty="0">
+              <a:latin typeface="Consolas" panose="020B0609020204030204" pitchFamily="49" charset="0"/>
+              <a:ea typeface="Calibri" panose="020F0502020204030204" pitchFamily="34" charset="0"/>
+              <a:cs typeface="Times New Roman" panose="02020603050405020304" pitchFamily="18" charset="0"/>
+            </a:endParaRPr>
+          </a:p>
+          <a:p>
+            <a:pPr>
+              <a:lnSpc>
+                <a:spcPct val="150000"/>
+              </a:lnSpc>
+              <a:spcAft>
+                <a:spcPts val="0"/>
+              </a:spcAft>
+            </a:pPr>
+            <a:r>
+              <a:rPr lang="it-IT" sz="1200" dirty="0">
+                <a:solidFill>
+                  <a:srgbClr val="D4D4D4"/>
+                </a:solidFill>
+                <a:latin typeface="Consolas" panose="020B0609020204030204" pitchFamily="49" charset="0"/>
+                <a:ea typeface="Times New Roman" panose="02020603050405020304" pitchFamily="18" charset="0"/>
+                <a:cs typeface="Times New Roman" panose="02020603050405020304" pitchFamily="18" charset="0"/>
+              </a:rPr>
+              <a:t>                </a:t>
+            </a:r>
+            <a:r>
+              <a:rPr lang="it-IT" sz="1200" dirty="0" err="1">
+                <a:solidFill>
+                  <a:srgbClr val="DCDCAA"/>
+                </a:solidFill>
+                <a:latin typeface="Consolas" panose="020B0609020204030204" pitchFamily="49" charset="0"/>
+                <a:ea typeface="Times New Roman" panose="02020603050405020304" pitchFamily="18" charset="0"/>
+                <a:cs typeface="Times New Roman" panose="02020603050405020304" pitchFamily="18" charset="0"/>
+              </a:rPr>
+              <a:t>printf</a:t>
+            </a:r>
+            <a:r>
+              <a:rPr lang="it-IT" sz="1200" dirty="0">
+                <a:solidFill>
+                  <a:srgbClr val="D4D4D4"/>
+                </a:solidFill>
+                <a:latin typeface="Consolas" panose="020B0609020204030204" pitchFamily="49" charset="0"/>
+                <a:ea typeface="Times New Roman" panose="02020603050405020304" pitchFamily="18" charset="0"/>
+                <a:cs typeface="Times New Roman" panose="02020603050405020304" pitchFamily="18" charset="0"/>
+              </a:rPr>
+              <a:t>(</a:t>
+            </a:r>
+            <a:r>
+              <a:rPr lang="it-IT" sz="1200" dirty="0">
+                <a:solidFill>
+                  <a:srgbClr val="CE9178"/>
+                </a:solidFill>
+                <a:latin typeface="Consolas" panose="020B0609020204030204" pitchFamily="49" charset="0"/>
+                <a:ea typeface="Times New Roman" panose="02020603050405020304" pitchFamily="18" charset="0"/>
+                <a:cs typeface="Times New Roman" panose="02020603050405020304" pitchFamily="18" charset="0"/>
+              </a:rPr>
+              <a:t>"La parola </a:t>
+            </a:r>
+            <a:r>
+              <a:rPr lang="it-IT" sz="1200" dirty="0" err="1">
+                <a:solidFill>
+                  <a:srgbClr val="CE9178"/>
+                </a:solidFill>
+                <a:latin typeface="Consolas" panose="020B0609020204030204" pitchFamily="49" charset="0"/>
+                <a:ea typeface="Times New Roman" panose="02020603050405020304" pitchFamily="18" charset="0"/>
+                <a:cs typeface="Times New Roman" panose="02020603050405020304" pitchFamily="18" charset="0"/>
+              </a:rPr>
+              <a:t>piu'</a:t>
+            </a:r>
+            <a:r>
+              <a:rPr lang="it-IT" sz="1200" dirty="0">
+                <a:solidFill>
+                  <a:srgbClr val="CE9178"/>
+                </a:solidFill>
+                <a:latin typeface="Consolas" panose="020B0609020204030204" pitchFamily="49" charset="0"/>
+                <a:ea typeface="Times New Roman" panose="02020603050405020304" pitchFamily="18" charset="0"/>
+                <a:cs typeface="Times New Roman" panose="02020603050405020304" pitchFamily="18" charset="0"/>
+              </a:rPr>
+              <a:t> lunga nel file richiesto ha %i caratteri.</a:t>
+            </a:r>
+            <a:r>
+              <a:rPr lang="it-IT" sz="1200" dirty="0">
+                <a:solidFill>
+                  <a:srgbClr val="D7BA7D"/>
+                </a:solidFill>
+                <a:latin typeface="Consolas" panose="020B0609020204030204" pitchFamily="49" charset="0"/>
+                <a:ea typeface="Times New Roman" panose="02020603050405020304" pitchFamily="18" charset="0"/>
+                <a:cs typeface="Times New Roman" panose="02020603050405020304" pitchFamily="18" charset="0"/>
+              </a:rPr>
+              <a:t>\n</a:t>
+            </a:r>
+            <a:r>
+              <a:rPr lang="it-IT" sz="1200" dirty="0">
+                <a:solidFill>
+                  <a:srgbClr val="CE9178"/>
+                </a:solidFill>
+                <a:latin typeface="Consolas" panose="020B0609020204030204" pitchFamily="49" charset="0"/>
+                <a:ea typeface="Times New Roman" panose="02020603050405020304" pitchFamily="18" charset="0"/>
+                <a:cs typeface="Times New Roman" panose="02020603050405020304" pitchFamily="18" charset="0"/>
+              </a:rPr>
+              <a:t>"</a:t>
+            </a:r>
+            <a:r>
+              <a:rPr lang="it-IT" sz="1200" dirty="0">
+                <a:solidFill>
+                  <a:srgbClr val="D4D4D4"/>
+                </a:solidFill>
+                <a:latin typeface="Consolas" panose="020B0609020204030204" pitchFamily="49" charset="0"/>
+                <a:ea typeface="Times New Roman" panose="02020603050405020304" pitchFamily="18" charset="0"/>
+                <a:cs typeface="Times New Roman" panose="02020603050405020304" pitchFamily="18" charset="0"/>
+              </a:rPr>
+              <a:t>, (</a:t>
+            </a:r>
+            <a:r>
+              <a:rPr lang="it-IT" sz="1200" dirty="0" err="1">
+                <a:solidFill>
+                  <a:srgbClr val="569CD6"/>
+                </a:solidFill>
+                <a:latin typeface="Consolas" panose="020B0609020204030204" pitchFamily="49" charset="0"/>
+                <a:ea typeface="Times New Roman" panose="02020603050405020304" pitchFamily="18" charset="0"/>
+                <a:cs typeface="Times New Roman" panose="02020603050405020304" pitchFamily="18" charset="0"/>
+              </a:rPr>
+              <a:t>int</a:t>
+            </a:r>
+            <a:r>
+              <a:rPr lang="it-IT" sz="1200" dirty="0">
+                <a:solidFill>
+                  <a:srgbClr val="D4D4D4"/>
+                </a:solidFill>
+                <a:latin typeface="Consolas" panose="020B0609020204030204" pitchFamily="49" charset="0"/>
+                <a:ea typeface="Times New Roman" panose="02020603050405020304" pitchFamily="18" charset="0"/>
+                <a:cs typeface="Times New Roman" panose="02020603050405020304" pitchFamily="18" charset="0"/>
+              </a:rPr>
+              <a:t>)</a:t>
+            </a:r>
+            <a:r>
+              <a:rPr lang="it-IT" sz="1200" dirty="0" err="1">
+                <a:solidFill>
+                  <a:srgbClr val="DCDCAA"/>
+                </a:solidFill>
+                <a:latin typeface="Consolas" panose="020B0609020204030204" pitchFamily="49" charset="0"/>
+                <a:ea typeface="Times New Roman" panose="02020603050405020304" pitchFamily="18" charset="0"/>
+                <a:cs typeface="Times New Roman" panose="02020603050405020304" pitchFamily="18" charset="0"/>
+              </a:rPr>
+              <a:t>ntohl</a:t>
+            </a:r>
+            <a:r>
+              <a:rPr lang="it-IT" sz="1200" dirty="0">
+                <a:solidFill>
+                  <a:srgbClr val="D4D4D4"/>
+                </a:solidFill>
+                <a:latin typeface="Consolas" panose="020B0609020204030204" pitchFamily="49" charset="0"/>
+                <a:ea typeface="Times New Roman" panose="02020603050405020304" pitchFamily="18" charset="0"/>
+                <a:cs typeface="Times New Roman" panose="02020603050405020304" pitchFamily="18" charset="0"/>
+              </a:rPr>
+              <a:t>(</a:t>
+            </a:r>
+            <a:r>
+              <a:rPr lang="it-IT" sz="1200" dirty="0" err="1">
+                <a:solidFill>
+                  <a:srgbClr val="D4D4D4"/>
+                </a:solidFill>
+                <a:latin typeface="Consolas" panose="020B0609020204030204" pitchFamily="49" charset="0"/>
+                <a:ea typeface="Times New Roman" panose="02020603050405020304" pitchFamily="18" charset="0"/>
+                <a:cs typeface="Times New Roman" panose="02020603050405020304" pitchFamily="18" charset="0"/>
+              </a:rPr>
+              <a:t>result</a:t>
+            </a:r>
+            <a:r>
+              <a:rPr lang="it-IT" sz="1200" dirty="0">
+                <a:solidFill>
+                  <a:srgbClr val="D4D4D4"/>
+                </a:solidFill>
+                <a:latin typeface="Consolas" panose="020B0609020204030204" pitchFamily="49" charset="0"/>
+                <a:ea typeface="Times New Roman" panose="02020603050405020304" pitchFamily="18" charset="0"/>
+                <a:cs typeface="Times New Roman" panose="02020603050405020304" pitchFamily="18" charset="0"/>
+              </a:rPr>
+              <a:t>));</a:t>
+            </a:r>
+            <a:endParaRPr lang="it-IT" sz="1200" dirty="0">
+              <a:latin typeface="Consolas" panose="020B0609020204030204" pitchFamily="49" charset="0"/>
+              <a:ea typeface="Calibri" panose="020F0502020204030204" pitchFamily="34" charset="0"/>
+              <a:cs typeface="Times New Roman" panose="02020603050405020304" pitchFamily="18" charset="0"/>
+            </a:endParaRPr>
+          </a:p>
+          <a:p>
+            <a:pPr>
+              <a:lnSpc>
+                <a:spcPct val="150000"/>
+              </a:lnSpc>
+              <a:spcAft>
+                <a:spcPts val="0"/>
+              </a:spcAft>
+            </a:pPr>
+            <a:r>
+              <a:rPr lang="it-IT" sz="1200" dirty="0">
+                <a:solidFill>
+                  <a:srgbClr val="D4D4D4"/>
+                </a:solidFill>
+                <a:latin typeface="Consolas" panose="020B0609020204030204" pitchFamily="49" charset="0"/>
+                <a:ea typeface="Times New Roman" panose="02020603050405020304" pitchFamily="18" charset="0"/>
+                <a:cs typeface="Times New Roman" panose="02020603050405020304" pitchFamily="18" charset="0"/>
+              </a:rPr>
+              <a:t>            } </a:t>
+            </a:r>
+            <a:r>
+              <a:rPr lang="it-IT" sz="1200" dirty="0">
+                <a:solidFill>
+                  <a:srgbClr val="C586C0"/>
+                </a:solidFill>
+                <a:latin typeface="Consolas" panose="020B0609020204030204" pitchFamily="49" charset="0"/>
+                <a:ea typeface="Times New Roman" panose="02020603050405020304" pitchFamily="18" charset="0"/>
+                <a:cs typeface="Times New Roman" panose="02020603050405020304" pitchFamily="18" charset="0"/>
+              </a:rPr>
+              <a:t>else</a:t>
+            </a:r>
+            <a:r>
+              <a:rPr lang="it-IT" sz="1200" dirty="0">
+                <a:solidFill>
+                  <a:srgbClr val="D4D4D4"/>
+                </a:solidFill>
+                <a:latin typeface="Consolas" panose="020B0609020204030204" pitchFamily="49" charset="0"/>
+                <a:ea typeface="Times New Roman" panose="02020603050405020304" pitchFamily="18" charset="0"/>
+                <a:cs typeface="Times New Roman" panose="02020603050405020304" pitchFamily="18" charset="0"/>
+              </a:rPr>
+              <a:t> </a:t>
+            </a:r>
+            <a:r>
+              <a:rPr lang="it-IT" sz="1200" dirty="0" err="1">
+                <a:solidFill>
+                  <a:srgbClr val="C586C0"/>
+                </a:solidFill>
+                <a:latin typeface="Consolas" panose="020B0609020204030204" pitchFamily="49" charset="0"/>
+                <a:ea typeface="Times New Roman" panose="02020603050405020304" pitchFamily="18" charset="0"/>
+                <a:cs typeface="Times New Roman" panose="02020603050405020304" pitchFamily="18" charset="0"/>
+              </a:rPr>
+              <a:t>if</a:t>
+            </a:r>
+            <a:r>
+              <a:rPr lang="it-IT" sz="1200" dirty="0">
+                <a:solidFill>
+                  <a:srgbClr val="D4D4D4"/>
+                </a:solidFill>
+                <a:latin typeface="Consolas" panose="020B0609020204030204" pitchFamily="49" charset="0"/>
+                <a:ea typeface="Times New Roman" panose="02020603050405020304" pitchFamily="18" charset="0"/>
+                <a:cs typeface="Times New Roman" panose="02020603050405020304" pitchFamily="18" charset="0"/>
+              </a:rPr>
+              <a:t> ((</a:t>
+            </a:r>
+            <a:r>
+              <a:rPr lang="it-IT" sz="1200" dirty="0" err="1">
+                <a:solidFill>
+                  <a:srgbClr val="569CD6"/>
+                </a:solidFill>
+                <a:latin typeface="Consolas" panose="020B0609020204030204" pitchFamily="49" charset="0"/>
+                <a:ea typeface="Times New Roman" panose="02020603050405020304" pitchFamily="18" charset="0"/>
+                <a:cs typeface="Times New Roman" panose="02020603050405020304" pitchFamily="18" charset="0"/>
+              </a:rPr>
+              <a:t>int</a:t>
+            </a:r>
+            <a:r>
+              <a:rPr lang="it-IT" sz="1200" dirty="0">
+                <a:solidFill>
+                  <a:srgbClr val="D4D4D4"/>
+                </a:solidFill>
+                <a:latin typeface="Consolas" panose="020B0609020204030204" pitchFamily="49" charset="0"/>
+                <a:ea typeface="Times New Roman" panose="02020603050405020304" pitchFamily="18" charset="0"/>
+                <a:cs typeface="Times New Roman" panose="02020603050405020304" pitchFamily="18" charset="0"/>
+              </a:rPr>
+              <a:t>)</a:t>
+            </a:r>
+            <a:r>
+              <a:rPr lang="it-IT" sz="1200" dirty="0" err="1">
+                <a:solidFill>
+                  <a:srgbClr val="DCDCAA"/>
+                </a:solidFill>
+                <a:latin typeface="Consolas" panose="020B0609020204030204" pitchFamily="49" charset="0"/>
+                <a:ea typeface="Times New Roman" panose="02020603050405020304" pitchFamily="18" charset="0"/>
+                <a:cs typeface="Times New Roman" panose="02020603050405020304" pitchFamily="18" charset="0"/>
+              </a:rPr>
+              <a:t>ntohl</a:t>
+            </a:r>
+            <a:r>
+              <a:rPr lang="it-IT" sz="1200" dirty="0">
+                <a:solidFill>
+                  <a:srgbClr val="D4D4D4"/>
+                </a:solidFill>
+                <a:latin typeface="Consolas" panose="020B0609020204030204" pitchFamily="49" charset="0"/>
+                <a:ea typeface="Times New Roman" panose="02020603050405020304" pitchFamily="18" charset="0"/>
+                <a:cs typeface="Times New Roman" panose="02020603050405020304" pitchFamily="18" charset="0"/>
+              </a:rPr>
+              <a:t>(</a:t>
+            </a:r>
+            <a:r>
+              <a:rPr lang="it-IT" sz="1200" dirty="0" err="1">
+                <a:solidFill>
+                  <a:srgbClr val="D4D4D4"/>
+                </a:solidFill>
+                <a:latin typeface="Consolas" panose="020B0609020204030204" pitchFamily="49" charset="0"/>
+                <a:ea typeface="Times New Roman" panose="02020603050405020304" pitchFamily="18" charset="0"/>
+                <a:cs typeface="Times New Roman" panose="02020603050405020304" pitchFamily="18" charset="0"/>
+              </a:rPr>
+              <a:t>result</a:t>
+            </a:r>
+            <a:r>
+              <a:rPr lang="it-IT" sz="1200" dirty="0">
+                <a:solidFill>
+                  <a:srgbClr val="D4D4D4"/>
+                </a:solidFill>
+                <a:latin typeface="Consolas" panose="020B0609020204030204" pitchFamily="49" charset="0"/>
+                <a:ea typeface="Times New Roman" panose="02020603050405020304" pitchFamily="18" charset="0"/>
+                <a:cs typeface="Times New Roman" panose="02020603050405020304" pitchFamily="18" charset="0"/>
+              </a:rPr>
+              <a:t>) == </a:t>
+            </a:r>
+            <a:r>
+              <a:rPr lang="it-IT" sz="1200" dirty="0">
+                <a:solidFill>
+                  <a:srgbClr val="B5CEA8"/>
+                </a:solidFill>
+                <a:latin typeface="Consolas" panose="020B0609020204030204" pitchFamily="49" charset="0"/>
+                <a:ea typeface="Times New Roman" panose="02020603050405020304" pitchFamily="18" charset="0"/>
+                <a:cs typeface="Times New Roman" panose="02020603050405020304" pitchFamily="18" charset="0"/>
+              </a:rPr>
+              <a:t>0</a:t>
+            </a:r>
+            <a:r>
+              <a:rPr lang="it-IT" sz="1200" dirty="0">
+                <a:solidFill>
+                  <a:srgbClr val="D4D4D4"/>
+                </a:solidFill>
+                <a:latin typeface="Consolas" panose="020B0609020204030204" pitchFamily="49" charset="0"/>
+                <a:ea typeface="Times New Roman" panose="02020603050405020304" pitchFamily="18" charset="0"/>
+                <a:cs typeface="Times New Roman" panose="02020603050405020304" pitchFamily="18" charset="0"/>
+              </a:rPr>
+              <a:t>) {</a:t>
+            </a:r>
+            <a:endParaRPr lang="it-IT" sz="1200" dirty="0">
+              <a:latin typeface="Consolas" panose="020B0609020204030204" pitchFamily="49" charset="0"/>
+              <a:ea typeface="Calibri" panose="020F0502020204030204" pitchFamily="34" charset="0"/>
+              <a:cs typeface="Times New Roman" panose="02020603050405020304" pitchFamily="18" charset="0"/>
+            </a:endParaRPr>
+          </a:p>
+          <a:p>
+            <a:pPr>
+              <a:lnSpc>
+                <a:spcPct val="150000"/>
+              </a:lnSpc>
+              <a:spcAft>
+                <a:spcPts val="0"/>
+              </a:spcAft>
+            </a:pPr>
+            <a:r>
+              <a:rPr lang="it-IT" sz="1200" dirty="0">
+                <a:solidFill>
+                  <a:srgbClr val="D4D4D4"/>
+                </a:solidFill>
+                <a:latin typeface="Consolas" panose="020B0609020204030204" pitchFamily="49" charset="0"/>
+                <a:ea typeface="Times New Roman" panose="02020603050405020304" pitchFamily="18" charset="0"/>
+                <a:cs typeface="Times New Roman" panose="02020603050405020304" pitchFamily="18" charset="0"/>
+              </a:rPr>
+              <a:t>                </a:t>
+            </a:r>
+            <a:r>
+              <a:rPr lang="it-IT" sz="1200" dirty="0" err="1">
+                <a:solidFill>
+                  <a:srgbClr val="DCDCAA"/>
+                </a:solidFill>
+                <a:latin typeface="Consolas" panose="020B0609020204030204" pitchFamily="49" charset="0"/>
+                <a:ea typeface="Times New Roman" panose="02020603050405020304" pitchFamily="18" charset="0"/>
+                <a:cs typeface="Times New Roman" panose="02020603050405020304" pitchFamily="18" charset="0"/>
+              </a:rPr>
+              <a:t>printf</a:t>
+            </a:r>
+            <a:r>
+              <a:rPr lang="it-IT" sz="1200" dirty="0">
+                <a:solidFill>
+                  <a:srgbClr val="D4D4D4"/>
+                </a:solidFill>
+                <a:latin typeface="Consolas" panose="020B0609020204030204" pitchFamily="49" charset="0"/>
+                <a:ea typeface="Times New Roman" panose="02020603050405020304" pitchFamily="18" charset="0"/>
+                <a:cs typeface="Times New Roman" panose="02020603050405020304" pitchFamily="18" charset="0"/>
+              </a:rPr>
+              <a:t>(</a:t>
+            </a:r>
+            <a:r>
+              <a:rPr lang="it-IT" sz="1200" dirty="0">
+                <a:solidFill>
+                  <a:srgbClr val="CE9178"/>
+                </a:solidFill>
+                <a:latin typeface="Consolas" panose="020B0609020204030204" pitchFamily="49" charset="0"/>
+                <a:ea typeface="Times New Roman" panose="02020603050405020304" pitchFamily="18" charset="0"/>
+                <a:cs typeface="Times New Roman" panose="02020603050405020304" pitchFamily="18" charset="0"/>
+              </a:rPr>
+              <a:t>"Nel file richiesto non ci sono parole.</a:t>
+            </a:r>
+            <a:r>
+              <a:rPr lang="it-IT" sz="1200" dirty="0">
+                <a:solidFill>
+                  <a:srgbClr val="D7BA7D"/>
+                </a:solidFill>
+                <a:latin typeface="Consolas" panose="020B0609020204030204" pitchFamily="49" charset="0"/>
+                <a:ea typeface="Times New Roman" panose="02020603050405020304" pitchFamily="18" charset="0"/>
+                <a:cs typeface="Times New Roman" panose="02020603050405020304" pitchFamily="18" charset="0"/>
+              </a:rPr>
+              <a:t>\n</a:t>
+            </a:r>
+            <a:r>
+              <a:rPr lang="it-IT" sz="1200" dirty="0">
+                <a:solidFill>
+                  <a:srgbClr val="CE9178"/>
+                </a:solidFill>
+                <a:latin typeface="Consolas" panose="020B0609020204030204" pitchFamily="49" charset="0"/>
+                <a:ea typeface="Times New Roman" panose="02020603050405020304" pitchFamily="18" charset="0"/>
+                <a:cs typeface="Times New Roman" panose="02020603050405020304" pitchFamily="18" charset="0"/>
+              </a:rPr>
+              <a:t>"</a:t>
+            </a:r>
+            <a:r>
+              <a:rPr lang="it-IT" sz="1200" dirty="0">
+                <a:solidFill>
+                  <a:srgbClr val="D4D4D4"/>
+                </a:solidFill>
+                <a:latin typeface="Consolas" panose="020B0609020204030204" pitchFamily="49" charset="0"/>
+                <a:ea typeface="Times New Roman" panose="02020603050405020304" pitchFamily="18" charset="0"/>
+                <a:cs typeface="Times New Roman" panose="02020603050405020304" pitchFamily="18" charset="0"/>
+              </a:rPr>
+              <a:t>);</a:t>
+            </a:r>
+            <a:endParaRPr lang="it-IT" sz="1200" dirty="0">
+              <a:latin typeface="Consolas" panose="020B0609020204030204" pitchFamily="49" charset="0"/>
+              <a:ea typeface="Calibri" panose="020F0502020204030204" pitchFamily="34" charset="0"/>
+              <a:cs typeface="Times New Roman" panose="02020603050405020304" pitchFamily="18" charset="0"/>
+            </a:endParaRPr>
+          </a:p>
+          <a:p>
+            <a:pPr>
+              <a:lnSpc>
+                <a:spcPct val="150000"/>
+              </a:lnSpc>
+              <a:spcAft>
+                <a:spcPts val="0"/>
+              </a:spcAft>
+            </a:pPr>
+            <a:r>
+              <a:rPr lang="it-IT" sz="1200" dirty="0">
+                <a:solidFill>
+                  <a:srgbClr val="D4D4D4"/>
+                </a:solidFill>
+                <a:latin typeface="Consolas" panose="020B0609020204030204" pitchFamily="49" charset="0"/>
+                <a:ea typeface="Times New Roman" panose="02020603050405020304" pitchFamily="18" charset="0"/>
+                <a:cs typeface="Times New Roman" panose="02020603050405020304" pitchFamily="18" charset="0"/>
+              </a:rPr>
+              <a:t>            } </a:t>
+            </a:r>
+            <a:r>
+              <a:rPr lang="it-IT" sz="1200" dirty="0">
+                <a:solidFill>
+                  <a:srgbClr val="C586C0"/>
+                </a:solidFill>
+                <a:latin typeface="Consolas" panose="020B0609020204030204" pitchFamily="49" charset="0"/>
+                <a:ea typeface="Times New Roman" panose="02020603050405020304" pitchFamily="18" charset="0"/>
+                <a:cs typeface="Times New Roman" panose="02020603050405020304" pitchFamily="18" charset="0"/>
+              </a:rPr>
+              <a:t>else</a:t>
+            </a:r>
+            <a:r>
+              <a:rPr lang="it-IT" sz="1200" dirty="0">
+                <a:solidFill>
+                  <a:srgbClr val="D4D4D4"/>
+                </a:solidFill>
+                <a:latin typeface="Consolas" panose="020B0609020204030204" pitchFamily="49" charset="0"/>
+                <a:ea typeface="Times New Roman" panose="02020603050405020304" pitchFamily="18" charset="0"/>
+                <a:cs typeface="Times New Roman" panose="02020603050405020304" pitchFamily="18" charset="0"/>
+              </a:rPr>
+              <a:t> {</a:t>
+            </a:r>
+            <a:endParaRPr lang="it-IT" sz="1200" dirty="0">
+              <a:latin typeface="Consolas" panose="020B0609020204030204" pitchFamily="49" charset="0"/>
+              <a:ea typeface="Calibri" panose="020F0502020204030204" pitchFamily="34" charset="0"/>
+              <a:cs typeface="Times New Roman" panose="02020603050405020304" pitchFamily="18" charset="0"/>
+            </a:endParaRPr>
+          </a:p>
+          <a:p>
+            <a:pPr>
+              <a:lnSpc>
+                <a:spcPct val="150000"/>
+              </a:lnSpc>
+              <a:spcAft>
+                <a:spcPts val="0"/>
+              </a:spcAft>
+            </a:pPr>
+            <a:r>
+              <a:rPr lang="it-IT" sz="1200" dirty="0">
+                <a:solidFill>
+                  <a:srgbClr val="D4D4D4"/>
+                </a:solidFill>
+                <a:latin typeface="Consolas" panose="020B0609020204030204" pitchFamily="49" charset="0"/>
+                <a:ea typeface="Times New Roman" panose="02020603050405020304" pitchFamily="18" charset="0"/>
+                <a:cs typeface="Times New Roman" panose="02020603050405020304" pitchFamily="18" charset="0"/>
+              </a:rPr>
+              <a:t>                </a:t>
+            </a:r>
+            <a:r>
+              <a:rPr lang="it-IT" sz="1200" dirty="0" err="1">
+                <a:solidFill>
+                  <a:srgbClr val="DCDCAA"/>
+                </a:solidFill>
+                <a:latin typeface="Consolas" panose="020B0609020204030204" pitchFamily="49" charset="0"/>
+                <a:ea typeface="Times New Roman" panose="02020603050405020304" pitchFamily="18" charset="0"/>
+                <a:cs typeface="Times New Roman" panose="02020603050405020304" pitchFamily="18" charset="0"/>
+              </a:rPr>
+              <a:t>printf</a:t>
+            </a:r>
+            <a:r>
+              <a:rPr lang="it-IT" sz="1200" dirty="0">
+                <a:solidFill>
+                  <a:srgbClr val="D4D4D4"/>
+                </a:solidFill>
+                <a:latin typeface="Consolas" panose="020B0609020204030204" pitchFamily="49" charset="0"/>
+                <a:ea typeface="Times New Roman" panose="02020603050405020304" pitchFamily="18" charset="0"/>
+                <a:cs typeface="Times New Roman" panose="02020603050405020304" pitchFamily="18" charset="0"/>
+              </a:rPr>
+              <a:t>(</a:t>
+            </a:r>
+            <a:r>
+              <a:rPr lang="it-IT" sz="1200" dirty="0">
+                <a:solidFill>
+                  <a:srgbClr val="CE9178"/>
+                </a:solidFill>
+                <a:latin typeface="Consolas" panose="020B0609020204030204" pitchFamily="49" charset="0"/>
+                <a:ea typeface="Times New Roman" panose="02020603050405020304" pitchFamily="18" charset="0"/>
+                <a:cs typeface="Times New Roman" panose="02020603050405020304" pitchFamily="18" charset="0"/>
+              </a:rPr>
+              <a:t>"Il file %s non esiste sul server.</a:t>
+            </a:r>
+            <a:r>
+              <a:rPr lang="it-IT" sz="1200" dirty="0">
+                <a:solidFill>
+                  <a:srgbClr val="D7BA7D"/>
+                </a:solidFill>
+                <a:latin typeface="Consolas" panose="020B0609020204030204" pitchFamily="49" charset="0"/>
+                <a:ea typeface="Times New Roman" panose="02020603050405020304" pitchFamily="18" charset="0"/>
+                <a:cs typeface="Times New Roman" panose="02020603050405020304" pitchFamily="18" charset="0"/>
+              </a:rPr>
+              <a:t>\n</a:t>
+            </a:r>
+            <a:r>
+              <a:rPr lang="it-IT" sz="1200" dirty="0">
+                <a:solidFill>
+                  <a:srgbClr val="CE9178"/>
+                </a:solidFill>
+                <a:latin typeface="Consolas" panose="020B0609020204030204" pitchFamily="49" charset="0"/>
+                <a:ea typeface="Times New Roman" panose="02020603050405020304" pitchFamily="18" charset="0"/>
+                <a:cs typeface="Times New Roman" panose="02020603050405020304" pitchFamily="18" charset="0"/>
+              </a:rPr>
+              <a:t>"</a:t>
+            </a:r>
+            <a:r>
+              <a:rPr lang="it-IT" sz="1200" dirty="0">
+                <a:solidFill>
+                  <a:srgbClr val="D4D4D4"/>
+                </a:solidFill>
+                <a:latin typeface="Consolas" panose="020B0609020204030204" pitchFamily="49" charset="0"/>
+                <a:ea typeface="Times New Roman" panose="02020603050405020304" pitchFamily="18" charset="0"/>
+                <a:cs typeface="Times New Roman" panose="02020603050405020304" pitchFamily="18" charset="0"/>
+              </a:rPr>
+              <a:t>, </a:t>
+            </a:r>
+            <a:r>
+              <a:rPr lang="it-IT" sz="1200" dirty="0" err="1">
+                <a:solidFill>
+                  <a:srgbClr val="D4D4D4"/>
+                </a:solidFill>
+                <a:latin typeface="Consolas" panose="020B0609020204030204" pitchFamily="49" charset="0"/>
+                <a:ea typeface="Times New Roman" panose="02020603050405020304" pitchFamily="18" charset="0"/>
+                <a:cs typeface="Times New Roman" panose="02020603050405020304" pitchFamily="18" charset="0"/>
+              </a:rPr>
+              <a:t>fileName</a:t>
+            </a:r>
+            <a:r>
+              <a:rPr lang="it-IT" sz="1200" dirty="0">
+                <a:solidFill>
+                  <a:srgbClr val="D4D4D4"/>
+                </a:solidFill>
+                <a:latin typeface="Consolas" panose="020B0609020204030204" pitchFamily="49" charset="0"/>
+                <a:ea typeface="Times New Roman" panose="02020603050405020304" pitchFamily="18" charset="0"/>
+                <a:cs typeface="Times New Roman" panose="02020603050405020304" pitchFamily="18" charset="0"/>
+              </a:rPr>
+              <a:t>);</a:t>
+            </a:r>
+            <a:endParaRPr lang="it-IT" sz="1200" dirty="0">
+              <a:latin typeface="Consolas" panose="020B0609020204030204" pitchFamily="49" charset="0"/>
+              <a:ea typeface="Calibri" panose="020F0502020204030204" pitchFamily="34" charset="0"/>
+              <a:cs typeface="Times New Roman" panose="02020603050405020304" pitchFamily="18" charset="0"/>
+            </a:endParaRPr>
+          </a:p>
+          <a:p>
+            <a:pPr>
+              <a:lnSpc>
+                <a:spcPct val="150000"/>
+              </a:lnSpc>
+              <a:spcAft>
+                <a:spcPts val="0"/>
+              </a:spcAft>
+            </a:pPr>
+            <a:r>
+              <a:rPr lang="it-IT" sz="1200" dirty="0">
+                <a:solidFill>
+                  <a:srgbClr val="D4D4D4"/>
+                </a:solidFill>
+                <a:latin typeface="Consolas" panose="020B0609020204030204" pitchFamily="49" charset="0"/>
+                <a:ea typeface="Times New Roman" panose="02020603050405020304" pitchFamily="18" charset="0"/>
+                <a:cs typeface="Times New Roman" panose="02020603050405020304" pitchFamily="18" charset="0"/>
+              </a:rPr>
+              <a:t>            }</a:t>
+            </a:r>
+            <a:endParaRPr lang="it-IT" sz="1200" dirty="0">
+              <a:latin typeface="Consolas" panose="020B0609020204030204" pitchFamily="49" charset="0"/>
+              <a:ea typeface="Calibri" panose="020F0502020204030204" pitchFamily="34" charset="0"/>
+              <a:cs typeface="Times New Roman" panose="02020603050405020304" pitchFamily="18" charset="0"/>
+            </a:endParaRPr>
+          </a:p>
+          <a:p>
+            <a:pPr>
+              <a:lnSpc>
+                <a:spcPct val="150000"/>
+              </a:lnSpc>
+              <a:spcAft>
+                <a:spcPts val="0"/>
+              </a:spcAft>
+            </a:pPr>
+            <a:r>
+              <a:rPr lang="it-IT" sz="1200" dirty="0">
+                <a:solidFill>
+                  <a:srgbClr val="D4D4D4"/>
+                </a:solidFill>
+                <a:latin typeface="Consolas" panose="020B0609020204030204" pitchFamily="49" charset="0"/>
+                <a:ea typeface="Times New Roman" panose="02020603050405020304" pitchFamily="18" charset="0"/>
+                <a:cs typeface="Times New Roman" panose="02020603050405020304" pitchFamily="18" charset="0"/>
+              </a:rPr>
+              <a:t>        } </a:t>
+            </a:r>
+            <a:r>
+              <a:rPr lang="it-IT" sz="1200" dirty="0">
+                <a:solidFill>
+                  <a:srgbClr val="C586C0"/>
+                </a:solidFill>
+                <a:latin typeface="Consolas" panose="020B0609020204030204" pitchFamily="49" charset="0"/>
+                <a:ea typeface="Times New Roman" panose="02020603050405020304" pitchFamily="18" charset="0"/>
+                <a:cs typeface="Times New Roman" panose="02020603050405020304" pitchFamily="18" charset="0"/>
+              </a:rPr>
+              <a:t>else</a:t>
+            </a:r>
+            <a:r>
+              <a:rPr lang="it-IT" sz="1200" dirty="0">
+                <a:solidFill>
+                  <a:srgbClr val="D4D4D4"/>
+                </a:solidFill>
+                <a:latin typeface="Consolas" panose="020B0609020204030204" pitchFamily="49" charset="0"/>
+                <a:ea typeface="Times New Roman" panose="02020603050405020304" pitchFamily="18" charset="0"/>
+                <a:cs typeface="Times New Roman" panose="02020603050405020304" pitchFamily="18" charset="0"/>
+              </a:rPr>
+              <a:t> {</a:t>
+            </a:r>
+            <a:endParaRPr lang="it-IT" sz="1200" dirty="0">
+              <a:latin typeface="Consolas" panose="020B0609020204030204" pitchFamily="49" charset="0"/>
+              <a:ea typeface="Calibri" panose="020F0502020204030204" pitchFamily="34" charset="0"/>
+              <a:cs typeface="Times New Roman" panose="02020603050405020304" pitchFamily="18" charset="0"/>
+            </a:endParaRPr>
+          </a:p>
+          <a:p>
+            <a:pPr>
+              <a:lnSpc>
+                <a:spcPct val="150000"/>
+              </a:lnSpc>
+              <a:spcAft>
+                <a:spcPts val="0"/>
+              </a:spcAft>
+            </a:pPr>
+            <a:r>
+              <a:rPr lang="it-IT" sz="1200" dirty="0">
+                <a:solidFill>
+                  <a:srgbClr val="D4D4D4"/>
+                </a:solidFill>
+                <a:latin typeface="Consolas" panose="020B0609020204030204" pitchFamily="49" charset="0"/>
+                <a:ea typeface="Times New Roman" panose="02020603050405020304" pitchFamily="18" charset="0"/>
+                <a:cs typeface="Times New Roman" panose="02020603050405020304" pitchFamily="18" charset="0"/>
+              </a:rPr>
+              <a:t>            </a:t>
+            </a:r>
+            <a:r>
+              <a:rPr lang="it-IT" sz="1200" dirty="0" err="1">
+                <a:solidFill>
+                  <a:srgbClr val="DCDCAA"/>
+                </a:solidFill>
+                <a:latin typeface="Consolas" panose="020B0609020204030204" pitchFamily="49" charset="0"/>
+                <a:ea typeface="Times New Roman" panose="02020603050405020304" pitchFamily="18" charset="0"/>
+                <a:cs typeface="Times New Roman" panose="02020603050405020304" pitchFamily="18" charset="0"/>
+              </a:rPr>
+              <a:t>printf</a:t>
+            </a:r>
+            <a:r>
+              <a:rPr lang="it-IT" sz="1200" dirty="0">
+                <a:solidFill>
+                  <a:srgbClr val="D4D4D4"/>
+                </a:solidFill>
+                <a:latin typeface="Consolas" panose="020B0609020204030204" pitchFamily="49" charset="0"/>
+                <a:ea typeface="Times New Roman" panose="02020603050405020304" pitchFamily="18" charset="0"/>
+                <a:cs typeface="Times New Roman" panose="02020603050405020304" pitchFamily="18" charset="0"/>
+              </a:rPr>
+              <a:t>(</a:t>
+            </a:r>
+            <a:r>
+              <a:rPr lang="it-IT" sz="1200" dirty="0">
+                <a:solidFill>
+                  <a:srgbClr val="CE9178"/>
+                </a:solidFill>
+                <a:latin typeface="Consolas" panose="020B0609020204030204" pitchFamily="49" charset="0"/>
+                <a:ea typeface="Times New Roman" panose="02020603050405020304" pitchFamily="18" charset="0"/>
+                <a:cs typeface="Times New Roman" panose="02020603050405020304" pitchFamily="18" charset="0"/>
+              </a:rPr>
+              <a:t>"Il file inserito non è un file di testo (*.</a:t>
+            </a:r>
+            <a:r>
+              <a:rPr lang="it-IT" sz="1200" dirty="0" err="1">
+                <a:solidFill>
+                  <a:srgbClr val="CE9178"/>
+                </a:solidFill>
+                <a:latin typeface="Consolas" panose="020B0609020204030204" pitchFamily="49" charset="0"/>
+                <a:ea typeface="Times New Roman" panose="02020603050405020304" pitchFamily="18" charset="0"/>
+                <a:cs typeface="Times New Roman" panose="02020603050405020304" pitchFamily="18" charset="0"/>
+              </a:rPr>
+              <a:t>txt</a:t>
+            </a:r>
+            <a:r>
+              <a:rPr lang="it-IT" sz="1200" dirty="0">
+                <a:solidFill>
+                  <a:srgbClr val="CE9178"/>
+                </a:solidFill>
+                <a:latin typeface="Consolas" panose="020B0609020204030204" pitchFamily="49" charset="0"/>
+                <a:ea typeface="Times New Roman" panose="02020603050405020304" pitchFamily="18" charset="0"/>
+                <a:cs typeface="Times New Roman" panose="02020603050405020304" pitchFamily="18" charset="0"/>
+              </a:rPr>
+              <a:t>).</a:t>
+            </a:r>
+            <a:r>
+              <a:rPr lang="it-IT" sz="1200" dirty="0">
+                <a:solidFill>
+                  <a:srgbClr val="D7BA7D"/>
+                </a:solidFill>
+                <a:latin typeface="Consolas" panose="020B0609020204030204" pitchFamily="49" charset="0"/>
+                <a:ea typeface="Times New Roman" panose="02020603050405020304" pitchFamily="18" charset="0"/>
+                <a:cs typeface="Times New Roman" panose="02020603050405020304" pitchFamily="18" charset="0"/>
+              </a:rPr>
+              <a:t>\n</a:t>
+            </a:r>
+            <a:r>
+              <a:rPr lang="it-IT" sz="1200" dirty="0">
+                <a:solidFill>
+                  <a:srgbClr val="CE9178"/>
+                </a:solidFill>
+                <a:latin typeface="Consolas" panose="020B0609020204030204" pitchFamily="49" charset="0"/>
+                <a:ea typeface="Times New Roman" panose="02020603050405020304" pitchFamily="18" charset="0"/>
+                <a:cs typeface="Times New Roman" panose="02020603050405020304" pitchFamily="18" charset="0"/>
+              </a:rPr>
+              <a:t>"</a:t>
+            </a:r>
+            <a:r>
+              <a:rPr lang="it-IT" sz="1200" dirty="0">
+                <a:solidFill>
+                  <a:srgbClr val="D4D4D4"/>
+                </a:solidFill>
+                <a:latin typeface="Consolas" panose="020B0609020204030204" pitchFamily="49" charset="0"/>
+                <a:ea typeface="Times New Roman" panose="02020603050405020304" pitchFamily="18" charset="0"/>
+                <a:cs typeface="Times New Roman" panose="02020603050405020304" pitchFamily="18" charset="0"/>
+              </a:rPr>
+              <a:t>);</a:t>
+            </a:r>
+            <a:endParaRPr lang="it-IT" sz="1200" dirty="0">
+              <a:latin typeface="Consolas" panose="020B0609020204030204" pitchFamily="49" charset="0"/>
+              <a:ea typeface="Calibri" panose="020F0502020204030204" pitchFamily="34" charset="0"/>
+              <a:cs typeface="Times New Roman" panose="02020603050405020304" pitchFamily="18" charset="0"/>
+            </a:endParaRPr>
+          </a:p>
+          <a:p>
+            <a:pPr>
+              <a:lnSpc>
+                <a:spcPct val="150000"/>
+              </a:lnSpc>
+              <a:spcAft>
+                <a:spcPts val="0"/>
+              </a:spcAft>
+            </a:pPr>
+            <a:r>
+              <a:rPr lang="it-IT" sz="1200" dirty="0">
+                <a:solidFill>
+                  <a:srgbClr val="D4D4D4"/>
+                </a:solidFill>
+                <a:latin typeface="Consolas" panose="020B0609020204030204" pitchFamily="49" charset="0"/>
+                <a:ea typeface="Times New Roman" panose="02020603050405020304" pitchFamily="18" charset="0"/>
+                <a:cs typeface="Times New Roman" panose="02020603050405020304" pitchFamily="18" charset="0"/>
+              </a:rPr>
+              <a:t>        }</a:t>
+            </a:r>
+            <a:endParaRPr lang="it-IT" sz="1200" dirty="0">
+              <a:latin typeface="Consolas" panose="020B0609020204030204" pitchFamily="49" charset="0"/>
+              <a:ea typeface="Calibri" panose="020F0502020204030204" pitchFamily="34" charset="0"/>
+              <a:cs typeface="Times New Roman" panose="02020603050405020304" pitchFamily="18" charset="0"/>
+            </a:endParaRPr>
+          </a:p>
+          <a:p>
+            <a:pPr>
+              <a:lnSpc>
+                <a:spcPct val="150000"/>
+              </a:lnSpc>
+              <a:spcAft>
+                <a:spcPts val="0"/>
+              </a:spcAft>
+            </a:pPr>
+            <a:r>
+              <a:rPr lang="it-IT" sz="1200" dirty="0">
+                <a:solidFill>
+                  <a:srgbClr val="D4D4D4"/>
+                </a:solidFill>
+                <a:latin typeface="Consolas" panose="020B0609020204030204" pitchFamily="49" charset="0"/>
+                <a:ea typeface="Times New Roman" panose="02020603050405020304" pitchFamily="18" charset="0"/>
+                <a:cs typeface="Times New Roman" panose="02020603050405020304" pitchFamily="18" charset="0"/>
+              </a:rPr>
+              <a:t> </a:t>
+            </a:r>
+            <a:endParaRPr lang="it-IT" sz="1200" dirty="0">
+              <a:latin typeface="Consolas" panose="020B0609020204030204" pitchFamily="49" charset="0"/>
+              <a:ea typeface="Calibri" panose="020F0502020204030204" pitchFamily="34" charset="0"/>
+              <a:cs typeface="Times New Roman" panose="02020603050405020304" pitchFamily="18" charset="0"/>
+            </a:endParaRPr>
+          </a:p>
+          <a:p>
+            <a:pPr>
+              <a:lnSpc>
+                <a:spcPct val="150000"/>
+              </a:lnSpc>
+              <a:spcAft>
+                <a:spcPts val="0"/>
+              </a:spcAft>
+            </a:pPr>
+            <a:r>
+              <a:rPr lang="it-IT" sz="1200" dirty="0">
+                <a:solidFill>
+                  <a:srgbClr val="D4D4D4"/>
+                </a:solidFill>
+                <a:latin typeface="Consolas" panose="020B0609020204030204" pitchFamily="49" charset="0"/>
+                <a:ea typeface="Times New Roman" panose="02020603050405020304" pitchFamily="18" charset="0"/>
+                <a:cs typeface="Times New Roman" panose="02020603050405020304" pitchFamily="18" charset="0"/>
+              </a:rPr>
+              <a:t>        </a:t>
+            </a:r>
+            <a:r>
+              <a:rPr lang="it-IT" sz="1200" dirty="0" err="1">
+                <a:solidFill>
+                  <a:srgbClr val="DCDCAA"/>
+                </a:solidFill>
+                <a:latin typeface="Consolas" panose="020B0609020204030204" pitchFamily="49" charset="0"/>
+                <a:ea typeface="Times New Roman" panose="02020603050405020304" pitchFamily="18" charset="0"/>
+                <a:cs typeface="Times New Roman" panose="02020603050405020304" pitchFamily="18" charset="0"/>
+              </a:rPr>
+              <a:t>printf</a:t>
+            </a:r>
+            <a:r>
+              <a:rPr lang="it-IT" sz="1200" dirty="0">
+                <a:solidFill>
+                  <a:srgbClr val="D4D4D4"/>
+                </a:solidFill>
+                <a:latin typeface="Consolas" panose="020B0609020204030204" pitchFamily="49" charset="0"/>
+                <a:ea typeface="Times New Roman" panose="02020603050405020304" pitchFamily="18" charset="0"/>
+                <a:cs typeface="Times New Roman" panose="02020603050405020304" pitchFamily="18" charset="0"/>
+              </a:rPr>
+              <a:t>(</a:t>
+            </a:r>
+            <a:r>
+              <a:rPr lang="it-IT" sz="1200" dirty="0">
+                <a:solidFill>
+                  <a:srgbClr val="CE9178"/>
+                </a:solidFill>
+                <a:latin typeface="Consolas" panose="020B0609020204030204" pitchFamily="49" charset="0"/>
+                <a:ea typeface="Times New Roman" panose="02020603050405020304" pitchFamily="18" charset="0"/>
+                <a:cs typeface="Times New Roman" panose="02020603050405020304" pitchFamily="18" charset="0"/>
+              </a:rPr>
+              <a:t>"Inserire il nome di un file o EOF (CTRL + D) per terminare: "</a:t>
+            </a:r>
+            <a:r>
+              <a:rPr lang="it-IT" sz="1200" dirty="0">
+                <a:solidFill>
+                  <a:srgbClr val="D4D4D4"/>
+                </a:solidFill>
+                <a:latin typeface="Consolas" panose="020B0609020204030204" pitchFamily="49" charset="0"/>
+                <a:ea typeface="Times New Roman" panose="02020603050405020304" pitchFamily="18" charset="0"/>
+                <a:cs typeface="Times New Roman" panose="02020603050405020304" pitchFamily="18" charset="0"/>
+              </a:rPr>
+              <a:t>);</a:t>
+            </a:r>
+            <a:endParaRPr lang="it-IT" sz="1200" dirty="0">
+              <a:latin typeface="Consolas" panose="020B0609020204030204" pitchFamily="49" charset="0"/>
+              <a:ea typeface="Calibri" panose="020F0502020204030204" pitchFamily="34" charset="0"/>
+              <a:cs typeface="Times New Roman" panose="02020603050405020304" pitchFamily="18" charset="0"/>
+            </a:endParaRPr>
+          </a:p>
+          <a:p>
+            <a:pPr>
+              <a:lnSpc>
+                <a:spcPct val="150000"/>
+              </a:lnSpc>
+              <a:spcAft>
+                <a:spcPts val="0"/>
+              </a:spcAft>
+            </a:pPr>
+            <a:r>
+              <a:rPr lang="it-IT" sz="1200" dirty="0">
+                <a:solidFill>
+                  <a:srgbClr val="D4D4D4"/>
+                </a:solidFill>
+                <a:latin typeface="Consolas" panose="020B0609020204030204" pitchFamily="49" charset="0"/>
+                <a:ea typeface="Times New Roman" panose="02020603050405020304" pitchFamily="18" charset="0"/>
+                <a:cs typeface="Times New Roman" panose="02020603050405020304" pitchFamily="18" charset="0"/>
+              </a:rPr>
+              <a:t>    }</a:t>
+            </a:r>
+            <a:endParaRPr lang="it-IT" sz="1200" dirty="0">
+              <a:latin typeface="Consolas" panose="020B0609020204030204" pitchFamily="49" charset="0"/>
+              <a:ea typeface="Calibri" panose="020F0502020204030204" pitchFamily="34" charset="0"/>
+              <a:cs typeface="Times New Roman" panose="02020603050405020304" pitchFamily="18" charset="0"/>
+            </a:endParaRPr>
+          </a:p>
+        </p:txBody>
+      </p:sp>
+      <p:sp>
+        <p:nvSpPr>
+          <p:cNvPr id="4" name="Callout: linea 3">
+            <a:extLst>
+              <a:ext uri="{FF2B5EF4-FFF2-40B4-BE49-F238E27FC236}">
+                <a16:creationId xmlns:a16="http://schemas.microsoft.com/office/drawing/2014/main" id="{3142C27D-66B6-4EC5-B175-799DACA0D343}"/>
+              </a:ext>
+            </a:extLst>
+          </p:cNvPr>
+          <p:cNvSpPr/>
+          <p:nvPr/>
+        </p:nvSpPr>
+        <p:spPr>
+          <a:xfrm>
+            <a:off x="7650120" y="3581400"/>
+            <a:ext cx="3703680" cy="1743326"/>
+          </a:xfrm>
+          <a:prstGeom prst="borderCallout1">
+            <a:avLst>
+              <a:gd name="adj1" fmla="val 26946"/>
+              <a:gd name="adj2" fmla="val -4218"/>
+              <a:gd name="adj3" fmla="val -1691"/>
+              <a:gd name="adj4" fmla="val -29332"/>
+            </a:avLst>
+          </a:prstGeom>
+          <a:solidFill>
+            <a:schemeClr val="accent4"/>
+          </a:solidFill>
+          <a:ln>
+            <a:solidFill>
+              <a:schemeClr val="accent4"/>
+            </a:solidFill>
+          </a:ln>
+        </p:spPr>
+        <p:style>
+          <a:lnRef idx="2">
+            <a:schemeClr val="accent1">
+              <a:shade val="50000"/>
+            </a:schemeClr>
+          </a:lnRef>
+          <a:fillRef idx="1">
+            <a:schemeClr val="accent1"/>
+          </a:fillRef>
+          <a:effectRef idx="0">
+            <a:schemeClr val="accent1"/>
+          </a:effectRef>
+          <a:fontRef idx="minor">
+            <a:schemeClr val="lt1"/>
+          </a:fontRef>
+        </p:style>
+        <p:txBody>
+          <a:bodyPr rtlCol="0" anchor="ctr"/>
+          <a:lstStyle/>
+          <a:p>
+            <a:pPr algn="just"/>
+            <a:r>
+              <a:rPr lang="it-IT" sz="1300" dirty="0">
+                <a:solidFill>
+                  <a:schemeClr val="tx1"/>
+                </a:solidFill>
+                <a:latin typeface="Avenir Next LT Pro Light" panose="020B0304020202020204" pitchFamily="34" charset="0"/>
+              </a:rPr>
+              <a:t>Si gestiscono i tre casi di ciò che si può ricevere dal server:</a:t>
+            </a:r>
+          </a:p>
+          <a:p>
+            <a:pPr marL="285750" indent="-285750" algn="just">
+              <a:buFont typeface="Arial" panose="020B0604020202020204" pitchFamily="34" charset="0"/>
+              <a:buChar char="•"/>
+            </a:pPr>
+            <a:r>
+              <a:rPr lang="it-IT" sz="1300" dirty="0">
+                <a:solidFill>
+                  <a:schemeClr val="tx1"/>
+                </a:solidFill>
+                <a:latin typeface="Avenir Next LT Pro Light" panose="020B0304020202020204" pitchFamily="34" charset="0"/>
+              </a:rPr>
+              <a:t>viene trovata la parola più lunga e si stampa il numero di caratteri;</a:t>
+            </a:r>
+          </a:p>
+          <a:p>
+            <a:pPr marL="285750" indent="-285750" algn="just">
+              <a:buFont typeface="Arial" panose="020B0604020202020204" pitchFamily="34" charset="0"/>
+              <a:buChar char="•"/>
+            </a:pPr>
+            <a:r>
+              <a:rPr lang="it-IT" sz="1300" dirty="0">
+                <a:solidFill>
+                  <a:schemeClr val="tx1"/>
+                </a:solidFill>
+                <a:latin typeface="Avenir Next LT Pro Light" panose="020B0304020202020204" pitchFamily="34" charset="0"/>
+              </a:rPr>
+              <a:t>se si riceve 0, si stampa che nel file richiesto (che esiste) non ci sono parole;</a:t>
+            </a:r>
+          </a:p>
+          <a:p>
+            <a:pPr marL="285750" indent="-285750" algn="just">
+              <a:buFont typeface="Arial" panose="020B0604020202020204" pitchFamily="34" charset="0"/>
+              <a:buChar char="•"/>
+            </a:pPr>
+            <a:r>
+              <a:rPr lang="it-IT" sz="1300" dirty="0">
+                <a:solidFill>
+                  <a:schemeClr val="tx1"/>
+                </a:solidFill>
+                <a:latin typeface="Avenir Next LT Pro Light" panose="020B0304020202020204" pitchFamily="34" charset="0"/>
+              </a:rPr>
+              <a:t>se invece si riceve -1 significa che il file richiesto non esiste sul server.</a:t>
+            </a:r>
+          </a:p>
+        </p:txBody>
+      </p:sp>
+    </p:spTree>
+    <p:extLst>
+      <p:ext uri="{BB962C8B-B14F-4D97-AF65-F5344CB8AC3E}">
+        <p14:creationId xmlns:p14="http://schemas.microsoft.com/office/powerpoint/2010/main" val="1629653739"/>
+      </p:ext>
+    </p:extLst>
+  </p:cSld>
+  <p:clrMapOvr>
+    <a:masterClrMapping/>
+  </p:clrMapOvr>
+</p:sld>
+</file>
+
+<file path=ppt/slides/slide6.xml><?xml version="1.0" encoding="utf-8"?>
+<p:sld xmlns:a="http://schemas.openxmlformats.org/drawingml/2006/main" xmlns:r="http://schemas.openxmlformats.org/officeDocument/2006/relationships" xmlns:p="http://schemas.openxmlformats.org/presentationml/2006/main">
+  <p:cSld>
+    <p:bg>
+      <p:bgPr>
+        <a:solidFill>
+          <a:srgbClr val="2A2A2A"/>
+        </a:solidFill>
+        <a:effectLst/>
+      </p:bgPr>
+    </p:bg>
+    <p:spTree>
+      <p:nvGrpSpPr>
+        <p:cNvPr id="1" name=""/>
+        <p:cNvGrpSpPr/>
+        <p:nvPr/>
+      </p:nvGrpSpPr>
+      <p:grpSpPr>
+        <a:xfrm>
+          <a:off x="0" y="0"/>
+          <a:ext cx="0" cy="0"/>
+          <a:chOff x="0" y="0"/>
+          <a:chExt cx="0" cy="0"/>
+        </a:xfrm>
+      </p:grpSpPr>
+      <p:sp>
+        <p:nvSpPr>
+          <p:cNvPr id="2" name="Titolo 1">
+            <a:extLst>
+              <a:ext uri="{FF2B5EF4-FFF2-40B4-BE49-F238E27FC236}">
+                <a16:creationId xmlns:a16="http://schemas.microsoft.com/office/drawing/2014/main" id="{F1DDE7A4-1A5F-4F0D-B842-7798EDC6EDA8}"/>
+              </a:ext>
+            </a:extLst>
+          </p:cNvPr>
+          <p:cNvSpPr>
+            <a:spLocks noGrp="1"/>
+          </p:cNvSpPr>
+          <p:nvPr>
+            <p:ph type="title"/>
+          </p:nvPr>
+        </p:nvSpPr>
+        <p:spPr>
+          <a:xfrm>
+            <a:off x="166048" y="92077"/>
+            <a:ext cx="11859904" cy="911224"/>
+          </a:xfrm>
+        </p:spPr>
+        <p:txBody>
+          <a:bodyPr>
+            <a:normAutofit/>
+          </a:bodyPr>
+          <a:lstStyle/>
+          <a:p>
+            <a:pPr algn="ctr"/>
+            <a:r>
+              <a:rPr lang="it-IT" dirty="0">
+                <a:solidFill>
+                  <a:schemeClr val="bg1"/>
+                </a:solidFill>
+                <a:latin typeface="Avenir Next LT Pro Light" panose="020B0304020202020204" pitchFamily="34" charset="0"/>
+              </a:rPr>
+              <a:t>Eventuali prove di performance UDP</a:t>
+            </a:r>
+          </a:p>
+        </p:txBody>
+      </p:sp>
+      <p:sp>
+        <p:nvSpPr>
+          <p:cNvPr id="3" name="Segnaposto numero diapositiva 2">
+            <a:extLst>
+              <a:ext uri="{FF2B5EF4-FFF2-40B4-BE49-F238E27FC236}">
+                <a16:creationId xmlns:a16="http://schemas.microsoft.com/office/drawing/2014/main" id="{A47D4834-59E8-435C-A95B-F4D997DED51E}"/>
+              </a:ext>
+            </a:extLst>
+          </p:cNvPr>
+          <p:cNvSpPr>
+            <a:spLocks noGrp="1"/>
+          </p:cNvSpPr>
+          <p:nvPr>
+            <p:ph type="sldNum" sz="quarter" idx="12"/>
+          </p:nvPr>
+        </p:nvSpPr>
+        <p:spPr/>
+        <p:txBody>
+          <a:bodyPr/>
+          <a:lstStyle/>
+          <a:p>
+            <a:fld id="{4A6DC286-705F-4A37-A21F-B485E3A29C72}" type="slidenum">
+              <a:rPr lang="it-IT" smtClean="0"/>
+              <a:t>6</a:t>
+            </a:fld>
+            <a:endParaRPr lang="it-IT"/>
+          </a:p>
+        </p:txBody>
+      </p:sp>
+      <p:sp>
+        <p:nvSpPr>
+          <p:cNvPr id="4" name="CasellaDiTesto 3">
+            <a:extLst>
+              <a:ext uri="{FF2B5EF4-FFF2-40B4-BE49-F238E27FC236}">
+                <a16:creationId xmlns:a16="http://schemas.microsoft.com/office/drawing/2014/main" id="{53201F81-8510-4C74-BAB4-1DBFEB2D3B79}"/>
+              </a:ext>
+            </a:extLst>
+          </p:cNvPr>
+          <p:cNvSpPr txBox="1"/>
+          <p:nvPr/>
+        </p:nvSpPr>
+        <p:spPr>
+          <a:xfrm>
+            <a:off x="503280" y="1003301"/>
+            <a:ext cx="10427575" cy="461088"/>
+          </a:xfrm>
+          <a:prstGeom prst="rect">
+            <a:avLst/>
+          </a:prstGeom>
+          <a:noFill/>
+        </p:spPr>
+        <p:txBody>
+          <a:bodyPr wrap="square" rtlCol="0">
+            <a:spAutoFit/>
+          </a:bodyPr>
+          <a:lstStyle/>
+          <a:p>
+            <a:pPr algn="just">
+              <a:lnSpc>
+                <a:spcPct val="150000"/>
+              </a:lnSpc>
+              <a:spcAft>
+                <a:spcPts val="0"/>
+              </a:spcAft>
+            </a:pPr>
+            <a:r>
+              <a:rPr lang="it-IT" dirty="0">
+                <a:solidFill>
+                  <a:srgbClr val="00B0F0"/>
+                </a:solidFill>
+                <a:latin typeface="Avenir Next LT Pro Light" panose="020B0304020202020204" pitchFamily="34" charset="0"/>
+                <a:ea typeface="Calibri" panose="020F0502020204030204" pitchFamily="34" charset="0"/>
+                <a:cs typeface="Times New Roman" panose="02020603050405020304" pitchFamily="18" charset="0"/>
+              </a:rPr>
+              <a:t>Da definire</a:t>
+            </a:r>
+            <a:endParaRPr lang="it-IT" dirty="0">
+              <a:solidFill>
+                <a:schemeClr val="bg1"/>
+              </a:solidFill>
+              <a:latin typeface="Avenir Next LT Pro Light" panose="020B0304020202020204" pitchFamily="34" charset="0"/>
+              <a:ea typeface="Calibri" panose="020F0502020204030204" pitchFamily="34" charset="0"/>
+              <a:cs typeface="Times New Roman" panose="02020603050405020304" pitchFamily="18" charset="0"/>
+            </a:endParaRPr>
+          </a:p>
+        </p:txBody>
+      </p:sp>
+    </p:spTree>
+    <p:extLst>
+      <p:ext uri="{BB962C8B-B14F-4D97-AF65-F5344CB8AC3E}">
+        <p14:creationId xmlns:p14="http://schemas.microsoft.com/office/powerpoint/2010/main" val="234433866"/>
+      </p:ext>
+    </p:extLst>
+  </p:cSld>
+  <p:clrMapOvr>
+    <a:masterClrMapping/>
+  </p:clrMapOvr>
+</p:sld>
+</file>
+
+<file path=ppt/slides/slide7.xml><?xml version="1.0" encoding="utf-8"?>
+<p:sld xmlns:a="http://schemas.openxmlformats.org/drawingml/2006/main" xmlns:r="http://schemas.openxmlformats.org/officeDocument/2006/relationships" xmlns:p="http://schemas.openxmlformats.org/presentationml/2006/main">
+  <p:cSld>
+    <p:bg>
+      <p:bgPr>
+        <a:solidFill>
+          <a:srgbClr val="2A2A2A"/>
+        </a:solidFill>
+        <a:effectLst/>
+      </p:bgPr>
+    </p:bg>
+    <p:spTree>
+      <p:nvGrpSpPr>
+        <p:cNvPr id="1" name=""/>
+        <p:cNvGrpSpPr/>
+        <p:nvPr/>
+      </p:nvGrpSpPr>
+      <p:grpSpPr>
+        <a:xfrm>
+          <a:off x="0" y="0"/>
+          <a:ext cx="0" cy="0"/>
+          <a:chOff x="0" y="0"/>
+          <a:chExt cx="0" cy="0"/>
+        </a:xfrm>
+      </p:grpSpPr>
       <p:pic>
         <p:nvPicPr>
           <p:cNvPr id="5" name="Immagine 4" descr="Immagine che contiene orologio, luce, segnale&#10;&#10;Descrizione generata automaticamente">
@@ -5513,6 +9250,94 @@
       </p:pic>
       <p:sp>
         <p:nvSpPr>
+          <p:cNvPr id="2" name="Titolo 1">
+            <a:extLst>
+              <a:ext uri="{FF2B5EF4-FFF2-40B4-BE49-F238E27FC236}">
+                <a16:creationId xmlns:a16="http://schemas.microsoft.com/office/drawing/2014/main" id="{F1DDE7A4-1A5F-4F0D-B842-7798EDC6EDA8}"/>
+              </a:ext>
+            </a:extLst>
+          </p:cNvPr>
+          <p:cNvSpPr>
+            <a:spLocks noGrp="1"/>
+          </p:cNvSpPr>
+          <p:nvPr>
+            <p:ph type="title"/>
+          </p:nvPr>
+        </p:nvSpPr>
+        <p:spPr>
+          <a:xfrm>
+            <a:off x="166048" y="92077"/>
+            <a:ext cx="11859904" cy="911224"/>
+          </a:xfrm>
+        </p:spPr>
+        <p:txBody>
+          <a:bodyPr>
+            <a:normAutofit/>
+          </a:bodyPr>
+          <a:lstStyle/>
+          <a:p>
+            <a:pPr algn="ctr"/>
+            <a:r>
+              <a:rPr lang="it-IT" dirty="0">
+                <a:solidFill>
+                  <a:schemeClr val="bg1"/>
+                </a:solidFill>
+                <a:latin typeface="Avenir Next LT Pro Light" panose="020B0304020202020204" pitchFamily="34" charset="0"/>
+              </a:rPr>
+              <a:t>Schema C/S con </a:t>
+            </a:r>
+            <a:r>
+              <a:rPr lang="it-IT">
+                <a:solidFill>
+                  <a:schemeClr val="bg1"/>
+                </a:solidFill>
+                <a:latin typeface="Avenir Next LT Pro Light" panose="020B0304020202020204" pitchFamily="34" charset="0"/>
+              </a:rPr>
+              <a:t>connessione (TCP</a:t>
+            </a:r>
+            <a:r>
+              <a:rPr lang="it-IT" dirty="0">
+                <a:solidFill>
+                  <a:schemeClr val="bg1"/>
+                </a:solidFill>
+                <a:latin typeface="Avenir Next LT Pro Light" panose="020B0304020202020204" pitchFamily="34" charset="0"/>
+              </a:rPr>
+              <a:t>)</a:t>
+            </a:r>
+          </a:p>
+        </p:txBody>
+      </p:sp>
+      <p:sp>
+        <p:nvSpPr>
+          <p:cNvPr id="3" name="Segnaposto numero diapositiva 2">
+            <a:extLst>
+              <a:ext uri="{FF2B5EF4-FFF2-40B4-BE49-F238E27FC236}">
+                <a16:creationId xmlns:a16="http://schemas.microsoft.com/office/drawing/2014/main" id="{A47D4834-59E8-435C-A95B-F4D997DED51E}"/>
+              </a:ext>
+            </a:extLst>
+          </p:cNvPr>
+          <p:cNvSpPr>
+            <a:spLocks noGrp="1"/>
+          </p:cNvSpPr>
+          <p:nvPr>
+            <p:ph type="sldNum" sz="quarter" idx="12"/>
+          </p:nvPr>
+        </p:nvSpPr>
+        <p:spPr/>
+        <p:txBody>
+          <a:bodyPr/>
+          <a:lstStyle/>
+          <a:p>
+            <a:fld id="{4A6DC286-705F-4A37-A21F-B485E3A29C72}" type="slidenum">
+              <a:rPr lang="it-IT" smtClean="0"/>
+              <a:t>7</a:t>
+            </a:fld>
+            <a:endParaRPr lang="it-IT"/>
+          </a:p>
+        </p:txBody>
+      </p:sp>
+      <p:sp>
+        <p:nvSpPr>
           <p:cNvPr id="6" name="CasellaDiTesto 5">
             <a:extLst>
               <a:ext uri="{FF2B5EF4-FFF2-40B4-BE49-F238E27FC236}">
@@ -6042,7 +9867,7 @@
 </p:sld>
 </file>
 
-<file path=ppt/slides/slide5.xml><?xml version="1.0" encoding="utf-8"?>
+<file path=ppt/slides/slide8.xml><?xml version="1.0" encoding="utf-8"?>
 <p:sld xmlns:a="http://schemas.openxmlformats.org/drawingml/2006/main" xmlns:r="http://schemas.openxmlformats.org/officeDocument/2006/relationships" xmlns:p="http://schemas.openxmlformats.org/presentationml/2006/main">
   <p:cSld>
     <p:bg>
@@ -6131,7 +9956,7 @@
           <a:p>
             <a:fld id="{4A6DC286-705F-4A37-A21F-B485E3A29C72}" type="slidenum">
               <a:rPr lang="it-IT" smtClean="0"/>
-              <a:t>5</a:t>
+              <a:t>8</a:t>
             </a:fld>
             <a:endParaRPr lang="it-IT"/>
           </a:p>

</xml_diff>